<commit_message>
network graph and wbs
</commit_message>
<xml_diff>
--- a/Planning Documents/Network Diagram.pptx
+++ b/Planning Documents/Network Diagram.pptx
@@ -104,6 +104,11 @@
       </a:defRPr>
     </a:lvl9pPr>
   </p:defaultTextStyle>
+  <p:extLst>
+    <p:ext uri="{EFAFB233-063F-42B5-8137-9DF3F51BA10A}">
+      <p15:sldGuideLst xmlns:p15="http://schemas.microsoft.com/office/powerpoint/2012/main"/>
+    </p:ext>
+  </p:extLst>
 </p:presentation>
 </file>
 
@@ -238,7 +243,7 @@
           <a:p>
             <a:fld id="{73C24DE2-34C6-41C9-9E8C-EA727FD40054}" type="datetimeFigureOut">
               <a:rPr lang="en-NZ" smtClean="0"/>
-              <a:t>26/07/2016</a:t>
+              <a:t>27/07/2016</a:t>
             </a:fld>
             <a:endParaRPr lang="en-NZ"/>
           </a:p>
@@ -408,7 +413,7 @@
           <a:p>
             <a:fld id="{73C24DE2-34C6-41C9-9E8C-EA727FD40054}" type="datetimeFigureOut">
               <a:rPr lang="en-NZ" smtClean="0"/>
-              <a:t>26/07/2016</a:t>
+              <a:t>27/07/2016</a:t>
             </a:fld>
             <a:endParaRPr lang="en-NZ"/>
           </a:p>
@@ -588,7 +593,7 @@
           <a:p>
             <a:fld id="{73C24DE2-34C6-41C9-9E8C-EA727FD40054}" type="datetimeFigureOut">
               <a:rPr lang="en-NZ" smtClean="0"/>
-              <a:t>26/07/2016</a:t>
+              <a:t>27/07/2016</a:t>
             </a:fld>
             <a:endParaRPr lang="en-NZ"/>
           </a:p>
@@ -758,7 +763,7 @@
           <a:p>
             <a:fld id="{73C24DE2-34C6-41C9-9E8C-EA727FD40054}" type="datetimeFigureOut">
               <a:rPr lang="en-NZ" smtClean="0"/>
-              <a:t>26/07/2016</a:t>
+              <a:t>27/07/2016</a:t>
             </a:fld>
             <a:endParaRPr lang="en-NZ"/>
           </a:p>
@@ -1004,7 +1009,7 @@
           <a:p>
             <a:fld id="{73C24DE2-34C6-41C9-9E8C-EA727FD40054}" type="datetimeFigureOut">
               <a:rPr lang="en-NZ" smtClean="0"/>
-              <a:t>26/07/2016</a:t>
+              <a:t>27/07/2016</a:t>
             </a:fld>
             <a:endParaRPr lang="en-NZ"/>
           </a:p>
@@ -1236,7 +1241,7 @@
           <a:p>
             <a:fld id="{73C24DE2-34C6-41C9-9E8C-EA727FD40054}" type="datetimeFigureOut">
               <a:rPr lang="en-NZ" smtClean="0"/>
-              <a:t>26/07/2016</a:t>
+              <a:t>27/07/2016</a:t>
             </a:fld>
             <a:endParaRPr lang="en-NZ"/>
           </a:p>
@@ -1603,7 +1608,7 @@
           <a:p>
             <a:fld id="{73C24DE2-34C6-41C9-9E8C-EA727FD40054}" type="datetimeFigureOut">
               <a:rPr lang="en-NZ" smtClean="0"/>
-              <a:t>26/07/2016</a:t>
+              <a:t>27/07/2016</a:t>
             </a:fld>
             <a:endParaRPr lang="en-NZ"/>
           </a:p>
@@ -1721,7 +1726,7 @@
           <a:p>
             <a:fld id="{73C24DE2-34C6-41C9-9E8C-EA727FD40054}" type="datetimeFigureOut">
               <a:rPr lang="en-NZ" smtClean="0"/>
-              <a:t>26/07/2016</a:t>
+              <a:t>27/07/2016</a:t>
             </a:fld>
             <a:endParaRPr lang="en-NZ"/>
           </a:p>
@@ -1816,7 +1821,7 @@
           <a:p>
             <a:fld id="{73C24DE2-34C6-41C9-9E8C-EA727FD40054}" type="datetimeFigureOut">
               <a:rPr lang="en-NZ" smtClean="0"/>
-              <a:t>26/07/2016</a:t>
+              <a:t>27/07/2016</a:t>
             </a:fld>
             <a:endParaRPr lang="en-NZ"/>
           </a:p>
@@ -2093,7 +2098,7 @@
           <a:p>
             <a:fld id="{73C24DE2-34C6-41C9-9E8C-EA727FD40054}" type="datetimeFigureOut">
               <a:rPr lang="en-NZ" smtClean="0"/>
-              <a:t>26/07/2016</a:t>
+              <a:t>27/07/2016</a:t>
             </a:fld>
             <a:endParaRPr lang="en-NZ"/>
           </a:p>
@@ -2346,7 +2351,7 @@
           <a:p>
             <a:fld id="{73C24DE2-34C6-41C9-9E8C-EA727FD40054}" type="datetimeFigureOut">
               <a:rPr lang="en-NZ" smtClean="0"/>
-              <a:t>26/07/2016</a:t>
+              <a:t>27/07/2016</a:t>
             </a:fld>
             <a:endParaRPr lang="en-NZ"/>
           </a:p>
@@ -2559,7 +2564,7 @@
           <a:p>
             <a:fld id="{73C24DE2-34C6-41C9-9E8C-EA727FD40054}" type="datetimeFigureOut">
               <a:rPr lang="en-NZ" smtClean="0"/>
-              <a:t>26/07/2016</a:t>
+              <a:t>27/07/2016</a:t>
             </a:fld>
             <a:endParaRPr lang="en-NZ"/>
           </a:p>
@@ -3286,7 +3291,7 @@
       </p:sp>
       <p:sp>
         <p:nvSpPr>
-          <p:cNvPr id="8" name="Text Box 6"/>
+          <p:cNvPr id="9" name="Text Box 7"/>
           <p:cNvSpPr txBox="1">
             <a:spLocks noChangeArrowheads="1"/>
           </p:cNvSpPr>
@@ -3294,7 +3299,7 @@
         </p:nvSpPr>
         <p:spPr bwMode="auto">
           <a:xfrm>
-            <a:off x="2229461" y="1449387"/>
+            <a:off x="2229461" y="2217737"/>
             <a:ext cx="1257300" cy="601663"/>
           </a:xfrm>
           <a:prstGeom prst="rect">
@@ -3337,7 +3342,7 @@
               <a:tabLst/>
             </a:pPr>
             <a:r>
-              <a:rPr kumimoji="0" lang="en-US" altLang="en-US" sz="1100" b="0" i="0" u="none" strike="noStrike" cap="none" normalizeH="0" baseline="0">
+              <a:rPr kumimoji="0" lang="en-US" altLang="en-US" sz="1100" b="0" i="0" u="none" strike="noStrike" cap="none" normalizeH="0" baseline="0" dirty="0">
                 <a:ln>
                   <a:noFill/>
                 </a:ln>
@@ -3349,9 +3354,9 @@
                 <a:ea typeface="Calibri" panose="020F0502020204030204" pitchFamily="34" charset="0"/>
                 <a:cs typeface="Times New Roman" panose="02020603050405020304" pitchFamily="18" charset="0"/>
               </a:rPr>
-              <a:t>Decide on a Data Structure</a:t>
-            </a:r>
-            <a:endParaRPr kumimoji="0" lang="en-US" altLang="en-US" sz="1800" b="0" i="0" u="none" strike="noStrike" cap="none" normalizeH="0" baseline="0">
+              <a:t>Parse command line input</a:t>
+            </a:r>
+            <a:endParaRPr kumimoji="0" lang="en-US" altLang="en-US" sz="1800" b="0" i="0" u="none" strike="noStrike" cap="none" normalizeH="0" baseline="0" dirty="0">
               <a:ln>
                 <a:noFill/>
               </a:ln>
@@ -3366,7 +3371,7 @@
       </p:sp>
       <p:sp>
         <p:nvSpPr>
-          <p:cNvPr id="9" name="Text Box 7"/>
+          <p:cNvPr id="11" name="Text Box 9"/>
           <p:cNvSpPr txBox="1">
             <a:spLocks noChangeArrowheads="1"/>
           </p:cNvSpPr>
@@ -3374,8 +3379,8 @@
         </p:nvSpPr>
         <p:spPr bwMode="auto">
           <a:xfrm>
-            <a:off x="2229461" y="2217737"/>
-            <a:ext cx="1257300" cy="601663"/>
+            <a:off x="749118" y="4684769"/>
+            <a:ext cx="1285875" cy="601663"/>
           </a:xfrm>
           <a:prstGeom prst="rect">
             <a:avLst/>
@@ -3417,7 +3422,7 @@
               <a:tabLst/>
             </a:pPr>
             <a:r>
-              <a:rPr kumimoji="0" lang="en-US" altLang="en-US" sz="1100" b="0" i="0" u="none" strike="noStrike" cap="none" normalizeH="0" baseline="0">
+              <a:rPr kumimoji="0" lang="en-US" altLang="en-US" sz="1100" b="0" i="0" u="none" strike="noStrike" cap="none" normalizeH="0" baseline="0" dirty="0">
                 <a:ln>
                   <a:noFill/>
                 </a:ln>
@@ -3429,9 +3434,9 @@
                 <a:ea typeface="Calibri" panose="020F0502020204030204" pitchFamily="34" charset="0"/>
                 <a:cs typeface="Times New Roman" panose="02020603050405020304" pitchFamily="18" charset="0"/>
               </a:rPr>
-              <a:t>Parse from command line</a:t>
-            </a:r>
-            <a:endParaRPr kumimoji="0" lang="en-US" altLang="en-US" sz="1800" b="0" i="0" u="none" strike="noStrike" cap="none" normalizeH="0" baseline="0">
+              <a:t>Format valid output file</a:t>
+            </a:r>
+            <a:endParaRPr kumimoji="0" lang="en-US" altLang="en-US" sz="1800" b="0" i="0" u="none" strike="noStrike" cap="none" normalizeH="0" baseline="0" dirty="0">
               <a:ln>
                 <a:noFill/>
               </a:ln>
@@ -3446,7 +3451,7 @@
       </p:sp>
       <p:sp>
         <p:nvSpPr>
-          <p:cNvPr id="10" name="Text Box 8"/>
+          <p:cNvPr id="13" name="Text Box 11"/>
           <p:cNvSpPr txBox="1">
             <a:spLocks noChangeArrowheads="1"/>
           </p:cNvSpPr>
@@ -3454,7 +3459,7 @@
         </p:nvSpPr>
         <p:spPr bwMode="auto">
           <a:xfrm>
-            <a:off x="2229461" y="2973387"/>
+            <a:off x="2238985" y="2940261"/>
             <a:ext cx="1257300" cy="601663"/>
           </a:xfrm>
           <a:prstGeom prst="rect">
@@ -3497,7 +3502,7 @@
               <a:tabLst/>
             </a:pPr>
             <a:r>
-              <a:rPr kumimoji="0" lang="en-US" altLang="en-US" sz="1100" b="0" i="0" u="none" strike="noStrike" cap="none" normalizeH="0" baseline="0">
+              <a:rPr kumimoji="0" lang="en-US" altLang="en-US" sz="1100" b="0" i="0" u="none" strike="noStrike" cap="none" normalizeH="0" baseline="0" dirty="0">
                 <a:ln>
                   <a:noFill/>
                 </a:ln>
@@ -3509,9 +3514,39 @@
                 <a:ea typeface="Calibri" panose="020F0502020204030204" pitchFamily="34" charset="0"/>
                 <a:cs typeface="Times New Roman" panose="02020603050405020304" pitchFamily="18" charset="0"/>
               </a:rPr>
-              <a:t>Read input file into data structure</a:t>
-            </a:r>
-            <a:endParaRPr kumimoji="0" lang="en-US" altLang="en-US" sz="1800" b="0" i="0" u="none" strike="noStrike" cap="none" normalizeH="0" baseline="0">
+              <a:t>Creation</a:t>
+            </a:r>
+            <a:r>
+              <a:rPr kumimoji="0" lang="en-US" altLang="en-US" sz="1100" b="0" i="0" u="none" strike="noStrike" cap="none" normalizeH="0" dirty="0">
+                <a:ln>
+                  <a:noFill/>
+                </a:ln>
+                <a:solidFill>
+                  <a:schemeClr val="tx1"/>
+                </a:solidFill>
+                <a:effectLst/>
+                <a:latin typeface="Calibri" panose="020F0502020204030204" pitchFamily="34" charset="0"/>
+                <a:ea typeface="Calibri" panose="020F0502020204030204" pitchFamily="34" charset="0"/>
+                <a:cs typeface="Times New Roman" panose="02020603050405020304" pitchFamily="18" charset="0"/>
+              </a:rPr>
+              <a:t> of</a:t>
+            </a:r>
+            <a:r>
+              <a:rPr kumimoji="0" lang="en-US" altLang="en-US" sz="1100" b="0" i="0" u="none" strike="noStrike" cap="none" normalizeH="0" baseline="0" dirty="0">
+                <a:ln>
+                  <a:noFill/>
+                </a:ln>
+                <a:solidFill>
+                  <a:schemeClr val="tx1"/>
+                </a:solidFill>
+                <a:effectLst/>
+                <a:latin typeface="Calibri" panose="020F0502020204030204" pitchFamily="34" charset="0"/>
+                <a:ea typeface="Calibri" panose="020F0502020204030204" pitchFamily="34" charset="0"/>
+                <a:cs typeface="Times New Roman" panose="02020603050405020304" pitchFamily="18" charset="0"/>
+              </a:rPr>
+              <a:t> data structure</a:t>
+            </a:r>
+            <a:endParaRPr kumimoji="0" lang="en-US" altLang="en-US" sz="1800" b="0" i="0" u="none" strike="noStrike" cap="none" normalizeH="0" baseline="0" dirty="0">
               <a:ln>
                 <a:noFill/>
               </a:ln>
@@ -3526,7 +3561,7 @@
       </p:sp>
       <p:sp>
         <p:nvSpPr>
-          <p:cNvPr id="11" name="Text Box 9"/>
+          <p:cNvPr id="15" name="Text Box 13"/>
           <p:cNvSpPr txBox="1">
             <a:spLocks noChangeArrowheads="1"/>
           </p:cNvSpPr>
@@ -3534,8 +3569,8 @@
         </p:nvSpPr>
         <p:spPr bwMode="auto">
           <a:xfrm>
-            <a:off x="2229461" y="3697287"/>
-            <a:ext cx="1257300" cy="601663"/>
+            <a:off x="4262070" y="2570312"/>
+            <a:ext cx="1257300" cy="601662"/>
           </a:xfrm>
           <a:prstGeom prst="rect">
             <a:avLst/>
@@ -3577,7 +3612,7 @@
               <a:tabLst/>
             </a:pPr>
             <a:r>
-              <a:rPr kumimoji="0" lang="en-US" altLang="en-US" sz="1100" b="0" i="0" u="none" strike="noStrike" cap="none" normalizeH="0" baseline="0">
+              <a:rPr kumimoji="0" lang="en-US" altLang="en-US" sz="1100" b="0" i="0" u="none" strike="noStrike" cap="none" normalizeH="0" baseline="0" dirty="0">
                 <a:ln>
                   <a:noFill/>
                 </a:ln>
@@ -3589,9 +3624,24 @@
                 <a:ea typeface="Calibri" panose="020F0502020204030204" pitchFamily="34" charset="0"/>
                 <a:cs typeface="Times New Roman" panose="02020603050405020304" pitchFamily="18" charset="0"/>
               </a:rPr>
-              <a:t>Format valid output file</a:t>
-            </a:r>
-            <a:endParaRPr kumimoji="0" lang="en-US" altLang="en-US" sz="1800" b="0" i="0" u="none" strike="noStrike" cap="none" normalizeH="0" baseline="0">
+              <a:t>Initalise data structure</a:t>
+            </a:r>
+            <a:r>
+              <a:rPr kumimoji="0" lang="en-US" altLang="en-US" sz="1100" b="0" i="0" u="none" strike="noStrike" cap="none" normalizeH="0" dirty="0">
+                <a:ln>
+                  <a:noFill/>
+                </a:ln>
+                <a:solidFill>
+                  <a:schemeClr val="tx1"/>
+                </a:solidFill>
+                <a:effectLst/>
+                <a:latin typeface="Calibri" panose="020F0502020204030204" pitchFamily="34" charset="0"/>
+                <a:ea typeface="Calibri" panose="020F0502020204030204" pitchFamily="34" charset="0"/>
+                <a:cs typeface="Times New Roman" panose="02020603050405020304" pitchFamily="18" charset="0"/>
+              </a:rPr>
+              <a:t> with input</a:t>
+            </a:r>
+            <a:endParaRPr kumimoji="0" lang="en-US" altLang="en-US" sz="1800" b="0" i="0" u="none" strike="noStrike" cap="none" normalizeH="0" baseline="0" dirty="0">
               <a:ln>
                 <a:noFill/>
               </a:ln>
@@ -3606,7 +3656,7 @@
       </p:sp>
       <p:sp>
         <p:nvSpPr>
-          <p:cNvPr id="12" name="Text Box 10"/>
+          <p:cNvPr id="16" name="Text Box 14"/>
           <p:cNvSpPr txBox="1">
             <a:spLocks noChangeArrowheads="1"/>
           </p:cNvSpPr>
@@ -3614,7 +3664,7 @@
         </p:nvSpPr>
         <p:spPr bwMode="auto">
           <a:xfrm>
-            <a:off x="3974123" y="2217737"/>
+            <a:off x="6006732" y="2570312"/>
             <a:ext cx="1257300" cy="601663"/>
           </a:xfrm>
           <a:prstGeom prst="rect">
@@ -3657,7 +3707,15 @@
               <a:tabLst/>
             </a:pPr>
             <a:r>
-              <a:rPr kumimoji="0" lang="en-US" altLang="en-US" sz="1100" b="0" i="0" u="none" strike="noStrike" cap="none" normalizeH="0" baseline="0">
+              <a:rPr lang="en-US" altLang="en-US" sz="1100" dirty="0">
+                <a:latin typeface="Calibri" panose="020F0502020204030204" pitchFamily="34" charset="0"/>
+                <a:ea typeface="Calibri" panose="020F0502020204030204" pitchFamily="34" charset="0"/>
+                <a:cs typeface="Times New Roman" panose="02020603050405020304" pitchFamily="18" charset="0"/>
+              </a:rPr>
+              <a:t>Produce </a:t>
+            </a:r>
+            <a:r>
+              <a:rPr kumimoji="0" lang="en-US" altLang="en-US" sz="1100" b="0" i="0" u="none" strike="noStrike" cap="none" normalizeH="0" baseline="0" dirty="0">
                 <a:ln>
                   <a:noFill/>
                 </a:ln>
@@ -3669,9 +3727,9 @@
                 <a:ea typeface="Calibri" panose="020F0502020204030204" pitchFamily="34" charset="0"/>
                 <a:cs typeface="Times New Roman" panose="02020603050405020304" pitchFamily="18" charset="0"/>
               </a:rPr>
-              <a:t>Allocate input into variables</a:t>
-            </a:r>
-            <a:endParaRPr kumimoji="0" lang="en-US" altLang="en-US" sz="1800" b="0" i="0" u="none" strike="noStrike" cap="none" normalizeH="0" baseline="0">
+              <a:t>any valid schedule</a:t>
+            </a:r>
+            <a:endParaRPr kumimoji="0" lang="en-US" altLang="en-US" sz="1800" b="0" i="0" u="none" strike="noStrike" cap="none" normalizeH="0" baseline="0" dirty="0">
               <a:ln>
                 <a:noFill/>
               </a:ln>
@@ -3686,7 +3744,7 @@
       </p:sp>
       <p:sp>
         <p:nvSpPr>
-          <p:cNvPr id="13" name="Text Box 11"/>
+          <p:cNvPr id="17" name="Text Box 15"/>
           <p:cNvSpPr txBox="1">
             <a:spLocks noChangeArrowheads="1"/>
           </p:cNvSpPr>
@@ -3694,8 +3752,8 @@
         </p:nvSpPr>
         <p:spPr bwMode="auto">
           <a:xfrm>
-            <a:off x="3982061" y="2963862"/>
-            <a:ext cx="1257300" cy="601663"/>
+            <a:off x="7751395" y="1673499"/>
+            <a:ext cx="1257300" cy="601662"/>
           </a:xfrm>
           <a:prstGeom prst="rect">
             <a:avLst/>
@@ -3737,7 +3795,7 @@
               <a:tabLst/>
             </a:pPr>
             <a:r>
-              <a:rPr kumimoji="0" lang="en-US" altLang="en-US" sz="1100" b="0" i="0" u="none" strike="noStrike" cap="none" normalizeH="0" baseline="0">
+              <a:rPr kumimoji="0" lang="en-US" altLang="en-US" sz="1100" b="0" i="0" u="none" strike="noStrike" cap="none" normalizeH="0" baseline="0" dirty="0">
                 <a:ln>
                   <a:noFill/>
                 </a:ln>
@@ -3749,9 +3807,39 @@
                 <a:ea typeface="Calibri" panose="020F0502020204030204" pitchFamily="34" charset="0"/>
                 <a:cs typeface="Times New Roman" panose="02020603050405020304" pitchFamily="18" charset="0"/>
               </a:rPr>
-              <a:t>Create data structure</a:t>
-            </a:r>
-            <a:endParaRPr kumimoji="0" lang="en-US" altLang="en-US" sz="1800" b="0" i="0" u="none" strike="noStrike" cap="none" normalizeH="0" baseline="0">
+              <a:t>Decision of</a:t>
+            </a:r>
+            <a:r>
+              <a:rPr kumimoji="0" lang="en-US" altLang="en-US" sz="1100" b="0" i="0" u="none" strike="noStrike" cap="none" normalizeH="0" dirty="0">
+                <a:ln>
+                  <a:noFill/>
+                </a:ln>
+                <a:solidFill>
+                  <a:schemeClr val="tx1"/>
+                </a:solidFill>
+                <a:effectLst/>
+                <a:latin typeface="Calibri" panose="020F0502020204030204" pitchFamily="34" charset="0"/>
+                <a:ea typeface="Calibri" panose="020F0502020204030204" pitchFamily="34" charset="0"/>
+                <a:cs typeface="Times New Roman" panose="02020603050405020304" pitchFamily="18" charset="0"/>
+              </a:rPr>
+              <a:t> </a:t>
+            </a:r>
+            <a:r>
+              <a:rPr kumimoji="0" lang="en-US" altLang="en-US" sz="1100" b="0" i="0" u="none" strike="noStrike" cap="none" normalizeH="0" baseline="0" dirty="0">
+                <a:ln>
+                  <a:noFill/>
+                </a:ln>
+                <a:solidFill>
+                  <a:schemeClr val="tx1"/>
+                </a:solidFill>
+                <a:effectLst/>
+                <a:latin typeface="Calibri" panose="020F0502020204030204" pitchFamily="34" charset="0"/>
+                <a:ea typeface="Calibri" panose="020F0502020204030204" pitchFamily="34" charset="0"/>
+                <a:cs typeface="Times New Roman" panose="02020603050405020304" pitchFamily="18" charset="0"/>
+              </a:rPr>
+              <a:t>visualization method</a:t>
+            </a:r>
+            <a:endParaRPr kumimoji="0" lang="en-US" altLang="en-US" sz="1800" b="0" i="0" u="none" strike="noStrike" cap="none" normalizeH="0" baseline="0" dirty="0">
               <a:ln>
                 <a:noFill/>
               </a:ln>
@@ -3766,7 +3854,7 @@
       </p:sp>
       <p:sp>
         <p:nvSpPr>
-          <p:cNvPr id="14" name="Text Box 12"/>
+          <p:cNvPr id="18" name="Text Box 16"/>
           <p:cNvSpPr txBox="1">
             <a:spLocks noChangeArrowheads="1"/>
           </p:cNvSpPr>
@@ -3774,7 +3862,7 @@
         </p:nvSpPr>
         <p:spPr bwMode="auto">
           <a:xfrm>
-            <a:off x="4004286" y="3703637"/>
+            <a:off x="7751395" y="2570311"/>
             <a:ext cx="1257300" cy="601663"/>
           </a:xfrm>
           <a:prstGeom prst="rect">
@@ -3829,7 +3917,7 @@
                 <a:ea typeface="Calibri" panose="020F0502020204030204" pitchFamily="34" charset="0"/>
                 <a:cs typeface="Times New Roman" panose="02020603050405020304" pitchFamily="18" charset="0"/>
               </a:rPr>
-              <a:t>Create valid output file</a:t>
+              <a:t>Implement Visualisation</a:t>
             </a:r>
             <a:endParaRPr kumimoji="0" lang="en-US" altLang="en-US" sz="1800" b="0" i="0" u="none" strike="noStrike" cap="none" normalizeH="0" baseline="0">
               <a:ln>
@@ -3846,7 +3934,7 @@
       </p:sp>
       <p:sp>
         <p:nvSpPr>
-          <p:cNvPr id="15" name="Text Box 13"/>
+          <p:cNvPr id="19" name="Text Box 17"/>
           <p:cNvSpPr txBox="1">
             <a:spLocks noChangeArrowheads="1"/>
           </p:cNvSpPr>
@@ -3854,8 +3942,8 @@
         </p:nvSpPr>
         <p:spPr bwMode="auto">
           <a:xfrm>
-            <a:off x="6005146" y="2593913"/>
-            <a:ext cx="1257300" cy="601662"/>
+            <a:off x="2543879" y="4690942"/>
+            <a:ext cx="1257300" cy="595489"/>
           </a:xfrm>
           <a:prstGeom prst="rect">
             <a:avLst/>
@@ -3897,7 +3985,7 @@
               <a:tabLst/>
             </a:pPr>
             <a:r>
-              <a:rPr kumimoji="0" lang="en-US" altLang="en-US" sz="1100" b="0" i="0" u="none" strike="noStrike" cap="none" normalizeH="0" baseline="0">
+              <a:rPr kumimoji="0" lang="en-US" altLang="en-US" sz="1100" b="0" i="0" u="none" strike="noStrike" cap="none" normalizeH="0" baseline="0" dirty="0">
                 <a:ln>
                   <a:noFill/>
                 </a:ln>
@@ -3909,9 +3997,9 @@
                 <a:ea typeface="Calibri" panose="020F0502020204030204" pitchFamily="34" charset="0"/>
                 <a:cs typeface="Times New Roman" panose="02020603050405020304" pitchFamily="18" charset="0"/>
               </a:rPr>
-              <a:t>Store data in data structure</a:t>
-            </a:r>
-            <a:endParaRPr kumimoji="0" lang="en-US" altLang="en-US" sz="1800" b="0" i="0" u="none" strike="noStrike" cap="none" normalizeH="0" baseline="0">
+              <a:t>Consider all possible solutions</a:t>
+            </a:r>
+            <a:endParaRPr kumimoji="0" lang="en-US" altLang="en-US" sz="1800" b="0" i="0" u="none" strike="noStrike" cap="none" normalizeH="0" baseline="0" dirty="0">
               <a:ln>
                 <a:noFill/>
               </a:ln>
@@ -3926,7 +4014,7 @@
       </p:sp>
       <p:sp>
         <p:nvSpPr>
-          <p:cNvPr id="16" name="Text Box 14"/>
+          <p:cNvPr id="20" name="Text Box 18"/>
           <p:cNvSpPr txBox="1">
             <a:spLocks noChangeArrowheads="1"/>
           </p:cNvSpPr>
@@ -3934,8 +4022,8 @@
         </p:nvSpPr>
         <p:spPr bwMode="auto">
           <a:xfrm>
-            <a:off x="7749808" y="2593913"/>
-            <a:ext cx="1257300" cy="601663"/>
+            <a:off x="4310065" y="4685297"/>
+            <a:ext cx="1257300" cy="601134"/>
           </a:xfrm>
           <a:prstGeom prst="rect">
             <a:avLst/>
@@ -3977,7 +4065,7 @@
               <a:tabLst/>
             </a:pPr>
             <a:r>
-              <a:rPr kumimoji="0" lang="en-US" altLang="en-US" sz="1100" b="0" i="0" u="none" strike="noStrike" cap="none" normalizeH="0" baseline="0" dirty="0">
+              <a:rPr kumimoji="0" lang="en-US" altLang="en-US" sz="1100" b="0" i="0" u="none" strike="noStrike" cap="none" normalizeH="0" baseline="0">
                 <a:ln>
                   <a:noFill/>
                 </a:ln>
@@ -3989,9 +4077,9 @@
                 <a:ea typeface="Calibri" panose="020F0502020204030204" pitchFamily="34" charset="0"/>
                 <a:cs typeface="Times New Roman" panose="02020603050405020304" pitchFamily="18" charset="0"/>
               </a:rPr>
-              <a:t>Find any valid schedule</a:t>
-            </a:r>
-            <a:endParaRPr kumimoji="0" lang="en-US" altLang="en-US" sz="1800" b="0" i="0" u="none" strike="noStrike" cap="none" normalizeH="0" baseline="0" dirty="0">
+              <a:t>Use depth first branch and bound algorithm</a:t>
+            </a:r>
+            <a:endParaRPr kumimoji="0" lang="en-US" altLang="en-US" sz="1800" b="0" i="0" u="none" strike="noStrike" cap="none" normalizeH="0" baseline="0">
               <a:ln>
                 <a:noFill/>
               </a:ln>
@@ -4006,7 +4094,7 @@
       </p:sp>
       <p:sp>
         <p:nvSpPr>
-          <p:cNvPr id="17" name="Text Box 15"/>
+          <p:cNvPr id="21" name="Text Box 19"/>
           <p:cNvSpPr txBox="1">
             <a:spLocks noChangeArrowheads="1"/>
           </p:cNvSpPr>
@@ -4014,8 +4102,8 @@
         </p:nvSpPr>
         <p:spPr bwMode="auto">
           <a:xfrm>
-            <a:off x="9524634" y="3703638"/>
-            <a:ext cx="1257300" cy="601662"/>
+            <a:off x="8465703" y="4498202"/>
+            <a:ext cx="1257300" cy="815975"/>
           </a:xfrm>
           <a:prstGeom prst="rect">
             <a:avLst/>
@@ -4057,7 +4145,7 @@
               <a:tabLst/>
             </a:pPr>
             <a:r>
-              <a:rPr kumimoji="0" lang="en-US" altLang="en-US" sz="1100" b="0" i="0" u="none" strike="noStrike" cap="none" normalizeH="0" baseline="0">
+              <a:rPr kumimoji="0" lang="en-US" altLang="en-US" sz="1100" b="0" i="0" u="none" strike="noStrike" cap="none" normalizeH="0" baseline="0" dirty="0">
                 <a:ln>
                   <a:noFill/>
                 </a:ln>
@@ -4069,9 +4157,77 @@
                 <a:ea typeface="Calibri" panose="020F0502020204030204" pitchFamily="34" charset="0"/>
                 <a:cs typeface="Times New Roman" panose="02020603050405020304" pitchFamily="18" charset="0"/>
               </a:rPr>
-              <a:t>Come up with visualisation</a:t>
-            </a:r>
-            <a:endParaRPr kumimoji="0" lang="en-US" altLang="en-US" sz="1800" b="0" i="0" u="none" strike="noStrike" cap="none" normalizeH="0" baseline="0">
+              <a:t>Implement </a:t>
+            </a:r>
+            <a:r>
+              <a:rPr lang="en-US" altLang="en-US" sz="1100" dirty="0">
+                <a:latin typeface="Calibri" panose="020F0502020204030204" pitchFamily="34" charset="0"/>
+                <a:ea typeface="Calibri" panose="020F0502020204030204" pitchFamily="34" charset="0"/>
+                <a:cs typeface="Times New Roman" panose="02020603050405020304" pitchFamily="18" charset="0"/>
+              </a:rPr>
+              <a:t>using</a:t>
+            </a:r>
+            <a:r>
+              <a:rPr kumimoji="0" lang="en-US" altLang="en-US" sz="1100" b="0" i="0" u="none" strike="noStrike" cap="none" normalizeH="0" baseline="0" dirty="0">
+                <a:ln>
+                  <a:noFill/>
+                </a:ln>
+                <a:solidFill>
+                  <a:schemeClr val="tx1"/>
+                </a:solidFill>
+                <a:effectLst/>
+                <a:latin typeface="Calibri" panose="020F0502020204030204" pitchFamily="34" charset="0"/>
+                <a:ea typeface="Calibri" panose="020F0502020204030204" pitchFamily="34" charset="0"/>
+                <a:cs typeface="Times New Roman" panose="02020603050405020304" pitchFamily="18" charset="0"/>
+              </a:rPr>
+              <a:t> </a:t>
+            </a:r>
+            <a:r>
+              <a:rPr kumimoji="0" lang="en-US" altLang="en-US" sz="1100" b="0" i="0" u="none" strike="noStrike" cap="none" normalizeH="0" baseline="0" dirty="0" err="1">
+                <a:ln>
+                  <a:noFill/>
+                </a:ln>
+                <a:solidFill>
+                  <a:schemeClr val="tx1"/>
+                </a:solidFill>
+                <a:effectLst/>
+                <a:latin typeface="Calibri" panose="020F0502020204030204" pitchFamily="34" charset="0"/>
+                <a:ea typeface="Calibri" panose="020F0502020204030204" pitchFamily="34" charset="0"/>
+                <a:cs typeface="Times New Roman" panose="02020603050405020304" pitchFamily="18" charset="0"/>
+              </a:rPr>
+              <a:t>Pyjama</a:t>
+            </a:r>
+            <a:r>
+              <a:rPr kumimoji="0" lang="en-US" altLang="en-US" sz="1100" b="0" i="0" u="none" strike="noStrike" cap="none" normalizeH="0" baseline="0" dirty="0">
+                <a:ln>
+                  <a:noFill/>
+                </a:ln>
+                <a:solidFill>
+                  <a:schemeClr val="tx1"/>
+                </a:solidFill>
+                <a:effectLst/>
+                <a:latin typeface="Calibri" panose="020F0502020204030204" pitchFamily="34" charset="0"/>
+                <a:ea typeface="Calibri" panose="020F0502020204030204" pitchFamily="34" charset="0"/>
+                <a:cs typeface="Times New Roman" panose="02020603050405020304" pitchFamily="18" charset="0"/>
+              </a:rPr>
+              <a:t> or </a:t>
+            </a:r>
+            <a:r>
+              <a:rPr kumimoji="0" lang="en-US" altLang="en-US" sz="1100" b="0" i="0" u="none" strike="noStrike" cap="none" normalizeH="0" baseline="0" dirty="0" err="1">
+                <a:ln>
+                  <a:noFill/>
+                </a:ln>
+                <a:solidFill>
+                  <a:schemeClr val="tx1"/>
+                </a:solidFill>
+                <a:effectLst/>
+                <a:latin typeface="Calibri" panose="020F0502020204030204" pitchFamily="34" charset="0"/>
+                <a:ea typeface="Calibri" panose="020F0502020204030204" pitchFamily="34" charset="0"/>
+                <a:cs typeface="Times New Roman" panose="02020603050405020304" pitchFamily="18" charset="0"/>
+              </a:rPr>
+              <a:t>Paratask</a:t>
+            </a:r>
+            <a:endParaRPr kumimoji="0" lang="en-US" altLang="en-US" sz="1800" b="0" i="0" u="none" strike="noStrike" cap="none" normalizeH="0" baseline="0" dirty="0">
               <a:ln>
                 <a:noFill/>
               </a:ln>
@@ -4086,7 +4242,7 @@
       </p:sp>
       <p:sp>
         <p:nvSpPr>
-          <p:cNvPr id="18" name="Text Box 16"/>
+          <p:cNvPr id="22" name="Text Box 20"/>
           <p:cNvSpPr txBox="1">
             <a:spLocks noChangeArrowheads="1"/>
           </p:cNvSpPr>
@@ -4094,7 +4250,7 @@
         </p:nvSpPr>
         <p:spPr bwMode="auto">
           <a:xfrm>
-            <a:off x="9524634" y="4600450"/>
+            <a:off x="6325211" y="4068786"/>
             <a:ext cx="1257300" cy="601663"/>
           </a:xfrm>
           <a:prstGeom prst="rect">
@@ -4149,7 +4305,7 @@
                 <a:ea typeface="Calibri" panose="020F0502020204030204" pitchFamily="34" charset="0"/>
                 <a:cs typeface="Times New Roman" panose="02020603050405020304" pitchFamily="18" charset="0"/>
               </a:rPr>
-              <a:t>Implement Visualisation</a:t>
+              <a:t>Research parallelisation</a:t>
             </a:r>
             <a:endParaRPr kumimoji="0" lang="en-US" altLang="en-US" sz="1800" b="0" i="0" u="none" strike="noStrike" cap="none" normalizeH="0" baseline="0">
               <a:ln>
@@ -4166,326 +4322,6 @@
       </p:sp>
       <p:sp>
         <p:nvSpPr>
-          <p:cNvPr id="19" name="Text Box 17"/>
-          <p:cNvSpPr txBox="1">
-            <a:spLocks noChangeArrowheads="1"/>
-          </p:cNvSpPr>
-          <p:nvPr/>
-        </p:nvSpPr>
-        <p:spPr bwMode="auto">
-          <a:xfrm>
-            <a:off x="4010636" y="4600450"/>
-            <a:ext cx="1257300" cy="669925"/>
-          </a:xfrm>
-          <a:prstGeom prst="rect">
-            <a:avLst/>
-          </a:prstGeom>
-          <a:solidFill>
-            <a:srgbClr val="FFFFFF"/>
-          </a:solidFill>
-          <a:ln w="6350">
-            <a:solidFill>
-              <a:srgbClr val="000000"/>
-            </a:solidFill>
-            <a:miter lim="800000"/>
-            <a:headEnd/>
-            <a:tailEnd/>
-          </a:ln>
-        </p:spPr>
-        <p:txBody>
-          <a:bodyPr vert="horz" wrap="square" lIns="91440" tIns="45720" rIns="91440" bIns="45720" numCol="1" anchor="ctr" anchorCtr="0" compatLnSpc="1">
-            <a:prstTxWarp prst="textNoShape">
-              <a:avLst/>
-            </a:prstTxWarp>
-          </a:bodyPr>
-          <a:lstStyle/>
-          <a:p>
-            <a:pPr marL="0" marR="0" lvl="0" indent="0" algn="ctr" defTabSz="914400" rtl="0" eaLnBrk="0" fontAlgn="base" latinLnBrk="0" hangingPunct="0">
-              <a:lnSpc>
-                <a:spcPct val="100000"/>
-              </a:lnSpc>
-              <a:spcBef>
-                <a:spcPct val="0"/>
-              </a:spcBef>
-              <a:spcAft>
-                <a:spcPct val="0"/>
-              </a:spcAft>
-              <a:buClrTx/>
-              <a:buSzTx/>
-              <a:buFontTx/>
-              <a:buNone/>
-              <a:tabLst/>
-            </a:pPr>
-            <a:r>
-              <a:rPr kumimoji="0" lang="en-US" altLang="en-US" sz="1100" b="0" i="0" u="none" strike="noStrike" cap="none" normalizeH="0" baseline="0">
-                <a:ln>
-                  <a:noFill/>
-                </a:ln>
-                <a:solidFill>
-                  <a:schemeClr val="tx1"/>
-                </a:solidFill>
-                <a:effectLst/>
-                <a:latin typeface="Calibri" panose="020F0502020204030204" pitchFamily="34" charset="0"/>
-                <a:ea typeface="Calibri" panose="020F0502020204030204" pitchFamily="34" charset="0"/>
-                <a:cs typeface="Times New Roman" panose="02020603050405020304" pitchFamily="18" charset="0"/>
-              </a:rPr>
-              <a:t>Rewrite code to consider all possible solutions</a:t>
-            </a:r>
-            <a:endParaRPr kumimoji="0" lang="en-US" altLang="en-US" sz="1800" b="0" i="0" u="none" strike="noStrike" cap="none" normalizeH="0" baseline="0">
-              <a:ln>
-                <a:noFill/>
-              </a:ln>
-              <a:solidFill>
-                <a:schemeClr val="tx1"/>
-              </a:solidFill>
-              <a:effectLst/>
-              <a:latin typeface="Arial" panose="020B0604020202020204" pitchFamily="34" charset="0"/>
-            </a:endParaRPr>
-          </a:p>
-        </p:txBody>
-      </p:sp>
-      <p:sp>
-        <p:nvSpPr>
-          <p:cNvPr id="20" name="Text Box 18"/>
-          <p:cNvSpPr txBox="1">
-            <a:spLocks noChangeArrowheads="1"/>
-          </p:cNvSpPr>
-          <p:nvPr/>
-        </p:nvSpPr>
-        <p:spPr bwMode="auto">
-          <a:xfrm>
-            <a:off x="4004286" y="5659313"/>
-            <a:ext cx="1257300" cy="639762"/>
-          </a:xfrm>
-          <a:prstGeom prst="rect">
-            <a:avLst/>
-          </a:prstGeom>
-          <a:solidFill>
-            <a:srgbClr val="FFFFFF"/>
-          </a:solidFill>
-          <a:ln w="6350">
-            <a:solidFill>
-              <a:srgbClr val="000000"/>
-            </a:solidFill>
-            <a:miter lim="800000"/>
-            <a:headEnd/>
-            <a:tailEnd/>
-          </a:ln>
-        </p:spPr>
-        <p:txBody>
-          <a:bodyPr vert="horz" wrap="square" lIns="91440" tIns="45720" rIns="91440" bIns="45720" numCol="1" anchor="ctr" anchorCtr="0" compatLnSpc="1">
-            <a:prstTxWarp prst="textNoShape">
-              <a:avLst/>
-            </a:prstTxWarp>
-          </a:bodyPr>
-          <a:lstStyle/>
-          <a:p>
-            <a:pPr marL="0" marR="0" lvl="0" indent="0" algn="ctr" defTabSz="914400" rtl="0" eaLnBrk="0" fontAlgn="base" latinLnBrk="0" hangingPunct="0">
-              <a:lnSpc>
-                <a:spcPct val="100000"/>
-              </a:lnSpc>
-              <a:spcBef>
-                <a:spcPct val="0"/>
-              </a:spcBef>
-              <a:spcAft>
-                <a:spcPct val="0"/>
-              </a:spcAft>
-              <a:buClrTx/>
-              <a:buSzTx/>
-              <a:buFontTx/>
-              <a:buNone/>
-              <a:tabLst/>
-            </a:pPr>
-            <a:r>
-              <a:rPr kumimoji="0" lang="en-US" altLang="en-US" sz="1100" b="0" i="0" u="none" strike="noStrike" cap="none" normalizeH="0" baseline="0">
-                <a:ln>
-                  <a:noFill/>
-                </a:ln>
-                <a:solidFill>
-                  <a:schemeClr val="tx1"/>
-                </a:solidFill>
-                <a:effectLst/>
-                <a:latin typeface="Calibri" panose="020F0502020204030204" pitchFamily="34" charset="0"/>
-                <a:ea typeface="Calibri" panose="020F0502020204030204" pitchFamily="34" charset="0"/>
-                <a:cs typeface="Times New Roman" panose="02020603050405020304" pitchFamily="18" charset="0"/>
-              </a:rPr>
-              <a:t>Use depth first branch and bound algorithm</a:t>
-            </a:r>
-            <a:endParaRPr kumimoji="0" lang="en-US" altLang="en-US" sz="1800" b="0" i="0" u="none" strike="noStrike" cap="none" normalizeH="0" baseline="0">
-              <a:ln>
-                <a:noFill/>
-              </a:ln>
-              <a:solidFill>
-                <a:schemeClr val="tx1"/>
-              </a:solidFill>
-              <a:effectLst/>
-              <a:latin typeface="Arial" panose="020B0604020202020204" pitchFamily="34" charset="0"/>
-            </a:endParaRPr>
-          </a:p>
-        </p:txBody>
-      </p:sp>
-      <p:sp>
-        <p:nvSpPr>
-          <p:cNvPr id="21" name="Text Box 19"/>
-          <p:cNvSpPr txBox="1">
-            <a:spLocks noChangeArrowheads="1"/>
-          </p:cNvSpPr>
-          <p:nvPr/>
-        </p:nvSpPr>
-        <p:spPr bwMode="auto">
-          <a:xfrm>
-            <a:off x="8145638" y="5487066"/>
-            <a:ext cx="1257300" cy="815975"/>
-          </a:xfrm>
-          <a:prstGeom prst="rect">
-            <a:avLst/>
-          </a:prstGeom>
-          <a:solidFill>
-            <a:srgbClr val="FFFFFF"/>
-          </a:solidFill>
-          <a:ln w="6350">
-            <a:solidFill>
-              <a:srgbClr val="000000"/>
-            </a:solidFill>
-            <a:miter lim="800000"/>
-            <a:headEnd/>
-            <a:tailEnd/>
-          </a:ln>
-        </p:spPr>
-        <p:txBody>
-          <a:bodyPr vert="horz" wrap="square" lIns="91440" tIns="45720" rIns="91440" bIns="45720" numCol="1" anchor="ctr" anchorCtr="0" compatLnSpc="1">
-            <a:prstTxWarp prst="textNoShape">
-              <a:avLst/>
-            </a:prstTxWarp>
-          </a:bodyPr>
-          <a:lstStyle/>
-          <a:p>
-            <a:pPr marL="0" marR="0" lvl="0" indent="0" algn="ctr" defTabSz="914400" rtl="0" eaLnBrk="0" fontAlgn="base" latinLnBrk="0" hangingPunct="0">
-              <a:lnSpc>
-                <a:spcPct val="100000"/>
-              </a:lnSpc>
-              <a:spcBef>
-                <a:spcPct val="0"/>
-              </a:spcBef>
-              <a:spcAft>
-                <a:spcPct val="0"/>
-              </a:spcAft>
-              <a:buClrTx/>
-              <a:buSzTx/>
-              <a:buFontTx/>
-              <a:buNone/>
-              <a:tabLst/>
-            </a:pPr>
-            <a:r>
-              <a:rPr kumimoji="0" lang="en-US" altLang="en-US" sz="1100" b="0" i="0" u="none" strike="noStrike" cap="none" normalizeH="0" baseline="0">
-                <a:ln>
-                  <a:noFill/>
-                </a:ln>
-                <a:solidFill>
-                  <a:schemeClr val="tx1"/>
-                </a:solidFill>
-                <a:effectLst/>
-                <a:latin typeface="Calibri" panose="020F0502020204030204" pitchFamily="34" charset="0"/>
-                <a:ea typeface="Calibri" panose="020F0502020204030204" pitchFamily="34" charset="0"/>
-                <a:cs typeface="Times New Roman" panose="02020603050405020304" pitchFamily="18" charset="0"/>
-              </a:rPr>
-              <a:t>Implement Parallel version in Pyjama or Paratastic</a:t>
-            </a:r>
-            <a:endParaRPr kumimoji="0" lang="en-US" altLang="en-US" sz="1800" b="0" i="0" u="none" strike="noStrike" cap="none" normalizeH="0" baseline="0">
-              <a:ln>
-                <a:noFill/>
-              </a:ln>
-              <a:solidFill>
-                <a:schemeClr val="tx1"/>
-              </a:solidFill>
-              <a:effectLst/>
-              <a:latin typeface="Arial" panose="020B0604020202020204" pitchFamily="34" charset="0"/>
-            </a:endParaRPr>
-          </a:p>
-        </p:txBody>
-      </p:sp>
-      <p:sp>
-        <p:nvSpPr>
-          <p:cNvPr id="22" name="Text Box 20"/>
-          <p:cNvSpPr txBox="1">
-            <a:spLocks noChangeArrowheads="1"/>
-          </p:cNvSpPr>
-          <p:nvPr/>
-        </p:nvSpPr>
-        <p:spPr bwMode="auto">
-          <a:xfrm>
-            <a:off x="6005146" y="5057650"/>
-            <a:ext cx="1257300" cy="601663"/>
-          </a:xfrm>
-          <a:prstGeom prst="rect">
-            <a:avLst/>
-          </a:prstGeom>
-          <a:solidFill>
-            <a:srgbClr val="FFFFFF"/>
-          </a:solidFill>
-          <a:ln w="6350">
-            <a:solidFill>
-              <a:srgbClr val="000000"/>
-            </a:solidFill>
-            <a:miter lim="800000"/>
-            <a:headEnd/>
-            <a:tailEnd/>
-          </a:ln>
-        </p:spPr>
-        <p:txBody>
-          <a:bodyPr vert="horz" wrap="square" lIns="91440" tIns="45720" rIns="91440" bIns="45720" numCol="1" anchor="ctr" anchorCtr="0" compatLnSpc="1">
-            <a:prstTxWarp prst="textNoShape">
-              <a:avLst/>
-            </a:prstTxWarp>
-          </a:bodyPr>
-          <a:lstStyle/>
-          <a:p>
-            <a:pPr marL="0" marR="0" lvl="0" indent="0" algn="ctr" defTabSz="914400" rtl="0" eaLnBrk="0" fontAlgn="base" latinLnBrk="0" hangingPunct="0">
-              <a:lnSpc>
-                <a:spcPct val="100000"/>
-              </a:lnSpc>
-              <a:spcBef>
-                <a:spcPct val="0"/>
-              </a:spcBef>
-              <a:spcAft>
-                <a:spcPct val="0"/>
-              </a:spcAft>
-              <a:buClrTx/>
-              <a:buSzTx/>
-              <a:buFontTx/>
-              <a:buNone/>
-              <a:tabLst/>
-            </a:pPr>
-            <a:r>
-              <a:rPr kumimoji="0" lang="en-US" altLang="en-US" sz="1100" b="0" i="0" u="none" strike="noStrike" cap="none" normalizeH="0" baseline="0">
-                <a:ln>
-                  <a:noFill/>
-                </a:ln>
-                <a:solidFill>
-                  <a:schemeClr val="tx1"/>
-                </a:solidFill>
-                <a:effectLst/>
-                <a:latin typeface="Calibri" panose="020F0502020204030204" pitchFamily="34" charset="0"/>
-                <a:ea typeface="Calibri" panose="020F0502020204030204" pitchFamily="34" charset="0"/>
-                <a:cs typeface="Times New Roman" panose="02020603050405020304" pitchFamily="18" charset="0"/>
-              </a:rPr>
-              <a:t>Research parallelisation</a:t>
-            </a:r>
-            <a:endParaRPr kumimoji="0" lang="en-US" altLang="en-US" sz="1800" b="0" i="0" u="none" strike="noStrike" cap="none" normalizeH="0" baseline="0">
-              <a:ln>
-                <a:noFill/>
-              </a:ln>
-              <a:solidFill>
-                <a:schemeClr val="tx1"/>
-              </a:solidFill>
-              <a:effectLst/>
-              <a:latin typeface="Arial" panose="020B0604020202020204" pitchFamily="34" charset="0"/>
-            </a:endParaRPr>
-          </a:p>
-        </p:txBody>
-      </p:sp>
-      <p:sp>
-        <p:nvSpPr>
           <p:cNvPr id="23" name="Text Box 21"/>
           <p:cNvSpPr txBox="1">
             <a:spLocks noChangeArrowheads="1"/>
@@ -4494,7 +4330,7 @@
         </p:nvSpPr>
         <p:spPr bwMode="auto">
           <a:xfrm>
-            <a:off x="6005146" y="6144602"/>
+            <a:off x="6325211" y="5155738"/>
             <a:ext cx="1257300" cy="601663"/>
           </a:xfrm>
           <a:prstGeom prst="rect">
@@ -4735,190 +4571,78 @@
           </a:fontRef>
         </p:style>
       </p:cxnSp>
-      <p:grpSp>
-        <p:nvGrpSpPr>
-          <p:cNvPr id="61" name="Group 60"/>
-          <p:cNvGrpSpPr/>
+      <p:cxnSp>
+        <p:nvCxnSpPr>
+          <p:cNvPr id="55" name="Straight Connector 54"/>
+          <p:cNvCxnSpPr>
+            <a:endCxn id="9" idx="1"/>
+          </p:cNvCxnSpPr>
           <p:nvPr/>
-        </p:nvGrpSpPr>
-        <p:grpSpPr>
+        </p:nvCxnSpPr>
+        <p:spPr>
           <a:xfrm>
-            <a:off x="1392055" y="1749669"/>
-            <a:ext cx="838476" cy="2250832"/>
-            <a:chOff x="1392055" y="1749669"/>
-            <a:chExt cx="838476" cy="2250832"/>
-          </a:xfrm>
-        </p:grpSpPr>
-        <p:cxnSp>
-          <p:nvCxnSpPr>
-            <p:cNvPr id="48" name="Straight Connector 47"/>
-            <p:cNvCxnSpPr>
-              <a:stCxn id="11" idx="1"/>
-            </p:cNvCxnSpPr>
-            <p:nvPr/>
-          </p:nvCxnSpPr>
-          <p:spPr>
-            <a:xfrm flipH="1" flipV="1">
-              <a:off x="1392055" y="3998118"/>
-              <a:ext cx="837406" cy="1"/>
-            </a:xfrm>
-            <a:prstGeom prst="line">
-              <a:avLst/>
-            </a:prstGeom>
-            <a:ln w="28575">
-              <a:headEnd type="triangle" w="med" len="med"/>
-              <a:tailEnd type="none" w="med" len="med"/>
-            </a:ln>
-          </p:spPr>
-          <p:style>
-            <a:lnRef idx="1">
-              <a:schemeClr val="dk1"/>
-            </a:lnRef>
-            <a:fillRef idx="0">
-              <a:schemeClr val="dk1"/>
-            </a:fillRef>
-            <a:effectRef idx="0">
-              <a:schemeClr val="dk1"/>
-            </a:effectRef>
-            <a:fontRef idx="minor">
-              <a:schemeClr val="tx1"/>
-            </a:fontRef>
-          </p:style>
-        </p:cxnSp>
-        <p:cxnSp>
-          <p:nvCxnSpPr>
-            <p:cNvPr id="44" name="Straight Connector 43"/>
-            <p:cNvCxnSpPr/>
-            <p:nvPr/>
-          </p:nvCxnSpPr>
-          <p:spPr>
-            <a:xfrm flipH="1" flipV="1">
-              <a:off x="1393125" y="1749669"/>
-              <a:ext cx="837406" cy="550"/>
-            </a:xfrm>
-            <a:prstGeom prst="line">
-              <a:avLst/>
-            </a:prstGeom>
-            <a:ln w="28575">
-              <a:headEnd type="triangle" w="med" len="med"/>
-              <a:tailEnd type="none" w="med" len="med"/>
-            </a:ln>
-          </p:spPr>
-          <p:style>
-            <a:lnRef idx="1">
-              <a:schemeClr val="dk1"/>
-            </a:lnRef>
-            <a:fillRef idx="0">
-              <a:schemeClr val="dk1"/>
-            </a:fillRef>
-            <a:effectRef idx="0">
-              <a:schemeClr val="dk1"/>
-            </a:effectRef>
-            <a:fontRef idx="minor">
-              <a:schemeClr val="tx1"/>
-            </a:fontRef>
-          </p:style>
-        </p:cxnSp>
-        <p:cxnSp>
-          <p:nvCxnSpPr>
-            <p:cNvPr id="45" name="Straight Connector 44"/>
-            <p:cNvCxnSpPr/>
-            <p:nvPr/>
-          </p:nvCxnSpPr>
-          <p:spPr>
-            <a:xfrm flipV="1">
-              <a:off x="1392055" y="1749669"/>
-              <a:ext cx="0" cy="2250832"/>
-            </a:xfrm>
-            <a:prstGeom prst="line">
-              <a:avLst/>
-            </a:prstGeom>
-            <a:ln w="28575"/>
-          </p:spPr>
-          <p:style>
-            <a:lnRef idx="1">
-              <a:schemeClr val="dk1"/>
-            </a:lnRef>
-            <a:fillRef idx="0">
-              <a:schemeClr val="dk1"/>
-            </a:fillRef>
-            <a:effectRef idx="0">
-              <a:schemeClr val="dk1"/>
-            </a:effectRef>
-            <a:fontRef idx="minor">
-              <a:schemeClr val="tx1"/>
-            </a:fontRef>
-          </p:style>
-        </p:cxnSp>
-        <p:cxnSp>
-          <p:nvCxnSpPr>
-            <p:cNvPr id="55" name="Straight Connector 54"/>
-            <p:cNvCxnSpPr/>
-            <p:nvPr/>
-          </p:nvCxnSpPr>
-          <p:spPr>
-            <a:xfrm flipV="1">
-              <a:off x="1396817" y="2518568"/>
-              <a:ext cx="827881" cy="1"/>
-            </a:xfrm>
-            <a:prstGeom prst="line">
-              <a:avLst/>
-            </a:prstGeom>
-            <a:ln w="28575">
-              <a:headEnd type="none" w="med" len="med"/>
-              <a:tailEnd type="triangle" w="med" len="med"/>
-            </a:ln>
-          </p:spPr>
-          <p:style>
-            <a:lnRef idx="1">
-              <a:schemeClr val="dk1"/>
-            </a:lnRef>
-            <a:fillRef idx="0">
-              <a:schemeClr val="dk1"/>
-            </a:fillRef>
-            <a:effectRef idx="0">
-              <a:schemeClr val="dk1"/>
-            </a:effectRef>
-            <a:fontRef idx="minor">
-              <a:schemeClr val="tx1"/>
-            </a:fontRef>
-          </p:style>
-        </p:cxnSp>
-        <p:cxnSp>
-          <p:nvCxnSpPr>
-            <p:cNvPr id="58" name="Straight Connector 57"/>
-            <p:cNvCxnSpPr/>
-            <p:nvPr/>
-          </p:nvCxnSpPr>
-          <p:spPr>
-            <a:xfrm flipH="1">
-              <a:off x="1401580" y="3274218"/>
-              <a:ext cx="827881" cy="12149"/>
-            </a:xfrm>
-            <a:prstGeom prst="line">
-              <a:avLst/>
-            </a:prstGeom>
-            <a:ln w="28575">
-              <a:headEnd type="triangle" w="med" len="med"/>
-              <a:tailEnd type="none" w="med" len="med"/>
-            </a:ln>
-          </p:spPr>
-          <p:style>
-            <a:lnRef idx="1">
-              <a:schemeClr val="dk1"/>
-            </a:lnRef>
-            <a:fillRef idx="0">
-              <a:schemeClr val="dk1"/>
-            </a:fillRef>
-            <a:effectRef idx="0">
-              <a:schemeClr val="dk1"/>
-            </a:effectRef>
-            <a:fontRef idx="minor">
-              <a:schemeClr val="tx1"/>
-            </a:fontRef>
-          </p:style>
-        </p:cxnSp>
-      </p:grpSp>
+            <a:off x="1401581" y="2518568"/>
+            <a:ext cx="827880" cy="1"/>
+          </a:xfrm>
+          <a:prstGeom prst="line">
+            <a:avLst/>
+          </a:prstGeom>
+          <a:ln w="28575">
+            <a:headEnd type="none" w="med" len="med"/>
+            <a:tailEnd type="triangle" w="med" len="med"/>
+          </a:ln>
+        </p:spPr>
+        <p:style>
+          <a:lnRef idx="1">
+            <a:schemeClr val="dk1"/>
+          </a:lnRef>
+          <a:fillRef idx="0">
+            <a:schemeClr val="dk1"/>
+          </a:fillRef>
+          <a:effectRef idx="0">
+            <a:schemeClr val="dk1"/>
+          </a:effectRef>
+          <a:fontRef idx="minor">
+            <a:schemeClr val="tx1"/>
+          </a:fontRef>
+        </p:style>
+      </p:cxnSp>
+      <p:cxnSp>
+        <p:nvCxnSpPr>
+          <p:cNvPr id="58" name="Straight Connector 57"/>
+          <p:cNvCxnSpPr>
+            <a:stCxn id="13" idx="1"/>
+          </p:cNvCxnSpPr>
+          <p:nvPr/>
+        </p:nvCxnSpPr>
+        <p:spPr>
+          <a:xfrm flipH="1">
+            <a:off x="1401581" y="3241093"/>
+            <a:ext cx="837404" cy="12149"/>
+          </a:xfrm>
+          <a:prstGeom prst="line">
+            <a:avLst/>
+          </a:prstGeom>
+          <a:ln w="28575">
+            <a:headEnd type="triangle" w="med" len="med"/>
+            <a:tailEnd type="none" w="med" len="med"/>
+          </a:ln>
+        </p:spPr>
+        <p:style>
+          <a:lnRef idx="1">
+            <a:schemeClr val="dk1"/>
+          </a:lnRef>
+          <a:fillRef idx="0">
+            <a:schemeClr val="dk1"/>
+          </a:fillRef>
+          <a:effectRef idx="0">
+            <a:schemeClr val="dk1"/>
+          </a:effectRef>
+          <a:fontRef idx="minor">
+            <a:schemeClr val="tx1"/>
+          </a:fontRef>
+        </p:style>
+      </p:cxnSp>
       <p:grpSp>
         <p:nvGrpSpPr>
           <p:cNvPr id="67" name="Group 66"/>
@@ -5004,17 +4728,17 @@
       </p:grpSp>
       <p:cxnSp>
         <p:nvCxnSpPr>
-          <p:cNvPr id="68" name="Straight Arrow Connector 67"/>
+          <p:cNvPr id="77" name="Straight Arrow Connector 76"/>
           <p:cNvCxnSpPr>
-            <a:stCxn id="9" idx="3"/>
-            <a:endCxn id="12" idx="1"/>
+            <a:stCxn id="15" idx="3"/>
+            <a:endCxn id="16" idx="1"/>
           </p:cNvCxnSpPr>
           <p:nvPr/>
         </p:nvCxnSpPr>
         <p:spPr>
           <a:xfrm>
-            <a:off x="3486761" y="2518569"/>
-            <a:ext cx="487362" cy="0"/>
+            <a:off x="5519370" y="2871143"/>
+            <a:ext cx="487362" cy="1"/>
           </a:xfrm>
           <a:prstGeom prst="straightConnector1">
             <a:avLst/>
@@ -5040,285 +4764,22 @@
       </p:cxnSp>
       <p:cxnSp>
         <p:nvCxnSpPr>
-          <p:cNvPr id="71" name="Straight Arrow Connector 70"/>
-          <p:cNvCxnSpPr>
-            <a:stCxn id="11" idx="3"/>
-            <a:endCxn id="14" idx="1"/>
-          </p:cNvCxnSpPr>
-          <p:nvPr/>
-        </p:nvCxnSpPr>
-        <p:spPr>
-          <a:xfrm>
-            <a:off x="3486761" y="3998119"/>
-            <a:ext cx="517525" cy="6350"/>
-          </a:xfrm>
-          <a:prstGeom prst="straightConnector1">
-            <a:avLst/>
-          </a:prstGeom>
-          <a:ln w="28575">
-            <a:tailEnd type="triangle"/>
-          </a:ln>
-        </p:spPr>
-        <p:style>
-          <a:lnRef idx="1">
-            <a:schemeClr val="dk1"/>
-          </a:lnRef>
-          <a:fillRef idx="0">
-            <a:schemeClr val="dk1"/>
-          </a:fillRef>
-          <a:effectRef idx="0">
-            <a:schemeClr val="dk1"/>
-          </a:effectRef>
-          <a:fontRef idx="minor">
-            <a:schemeClr val="tx1"/>
-          </a:fontRef>
-        </p:style>
-      </p:cxnSp>
-      <p:cxnSp>
-        <p:nvCxnSpPr>
-          <p:cNvPr id="74" name="Straight Arrow Connector 73"/>
-          <p:cNvCxnSpPr>
-            <a:stCxn id="10" idx="3"/>
-            <a:endCxn id="13" idx="1"/>
-          </p:cNvCxnSpPr>
-          <p:nvPr/>
-        </p:nvCxnSpPr>
-        <p:spPr>
-          <a:xfrm flipV="1">
-            <a:off x="3486761" y="3264694"/>
-            <a:ext cx="495300" cy="9525"/>
-          </a:xfrm>
-          <a:prstGeom prst="straightConnector1">
-            <a:avLst/>
-          </a:prstGeom>
-          <a:ln w="28575">
-            <a:tailEnd type="triangle"/>
-          </a:ln>
-        </p:spPr>
-        <p:style>
-          <a:lnRef idx="1">
-            <a:schemeClr val="dk1"/>
-          </a:lnRef>
-          <a:fillRef idx="0">
-            <a:schemeClr val="dk1"/>
-          </a:fillRef>
-          <a:effectRef idx="0">
-            <a:schemeClr val="dk1"/>
-          </a:effectRef>
-          <a:fontRef idx="minor">
-            <a:schemeClr val="tx1"/>
-          </a:fontRef>
-        </p:style>
-      </p:cxnSp>
-      <p:cxnSp>
-        <p:nvCxnSpPr>
-          <p:cNvPr id="77" name="Straight Arrow Connector 76"/>
-          <p:cNvCxnSpPr>
-            <a:stCxn id="15" idx="3"/>
-            <a:endCxn id="16" idx="1"/>
-          </p:cNvCxnSpPr>
-          <p:nvPr/>
-        </p:nvCxnSpPr>
-        <p:spPr>
-          <a:xfrm>
-            <a:off x="7262446" y="2894744"/>
-            <a:ext cx="487362" cy="1"/>
-          </a:xfrm>
-          <a:prstGeom prst="straightConnector1">
-            <a:avLst/>
-          </a:prstGeom>
-          <a:ln w="28575">
-            <a:tailEnd type="triangle"/>
-          </a:ln>
-        </p:spPr>
-        <p:style>
-          <a:lnRef idx="1">
-            <a:schemeClr val="dk1"/>
-          </a:lnRef>
-          <a:fillRef idx="0">
-            <a:schemeClr val="dk1"/>
-          </a:fillRef>
-          <a:effectRef idx="0">
-            <a:schemeClr val="dk1"/>
-          </a:effectRef>
-          <a:fontRef idx="minor">
-            <a:schemeClr val="tx1"/>
-          </a:fontRef>
-        </p:style>
-      </p:cxnSp>
-      <p:grpSp>
-        <p:nvGrpSpPr>
-          <p:cNvPr id="87" name="Group 86"/>
-          <p:cNvGrpSpPr/>
-          <p:nvPr/>
-        </p:nvGrpSpPr>
-        <p:grpSpPr>
-          <a:xfrm>
-            <a:off x="5231423" y="2518569"/>
-            <a:ext cx="773723" cy="746125"/>
-            <a:chOff x="5231423" y="2518569"/>
-            <a:chExt cx="773723" cy="746125"/>
-          </a:xfrm>
-        </p:grpSpPr>
-        <p:cxnSp>
-          <p:nvCxnSpPr>
-            <p:cNvPr id="83" name="Elbow Connector 82"/>
-            <p:cNvCxnSpPr>
-              <a:stCxn id="12" idx="3"/>
-              <a:endCxn id="15" idx="1"/>
-            </p:cNvCxnSpPr>
-            <p:nvPr/>
-          </p:nvCxnSpPr>
-          <p:spPr>
-            <a:xfrm>
-              <a:off x="5231423" y="2518569"/>
-              <a:ext cx="773723" cy="376175"/>
-            </a:xfrm>
-            <a:prstGeom prst="bentConnector3">
-              <a:avLst/>
-            </a:prstGeom>
-            <a:ln w="28575">
-              <a:tailEnd type="triangle"/>
-            </a:ln>
-          </p:spPr>
-          <p:style>
-            <a:lnRef idx="1">
-              <a:schemeClr val="dk1"/>
-            </a:lnRef>
-            <a:fillRef idx="0">
-              <a:schemeClr val="dk1"/>
-            </a:fillRef>
-            <a:effectRef idx="0">
-              <a:schemeClr val="dk1"/>
-            </a:effectRef>
-            <a:fontRef idx="minor">
-              <a:schemeClr val="tx1"/>
-            </a:fontRef>
-          </p:style>
-        </p:cxnSp>
-        <p:cxnSp>
-          <p:nvCxnSpPr>
-            <p:cNvPr id="86" name="Elbow Connector 85"/>
-            <p:cNvCxnSpPr>
-              <a:stCxn id="13" idx="3"/>
-              <a:endCxn id="15" idx="1"/>
-            </p:cNvCxnSpPr>
-            <p:nvPr/>
-          </p:nvCxnSpPr>
-          <p:spPr>
-            <a:xfrm flipV="1">
-              <a:off x="5239361" y="2894744"/>
-              <a:ext cx="765785" cy="369950"/>
-            </a:xfrm>
-            <a:prstGeom prst="bentConnector3">
-              <a:avLst/>
-            </a:prstGeom>
-            <a:ln w="28575"/>
-          </p:spPr>
-          <p:style>
-            <a:lnRef idx="1">
-              <a:schemeClr val="dk1"/>
-            </a:lnRef>
-            <a:fillRef idx="0">
-              <a:schemeClr val="dk1"/>
-            </a:fillRef>
-            <a:effectRef idx="0">
-              <a:schemeClr val="dk1"/>
-            </a:effectRef>
-            <a:fontRef idx="minor">
-              <a:schemeClr val="tx1"/>
-            </a:fontRef>
-          </p:style>
-        </p:cxnSp>
-      </p:grpSp>
-      <p:cxnSp>
-        <p:nvCxnSpPr>
           <p:cNvPr id="89" name="Elbow Connector 88"/>
           <p:cNvCxnSpPr>
             <a:stCxn id="16" idx="2"/>
-            <a:endCxn id="14" idx="3"/>
+            <a:endCxn id="11" idx="0"/>
           </p:cNvCxnSpPr>
           <p:nvPr/>
         </p:nvCxnSpPr>
         <p:spPr>
           <a:xfrm rot="5400000">
-            <a:off x="6415576" y="2041586"/>
-            <a:ext cx="808893" cy="3116872"/>
-          </a:xfrm>
-          <a:prstGeom prst="bentConnector2">
-            <a:avLst/>
-          </a:prstGeom>
-          <a:ln w="28575">
-            <a:tailEnd type="triangle"/>
-          </a:ln>
-        </p:spPr>
-        <p:style>
-          <a:lnRef idx="1">
-            <a:schemeClr val="dk1"/>
-          </a:lnRef>
-          <a:fillRef idx="0">
-            <a:schemeClr val="dk1"/>
-          </a:fillRef>
-          <a:effectRef idx="0">
-            <a:schemeClr val="dk1"/>
-          </a:effectRef>
-          <a:fontRef idx="minor">
-            <a:schemeClr val="tx1"/>
-          </a:fontRef>
-        </p:style>
-      </p:cxnSp>
-      <p:cxnSp>
-        <p:nvCxnSpPr>
-          <p:cNvPr id="91" name="Elbow Connector 90"/>
-          <p:cNvCxnSpPr>
-            <a:stCxn id="16" idx="2"/>
-            <a:endCxn id="17" idx="1"/>
-          </p:cNvCxnSpPr>
-          <p:nvPr/>
-        </p:nvCxnSpPr>
-        <p:spPr>
-          <a:xfrm rot="16200000" flipH="1">
-            <a:off x="8547100" y="3026934"/>
-            <a:ext cx="808893" cy="1146176"/>
-          </a:xfrm>
-          <a:prstGeom prst="bentConnector2">
-            <a:avLst/>
-          </a:prstGeom>
-          <a:ln w="28575">
-            <a:tailEnd type="triangle"/>
-          </a:ln>
-        </p:spPr>
-        <p:style>
-          <a:lnRef idx="1">
-            <a:schemeClr val="dk1"/>
-          </a:lnRef>
-          <a:fillRef idx="0">
-            <a:schemeClr val="dk1"/>
-          </a:fillRef>
-          <a:effectRef idx="0">
-            <a:schemeClr val="dk1"/>
-          </a:effectRef>
-          <a:fontRef idx="minor">
-            <a:schemeClr val="tx1"/>
-          </a:fontRef>
-        </p:style>
-      </p:cxnSp>
-      <p:cxnSp>
-        <p:nvCxnSpPr>
-          <p:cNvPr id="95" name="Straight Arrow Connector 94"/>
-          <p:cNvCxnSpPr>
-            <a:stCxn id="14" idx="2"/>
-            <a:endCxn id="19" idx="0"/>
-          </p:cNvCxnSpPr>
-          <p:nvPr/>
-        </p:nvCxnSpPr>
-        <p:spPr>
-          <a:xfrm>
-            <a:off x="4632936" y="4305300"/>
-            <a:ext cx="6350" cy="295150"/>
-          </a:xfrm>
-          <a:prstGeom prst="straightConnector1">
-            <a:avLst/>
+            <a:off x="3257322" y="1306709"/>
+            <a:ext cx="1512794" cy="5243326"/>
+          </a:xfrm>
+          <a:prstGeom prst="bentConnector3">
+            <a:avLst>
+              <a:gd name="adj1" fmla="val 50000"/>
+            </a:avLst>
           </a:prstGeom>
           <a:ln w="28575">
             <a:tailEnd type="triangle"/>
@@ -5350,41 +4811,8 @@
         </p:nvCxnSpPr>
         <p:spPr>
           <a:xfrm>
-            <a:off x="10153284" y="4305300"/>
+            <a:off x="8380045" y="2275161"/>
             <a:ext cx="0" cy="295150"/>
-          </a:xfrm>
-          <a:prstGeom prst="straightConnector1">
-            <a:avLst/>
-          </a:prstGeom>
-          <a:ln w="28575">
-            <a:tailEnd type="triangle"/>
-          </a:ln>
-        </p:spPr>
-        <p:style>
-          <a:lnRef idx="1">
-            <a:schemeClr val="dk1"/>
-          </a:lnRef>
-          <a:fillRef idx="0">
-            <a:schemeClr val="dk1"/>
-          </a:fillRef>
-          <a:effectRef idx="0">
-            <a:schemeClr val="dk1"/>
-          </a:effectRef>
-          <a:fontRef idx="minor">
-            <a:schemeClr val="tx1"/>
-          </a:fontRef>
-        </p:style>
-      </p:cxnSp>
-      <p:cxnSp>
-        <p:nvCxnSpPr>
-          <p:cNvPr id="101" name="Straight Arrow Connector 100"/>
-          <p:cNvCxnSpPr/>
-          <p:nvPr/>
-        </p:nvCxnSpPr>
-        <p:spPr>
-          <a:xfrm>
-            <a:off x="4610711" y="5280634"/>
-            <a:ext cx="6350" cy="454635"/>
           </a:xfrm>
           <a:prstGeom prst="straightConnector1">
             <a:avLst/>
@@ -5412,15 +4840,14 @@
         <p:nvCxnSpPr>
           <p:cNvPr id="109" name="Elbow Connector 108"/>
           <p:cNvCxnSpPr>
-            <a:stCxn id="20" idx="3"/>
             <a:endCxn id="22" idx="1"/>
           </p:cNvCxnSpPr>
           <p:nvPr/>
         </p:nvCxnSpPr>
         <p:spPr>
           <a:xfrm flipV="1">
-            <a:off x="5261586" y="5358482"/>
-            <a:ext cx="743560" cy="620712"/>
+            <a:off x="5581651" y="4369618"/>
+            <a:ext cx="743560" cy="640026"/>
           </a:xfrm>
           <a:prstGeom prst="bentConnector3">
             <a:avLst/>
@@ -5448,15 +4875,14 @@
         <p:nvCxnSpPr>
           <p:cNvPr id="111" name="Elbow Connector 110"/>
           <p:cNvCxnSpPr>
-            <a:stCxn id="20" idx="3"/>
             <a:endCxn id="23" idx="1"/>
           </p:cNvCxnSpPr>
           <p:nvPr/>
         </p:nvCxnSpPr>
         <p:spPr>
           <a:xfrm>
-            <a:off x="5261586" y="5979194"/>
-            <a:ext cx="743560" cy="466240"/>
+            <a:off x="5581651" y="5009644"/>
+            <a:ext cx="743560" cy="446926"/>
           </a:xfrm>
           <a:prstGeom prst="bentConnector3">
             <a:avLst/>
@@ -5488,7 +4914,7 @@
         </p:nvGrpSpPr>
         <p:grpSpPr>
           <a:xfrm>
-            <a:off x="7262446" y="5358482"/>
+            <a:off x="7582511" y="4369618"/>
             <a:ext cx="874223" cy="1086952"/>
             <a:chOff x="5231423" y="2518569"/>
             <a:chExt cx="773723" cy="746125"/>
@@ -5559,6 +4985,413 @@
           </p:style>
         </p:cxnSp>
       </p:grpSp>
+      <p:cxnSp>
+        <p:nvCxnSpPr>
+          <p:cNvPr id="39" name="Straight Connector 38"/>
+          <p:cNvCxnSpPr/>
+          <p:nvPr/>
+        </p:nvCxnSpPr>
+        <p:spPr>
+          <a:xfrm>
+            <a:off x="1392055" y="2518568"/>
+            <a:ext cx="9526" cy="734674"/>
+          </a:xfrm>
+          <a:prstGeom prst="line">
+            <a:avLst/>
+          </a:prstGeom>
+          <a:ln w="28575"/>
+        </p:spPr>
+        <p:style>
+          <a:lnRef idx="1">
+            <a:schemeClr val="dk1"/>
+          </a:lnRef>
+          <a:fillRef idx="0">
+            <a:schemeClr val="dk1"/>
+          </a:fillRef>
+          <a:effectRef idx="0">
+            <a:schemeClr val="dk1"/>
+          </a:effectRef>
+          <a:fontRef idx="minor">
+            <a:schemeClr val="tx1"/>
+          </a:fontRef>
+        </p:style>
+      </p:cxnSp>
+      <p:cxnSp>
+        <p:nvCxnSpPr>
+          <p:cNvPr id="43" name="Elbow Connector 42"/>
+          <p:cNvCxnSpPr>
+            <a:stCxn id="13" idx="3"/>
+            <a:endCxn id="15" idx="1"/>
+          </p:cNvCxnSpPr>
+          <p:nvPr/>
+        </p:nvCxnSpPr>
+        <p:spPr>
+          <a:xfrm flipV="1">
+            <a:off x="3496285" y="2871143"/>
+            <a:ext cx="765785" cy="369950"/>
+          </a:xfrm>
+          <a:prstGeom prst="bentConnector3">
+            <a:avLst>
+              <a:gd name="adj1" fmla="val 49205"/>
+            </a:avLst>
+          </a:prstGeom>
+          <a:ln w="28575"/>
+        </p:spPr>
+        <p:style>
+          <a:lnRef idx="1">
+            <a:schemeClr val="dk1"/>
+          </a:lnRef>
+          <a:fillRef idx="0">
+            <a:schemeClr val="dk1"/>
+          </a:fillRef>
+          <a:effectRef idx="0">
+            <a:schemeClr val="dk1"/>
+          </a:effectRef>
+          <a:fontRef idx="minor">
+            <a:schemeClr val="tx1"/>
+          </a:fontRef>
+        </p:style>
+      </p:cxnSp>
+      <p:cxnSp>
+        <p:nvCxnSpPr>
+          <p:cNvPr id="83" name="Elbow Connector 82"/>
+          <p:cNvCxnSpPr>
+            <a:stCxn id="9" idx="3"/>
+            <a:endCxn id="15" idx="1"/>
+          </p:cNvCxnSpPr>
+          <p:nvPr/>
+        </p:nvCxnSpPr>
+        <p:spPr>
+          <a:xfrm>
+            <a:off x="3486761" y="2518569"/>
+            <a:ext cx="775309" cy="352574"/>
+          </a:xfrm>
+          <a:prstGeom prst="bentConnector3">
+            <a:avLst/>
+          </a:prstGeom>
+          <a:ln w="28575">
+            <a:tailEnd type="triangle"/>
+          </a:ln>
+        </p:spPr>
+        <p:style>
+          <a:lnRef idx="1">
+            <a:schemeClr val="dk1"/>
+          </a:lnRef>
+          <a:fillRef idx="0">
+            <a:schemeClr val="dk1"/>
+          </a:fillRef>
+          <a:effectRef idx="0">
+            <a:schemeClr val="dk1"/>
+          </a:effectRef>
+          <a:fontRef idx="minor">
+            <a:schemeClr val="tx1"/>
+          </a:fontRef>
+        </p:style>
+      </p:cxnSp>
+      <p:cxnSp>
+        <p:nvCxnSpPr>
+          <p:cNvPr id="72" name="Straight Arrow Connector 71"/>
+          <p:cNvCxnSpPr>
+            <a:stCxn id="16" idx="3"/>
+            <a:endCxn id="18" idx="1"/>
+          </p:cNvCxnSpPr>
+          <p:nvPr/>
+        </p:nvCxnSpPr>
+        <p:spPr>
+          <a:xfrm flipV="1">
+            <a:off x="7264032" y="2871143"/>
+            <a:ext cx="487363" cy="1"/>
+          </a:xfrm>
+          <a:prstGeom prst="straightConnector1">
+            <a:avLst/>
+          </a:prstGeom>
+          <a:ln w="28575">
+            <a:tailEnd type="triangle"/>
+          </a:ln>
+        </p:spPr>
+        <p:style>
+          <a:lnRef idx="1">
+            <a:schemeClr val="dk1"/>
+          </a:lnRef>
+          <a:fillRef idx="0">
+            <a:schemeClr val="dk1"/>
+          </a:fillRef>
+          <a:effectRef idx="0">
+            <a:schemeClr val="dk1"/>
+          </a:effectRef>
+          <a:fontRef idx="minor">
+            <a:schemeClr val="tx1"/>
+          </a:fontRef>
+        </p:style>
+      </p:cxnSp>
+      <p:cxnSp>
+        <p:nvCxnSpPr>
+          <p:cNvPr id="54" name="Elbow Connector 53"/>
+          <p:cNvCxnSpPr>
+            <a:stCxn id="7" idx="3"/>
+            <a:endCxn id="17" idx="0"/>
+          </p:cNvCxnSpPr>
+          <p:nvPr/>
+        </p:nvCxnSpPr>
+        <p:spPr>
+          <a:xfrm>
+            <a:off x="6953861" y="553244"/>
+            <a:ext cx="1426184" cy="1120255"/>
+          </a:xfrm>
+          <a:prstGeom prst="bentConnector2">
+            <a:avLst/>
+          </a:prstGeom>
+          <a:ln w="28575">
+            <a:tailEnd type="triangle"/>
+          </a:ln>
+        </p:spPr>
+        <p:style>
+          <a:lnRef idx="1">
+            <a:schemeClr val="dk1"/>
+          </a:lnRef>
+          <a:fillRef idx="0">
+            <a:schemeClr val="dk1"/>
+          </a:fillRef>
+          <a:effectRef idx="0">
+            <a:schemeClr val="dk1"/>
+          </a:effectRef>
+          <a:fontRef idx="minor">
+            <a:schemeClr val="tx1"/>
+          </a:fontRef>
+        </p:style>
+      </p:cxnSp>
+      <p:cxnSp>
+        <p:nvCxnSpPr>
+          <p:cNvPr id="90" name="Straight Arrow Connector 89"/>
+          <p:cNvCxnSpPr>
+            <a:stCxn id="11" idx="3"/>
+            <a:endCxn id="19" idx="1"/>
+          </p:cNvCxnSpPr>
+          <p:nvPr/>
+        </p:nvCxnSpPr>
+        <p:spPr>
+          <a:xfrm>
+            <a:off x="2034993" y="4985601"/>
+            <a:ext cx="508886" cy="3086"/>
+          </a:xfrm>
+          <a:prstGeom prst="straightConnector1">
+            <a:avLst/>
+          </a:prstGeom>
+          <a:ln w="28575">
+            <a:tailEnd type="triangle"/>
+          </a:ln>
+        </p:spPr>
+        <p:style>
+          <a:lnRef idx="1">
+            <a:schemeClr val="dk1"/>
+          </a:lnRef>
+          <a:fillRef idx="0">
+            <a:schemeClr val="dk1"/>
+          </a:fillRef>
+          <a:effectRef idx="0">
+            <a:schemeClr val="dk1"/>
+          </a:effectRef>
+          <a:fontRef idx="minor">
+            <a:schemeClr val="tx1"/>
+          </a:fontRef>
+        </p:style>
+      </p:cxnSp>
+      <p:cxnSp>
+        <p:nvCxnSpPr>
+          <p:cNvPr id="97" name="Straight Arrow Connector 96"/>
+          <p:cNvCxnSpPr>
+            <a:stCxn id="19" idx="3"/>
+            <a:endCxn id="20" idx="1"/>
+          </p:cNvCxnSpPr>
+          <p:nvPr/>
+        </p:nvCxnSpPr>
+        <p:spPr>
+          <a:xfrm flipV="1">
+            <a:off x="3801179" y="4985864"/>
+            <a:ext cx="508886" cy="2823"/>
+          </a:xfrm>
+          <a:prstGeom prst="straightConnector1">
+            <a:avLst/>
+          </a:prstGeom>
+          <a:ln w="28575">
+            <a:tailEnd type="triangle"/>
+          </a:ln>
+        </p:spPr>
+        <p:style>
+          <a:lnRef idx="1">
+            <a:schemeClr val="dk1"/>
+          </a:lnRef>
+          <a:fillRef idx="0">
+            <a:schemeClr val="dk1"/>
+          </a:fillRef>
+          <a:effectRef idx="0">
+            <a:schemeClr val="dk1"/>
+          </a:effectRef>
+          <a:fontRef idx="minor">
+            <a:schemeClr val="tx1"/>
+          </a:fontRef>
+        </p:style>
+      </p:cxnSp>
+      <p:sp>
+        <p:nvSpPr>
+          <p:cNvPr id="104" name="Text Box 2"/>
+          <p:cNvSpPr txBox="1">
+            <a:spLocks noChangeArrowheads="1"/>
+          </p:cNvSpPr>
+          <p:nvPr/>
+        </p:nvSpPr>
+        <p:spPr bwMode="auto">
+          <a:xfrm>
+            <a:off x="10258821" y="3326708"/>
+            <a:ext cx="1257300" cy="601663"/>
+          </a:xfrm>
+          <a:prstGeom prst="rect">
+            <a:avLst/>
+          </a:prstGeom>
+          <a:solidFill>
+            <a:srgbClr val="FFFFFF"/>
+          </a:solidFill>
+          <a:ln w="6350">
+            <a:solidFill>
+              <a:srgbClr val="000000"/>
+            </a:solidFill>
+            <a:miter lim="800000"/>
+            <a:headEnd/>
+            <a:tailEnd/>
+          </a:ln>
+        </p:spPr>
+        <p:txBody>
+          <a:bodyPr vert="horz" wrap="square" lIns="91440" tIns="45720" rIns="91440" bIns="45720" numCol="1" anchor="ctr" anchorCtr="0" compatLnSpc="1">
+            <a:prstTxWarp prst="textNoShape">
+              <a:avLst/>
+            </a:prstTxWarp>
+          </a:bodyPr>
+          <a:lstStyle/>
+          <a:p>
+            <a:pPr marL="0" marR="0" lvl="0" indent="0" algn="ctr" defTabSz="914400" rtl="0" eaLnBrk="0" fontAlgn="base" latinLnBrk="0" hangingPunct="0">
+              <a:lnSpc>
+                <a:spcPct val="100000"/>
+              </a:lnSpc>
+              <a:spcBef>
+                <a:spcPct val="0"/>
+              </a:spcBef>
+              <a:spcAft>
+                <a:spcPct val="0"/>
+              </a:spcAft>
+              <a:buClrTx/>
+              <a:buSzTx/>
+              <a:buFontTx/>
+              <a:buNone/>
+              <a:tabLst/>
+            </a:pPr>
+            <a:r>
+              <a:rPr kumimoji="0" lang="en-US" altLang="en-US" sz="1100" b="0" i="0" u="none" strike="noStrike" cap="none" normalizeH="0" baseline="0" dirty="0">
+                <a:ln>
+                  <a:noFill/>
+                </a:ln>
+                <a:solidFill>
+                  <a:schemeClr val="tx1"/>
+                </a:solidFill>
+                <a:effectLst/>
+                <a:latin typeface="Calibri" panose="020F0502020204030204" pitchFamily="34" charset="0"/>
+                <a:ea typeface="Calibri" panose="020F0502020204030204" pitchFamily="34" charset="0"/>
+                <a:cs typeface="Times New Roman" panose="02020603050405020304" pitchFamily="18" charset="0"/>
+              </a:rPr>
+              <a:t>Project </a:t>
+            </a:r>
+            <a:r>
+              <a:rPr lang="en-US" altLang="en-US" sz="1100" dirty="0">
+                <a:latin typeface="Calibri" panose="020F0502020204030204" pitchFamily="34" charset="0"/>
+                <a:ea typeface="Calibri" panose="020F0502020204030204" pitchFamily="34" charset="0"/>
+                <a:cs typeface="Times New Roman" panose="02020603050405020304" pitchFamily="18" charset="0"/>
+              </a:rPr>
+              <a:t>Finish</a:t>
+            </a:r>
+            <a:endParaRPr kumimoji="0" lang="en-US" altLang="en-US" sz="1800" b="0" i="0" u="none" strike="noStrike" cap="none" normalizeH="0" baseline="0" dirty="0">
+              <a:ln>
+                <a:noFill/>
+              </a:ln>
+              <a:solidFill>
+                <a:schemeClr val="tx1"/>
+              </a:solidFill>
+              <a:effectLst/>
+              <a:latin typeface="Arial" panose="020B0604020202020204" pitchFamily="34" charset="0"/>
+            </a:endParaRPr>
+          </a:p>
+        </p:txBody>
+      </p:sp>
+      <p:cxnSp>
+        <p:nvCxnSpPr>
+          <p:cNvPr id="99" name="Elbow Connector 98"/>
+          <p:cNvCxnSpPr>
+            <a:stCxn id="21" idx="0"/>
+            <a:endCxn id="104" idx="1"/>
+          </p:cNvCxnSpPr>
+          <p:nvPr/>
+        </p:nvCxnSpPr>
+        <p:spPr>
+          <a:xfrm rot="5400000" flipH="1" flipV="1">
+            <a:off x="9241256" y="3480637"/>
+            <a:ext cx="870662" cy="1164468"/>
+          </a:xfrm>
+          <a:prstGeom prst="bentConnector2">
+            <a:avLst/>
+          </a:prstGeom>
+          <a:ln w="28575">
+            <a:tailEnd type="triangle"/>
+          </a:ln>
+        </p:spPr>
+        <p:style>
+          <a:lnRef idx="1">
+            <a:schemeClr val="dk1"/>
+          </a:lnRef>
+          <a:fillRef idx="0">
+            <a:schemeClr val="dk1"/>
+          </a:fillRef>
+          <a:effectRef idx="0">
+            <a:schemeClr val="dk1"/>
+          </a:effectRef>
+          <a:fontRef idx="minor">
+            <a:schemeClr val="tx1"/>
+          </a:fontRef>
+        </p:style>
+      </p:cxnSp>
+      <p:cxnSp>
+        <p:nvCxnSpPr>
+          <p:cNvPr id="107" name="Elbow Connector 106"/>
+          <p:cNvCxnSpPr>
+            <a:stCxn id="18" idx="2"/>
+            <a:endCxn id="104" idx="1"/>
+          </p:cNvCxnSpPr>
+          <p:nvPr/>
+        </p:nvCxnSpPr>
+        <p:spPr>
+          <a:xfrm rot="16200000" flipH="1">
+            <a:off x="9091650" y="2460369"/>
+            <a:ext cx="455566" cy="1878776"/>
+          </a:xfrm>
+          <a:prstGeom prst="bentConnector2">
+            <a:avLst/>
+          </a:prstGeom>
+          <a:ln w="28575">
+            <a:tailEnd type="triangle"/>
+          </a:ln>
+        </p:spPr>
+        <p:style>
+          <a:lnRef idx="1">
+            <a:schemeClr val="dk1"/>
+          </a:lnRef>
+          <a:fillRef idx="0">
+            <a:schemeClr val="dk1"/>
+          </a:fillRef>
+          <a:effectRef idx="0">
+            <a:schemeClr val="dk1"/>
+          </a:effectRef>
+          <a:fontRef idx="minor">
+            <a:schemeClr val="tx1"/>
+          </a:fontRef>
+        </p:style>
+      </p:cxnSp>
     </p:spTree>
     <p:extLst>
       <p:ext uri="{BB962C8B-B14F-4D97-AF65-F5344CB8AC3E}">

</xml_diff>

<commit_message>
create critical path pdf
</commit_message>
<xml_diff>
--- a/Planning Documents/Network Diagram.pptx
+++ b/Planning Documents/Network Diagram.pptx
@@ -243,7 +243,7 @@
           <a:p>
             <a:fld id="{73C24DE2-34C6-41C9-9E8C-EA727FD40054}" type="datetimeFigureOut">
               <a:rPr lang="en-NZ" smtClean="0"/>
-              <a:t>27/07/2016</a:t>
+              <a:t>4/08/2016</a:t>
             </a:fld>
             <a:endParaRPr lang="en-NZ"/>
           </a:p>
@@ -413,7 +413,7 @@
           <a:p>
             <a:fld id="{73C24DE2-34C6-41C9-9E8C-EA727FD40054}" type="datetimeFigureOut">
               <a:rPr lang="en-NZ" smtClean="0"/>
-              <a:t>27/07/2016</a:t>
+              <a:t>4/08/2016</a:t>
             </a:fld>
             <a:endParaRPr lang="en-NZ"/>
           </a:p>
@@ -593,7 +593,7 @@
           <a:p>
             <a:fld id="{73C24DE2-34C6-41C9-9E8C-EA727FD40054}" type="datetimeFigureOut">
               <a:rPr lang="en-NZ" smtClean="0"/>
-              <a:t>27/07/2016</a:t>
+              <a:t>4/08/2016</a:t>
             </a:fld>
             <a:endParaRPr lang="en-NZ"/>
           </a:p>
@@ -763,7 +763,7 @@
           <a:p>
             <a:fld id="{73C24DE2-34C6-41C9-9E8C-EA727FD40054}" type="datetimeFigureOut">
               <a:rPr lang="en-NZ" smtClean="0"/>
-              <a:t>27/07/2016</a:t>
+              <a:t>4/08/2016</a:t>
             </a:fld>
             <a:endParaRPr lang="en-NZ"/>
           </a:p>
@@ -1009,7 +1009,7 @@
           <a:p>
             <a:fld id="{73C24DE2-34C6-41C9-9E8C-EA727FD40054}" type="datetimeFigureOut">
               <a:rPr lang="en-NZ" smtClean="0"/>
-              <a:t>27/07/2016</a:t>
+              <a:t>4/08/2016</a:t>
             </a:fld>
             <a:endParaRPr lang="en-NZ"/>
           </a:p>
@@ -1241,7 +1241,7 @@
           <a:p>
             <a:fld id="{73C24DE2-34C6-41C9-9E8C-EA727FD40054}" type="datetimeFigureOut">
               <a:rPr lang="en-NZ" smtClean="0"/>
-              <a:t>27/07/2016</a:t>
+              <a:t>4/08/2016</a:t>
             </a:fld>
             <a:endParaRPr lang="en-NZ"/>
           </a:p>
@@ -1608,7 +1608,7 @@
           <a:p>
             <a:fld id="{73C24DE2-34C6-41C9-9E8C-EA727FD40054}" type="datetimeFigureOut">
               <a:rPr lang="en-NZ" smtClean="0"/>
-              <a:t>27/07/2016</a:t>
+              <a:t>4/08/2016</a:t>
             </a:fld>
             <a:endParaRPr lang="en-NZ"/>
           </a:p>
@@ -1726,7 +1726,7 @@
           <a:p>
             <a:fld id="{73C24DE2-34C6-41C9-9E8C-EA727FD40054}" type="datetimeFigureOut">
               <a:rPr lang="en-NZ" smtClean="0"/>
-              <a:t>27/07/2016</a:t>
+              <a:t>4/08/2016</a:t>
             </a:fld>
             <a:endParaRPr lang="en-NZ"/>
           </a:p>
@@ -1821,7 +1821,7 @@
           <a:p>
             <a:fld id="{73C24DE2-34C6-41C9-9E8C-EA727FD40054}" type="datetimeFigureOut">
               <a:rPr lang="en-NZ" smtClean="0"/>
-              <a:t>27/07/2016</a:t>
+              <a:t>4/08/2016</a:t>
             </a:fld>
             <a:endParaRPr lang="en-NZ"/>
           </a:p>
@@ -2098,7 +2098,7 @@
           <a:p>
             <a:fld id="{73C24DE2-34C6-41C9-9E8C-EA727FD40054}" type="datetimeFigureOut">
               <a:rPr lang="en-NZ" smtClean="0"/>
-              <a:t>27/07/2016</a:t>
+              <a:t>4/08/2016</a:t>
             </a:fld>
             <a:endParaRPr lang="en-NZ"/>
           </a:p>
@@ -2351,7 +2351,7 @@
           <a:p>
             <a:fld id="{73C24DE2-34C6-41C9-9E8C-EA727FD40054}" type="datetimeFigureOut">
               <a:rPr lang="en-NZ" smtClean="0"/>
-              <a:t>27/07/2016</a:t>
+              <a:t>4/08/2016</a:t>
             </a:fld>
             <a:endParaRPr lang="en-NZ"/>
           </a:p>
@@ -2564,7 +2564,7 @@
           <a:p>
             <a:fld id="{73C24DE2-34C6-41C9-9E8C-EA727FD40054}" type="datetimeFigureOut">
               <a:rPr lang="en-NZ" smtClean="0"/>
-              <a:t>27/07/2016</a:t>
+              <a:t>4/08/2016</a:t>
             </a:fld>
             <a:endParaRPr lang="en-NZ"/>
           </a:p>
@@ -2986,7 +2986,7 @@
             <a:avLst/>
           </a:prstGeom>
           <a:solidFill>
-            <a:srgbClr val="FFFFFF"/>
+            <a:srgbClr val="00B0F0"/>
           </a:solidFill>
           <a:ln w="6350">
             <a:solidFill>
@@ -3060,6 +3060,246 @@
         <p:spPr bwMode="auto">
           <a:xfrm>
             <a:off x="2229461" y="252412"/>
+            <a:ext cx="1257300" cy="601663"/>
+          </a:xfrm>
+          <a:prstGeom prst="rect">
+            <a:avLst/>
+          </a:prstGeom>
+          <a:solidFill>
+            <a:srgbClr val="00B0F0"/>
+          </a:solidFill>
+          <a:ln w="6350">
+            <a:solidFill>
+              <a:srgbClr val="000000"/>
+            </a:solidFill>
+            <a:miter lim="800000"/>
+            <a:headEnd/>
+            <a:tailEnd/>
+          </a:ln>
+        </p:spPr>
+        <p:txBody>
+          <a:bodyPr vert="horz" wrap="square" lIns="91440" tIns="45720" rIns="91440" bIns="45720" numCol="1" anchor="ctr" anchorCtr="0" compatLnSpc="1">
+            <a:prstTxWarp prst="textNoShape">
+              <a:avLst/>
+            </a:prstTxWarp>
+          </a:bodyPr>
+          <a:lstStyle/>
+          <a:p>
+            <a:pPr marL="0" marR="0" lvl="0" indent="0" algn="ctr" defTabSz="914400" rtl="0" eaLnBrk="0" fontAlgn="base" latinLnBrk="0" hangingPunct="0">
+              <a:lnSpc>
+                <a:spcPct val="100000"/>
+              </a:lnSpc>
+              <a:spcBef>
+                <a:spcPct val="0"/>
+              </a:spcBef>
+              <a:spcAft>
+                <a:spcPct val="0"/>
+              </a:spcAft>
+              <a:buClrTx/>
+              <a:buSzTx/>
+              <a:buFontTx/>
+              <a:buNone/>
+              <a:tabLst/>
+            </a:pPr>
+            <a:r>
+              <a:rPr kumimoji="0" lang="en-US" altLang="en-US" sz="1100" b="0" i="0" u="none" strike="noStrike" cap="none" normalizeH="0" baseline="0">
+                <a:ln>
+                  <a:noFill/>
+                </a:ln>
+                <a:solidFill>
+                  <a:schemeClr val="tx1"/>
+                </a:solidFill>
+                <a:effectLst/>
+                <a:latin typeface="Calibri" panose="020F0502020204030204" pitchFamily="34" charset="0"/>
+                <a:ea typeface="Calibri" panose="020F0502020204030204" pitchFamily="34" charset="0"/>
+                <a:cs typeface="Times New Roman" panose="02020603050405020304" pitchFamily="18" charset="0"/>
+              </a:rPr>
+              <a:t>Work Breakdown Structure</a:t>
+            </a:r>
+            <a:endParaRPr kumimoji="0" lang="en-US" altLang="en-US" sz="1800" b="0" i="0" u="none" strike="noStrike" cap="none" normalizeH="0" baseline="0">
+              <a:ln>
+                <a:noFill/>
+              </a:ln>
+              <a:solidFill>
+                <a:schemeClr val="tx1"/>
+              </a:solidFill>
+              <a:effectLst/>
+              <a:latin typeface="Arial" panose="020B0604020202020204" pitchFamily="34" charset="0"/>
+            </a:endParaRPr>
+          </a:p>
+        </p:txBody>
+      </p:sp>
+      <p:sp>
+        <p:nvSpPr>
+          <p:cNvPr id="6" name="Text Box 4"/>
+          <p:cNvSpPr txBox="1">
+            <a:spLocks noChangeArrowheads="1"/>
+          </p:cNvSpPr>
+          <p:nvPr/>
+        </p:nvSpPr>
+        <p:spPr bwMode="auto">
+          <a:xfrm>
+            <a:off x="3974123" y="252412"/>
+            <a:ext cx="1257300" cy="601663"/>
+          </a:xfrm>
+          <a:prstGeom prst="rect">
+            <a:avLst/>
+          </a:prstGeom>
+          <a:solidFill>
+            <a:srgbClr val="00B0F0"/>
+          </a:solidFill>
+          <a:ln w="6350">
+            <a:solidFill>
+              <a:srgbClr val="000000"/>
+            </a:solidFill>
+            <a:miter lim="800000"/>
+            <a:headEnd/>
+            <a:tailEnd/>
+          </a:ln>
+        </p:spPr>
+        <p:txBody>
+          <a:bodyPr vert="horz" wrap="square" lIns="91440" tIns="45720" rIns="91440" bIns="45720" numCol="1" anchor="ctr" anchorCtr="0" compatLnSpc="1">
+            <a:prstTxWarp prst="textNoShape">
+              <a:avLst/>
+            </a:prstTxWarp>
+          </a:bodyPr>
+          <a:lstStyle/>
+          <a:p>
+            <a:pPr marL="0" marR="0" lvl="0" indent="0" algn="ctr" defTabSz="914400" rtl="0" eaLnBrk="0" fontAlgn="base" latinLnBrk="0" hangingPunct="0">
+              <a:lnSpc>
+                <a:spcPct val="100000"/>
+              </a:lnSpc>
+              <a:spcBef>
+                <a:spcPct val="0"/>
+              </a:spcBef>
+              <a:spcAft>
+                <a:spcPct val="0"/>
+              </a:spcAft>
+              <a:buClrTx/>
+              <a:buSzTx/>
+              <a:buFontTx/>
+              <a:buNone/>
+              <a:tabLst/>
+            </a:pPr>
+            <a:r>
+              <a:rPr kumimoji="0" lang="en-US" altLang="en-US" sz="1100" b="0" i="0" u="none" strike="noStrike" cap="none" normalizeH="0" baseline="0">
+                <a:ln>
+                  <a:noFill/>
+                </a:ln>
+                <a:solidFill>
+                  <a:schemeClr val="tx1"/>
+                </a:solidFill>
+                <a:effectLst/>
+                <a:latin typeface="Calibri" panose="020F0502020204030204" pitchFamily="34" charset="0"/>
+                <a:ea typeface="Calibri" panose="020F0502020204030204" pitchFamily="34" charset="0"/>
+                <a:cs typeface="Times New Roman" panose="02020603050405020304" pitchFamily="18" charset="0"/>
+              </a:rPr>
+              <a:t>Network Diagram</a:t>
+            </a:r>
+            <a:endParaRPr kumimoji="0" lang="en-US" altLang="en-US" sz="1800" b="0" i="0" u="none" strike="noStrike" cap="none" normalizeH="0" baseline="0">
+              <a:ln>
+                <a:noFill/>
+              </a:ln>
+              <a:solidFill>
+                <a:schemeClr val="tx1"/>
+              </a:solidFill>
+              <a:effectLst/>
+              <a:latin typeface="Arial" panose="020B0604020202020204" pitchFamily="34" charset="0"/>
+            </a:endParaRPr>
+          </a:p>
+        </p:txBody>
+      </p:sp>
+      <p:sp>
+        <p:nvSpPr>
+          <p:cNvPr id="7" name="Text Box 5"/>
+          <p:cNvSpPr txBox="1">
+            <a:spLocks noChangeArrowheads="1"/>
+          </p:cNvSpPr>
+          <p:nvPr/>
+        </p:nvSpPr>
+        <p:spPr bwMode="auto">
+          <a:xfrm>
+            <a:off x="5696561" y="252412"/>
+            <a:ext cx="1257300" cy="601663"/>
+          </a:xfrm>
+          <a:prstGeom prst="rect">
+            <a:avLst/>
+          </a:prstGeom>
+          <a:solidFill>
+            <a:srgbClr val="00B0F0"/>
+          </a:solidFill>
+          <a:ln w="6350">
+            <a:solidFill>
+              <a:srgbClr val="000000"/>
+            </a:solidFill>
+            <a:miter lim="800000"/>
+            <a:headEnd/>
+            <a:tailEnd/>
+          </a:ln>
+        </p:spPr>
+        <p:txBody>
+          <a:bodyPr vert="horz" wrap="square" lIns="91440" tIns="45720" rIns="91440" bIns="45720" numCol="1" anchor="ctr" anchorCtr="0" compatLnSpc="1">
+            <a:prstTxWarp prst="textNoShape">
+              <a:avLst/>
+            </a:prstTxWarp>
+          </a:bodyPr>
+          <a:lstStyle/>
+          <a:p>
+            <a:pPr marL="0" marR="0" lvl="0" indent="0" algn="ctr" defTabSz="914400" rtl="0" eaLnBrk="0" fontAlgn="base" latinLnBrk="0" hangingPunct="0">
+              <a:lnSpc>
+                <a:spcPct val="100000"/>
+              </a:lnSpc>
+              <a:spcBef>
+                <a:spcPct val="0"/>
+              </a:spcBef>
+              <a:spcAft>
+                <a:spcPct val="0"/>
+              </a:spcAft>
+              <a:buClrTx/>
+              <a:buSzTx/>
+              <a:buFontTx/>
+              <a:buNone/>
+              <a:tabLst/>
+            </a:pPr>
+            <a:r>
+              <a:rPr kumimoji="0" lang="en-US" altLang="en-US" sz="1100" b="0" i="0" u="none" strike="noStrike" cap="none" normalizeH="0" baseline="0">
+                <a:ln>
+                  <a:noFill/>
+                </a:ln>
+                <a:solidFill>
+                  <a:schemeClr val="tx1"/>
+                </a:solidFill>
+                <a:effectLst/>
+                <a:latin typeface="Calibri" panose="020F0502020204030204" pitchFamily="34" charset="0"/>
+                <a:ea typeface="Calibri" panose="020F0502020204030204" pitchFamily="34" charset="0"/>
+                <a:cs typeface="Times New Roman" panose="02020603050405020304" pitchFamily="18" charset="0"/>
+              </a:rPr>
+              <a:t>Gantt Chart</a:t>
+            </a:r>
+            <a:endParaRPr kumimoji="0" lang="en-US" altLang="en-US" sz="1800" b="0" i="0" u="none" strike="noStrike" cap="none" normalizeH="0" baseline="0">
+              <a:ln>
+                <a:noFill/>
+              </a:ln>
+              <a:solidFill>
+                <a:schemeClr val="tx1"/>
+              </a:solidFill>
+              <a:effectLst/>
+              <a:latin typeface="Arial" panose="020B0604020202020204" pitchFamily="34" charset="0"/>
+            </a:endParaRPr>
+          </a:p>
+        </p:txBody>
+      </p:sp>
+      <p:sp>
+        <p:nvSpPr>
+          <p:cNvPr id="9" name="Text Box 7"/>
+          <p:cNvSpPr txBox="1">
+            <a:spLocks noChangeArrowheads="1"/>
+          </p:cNvSpPr>
+          <p:nvPr/>
+        </p:nvSpPr>
+        <p:spPr bwMode="auto">
+          <a:xfrm>
+            <a:off x="2229461" y="2217737"/>
             <a:ext cx="1257300" cy="601663"/>
           </a:xfrm>
           <a:prstGeom prst="rect">
@@ -3102,7 +3342,7 @@
               <a:tabLst/>
             </a:pPr>
             <a:r>
-              <a:rPr kumimoji="0" lang="en-US" altLang="en-US" sz="1100" b="0" i="0" u="none" strike="noStrike" cap="none" normalizeH="0" baseline="0">
+              <a:rPr kumimoji="0" lang="en-US" altLang="en-US" sz="1100" b="0" i="0" u="none" strike="noStrike" cap="none" normalizeH="0" baseline="0" dirty="0">
                 <a:ln>
                   <a:noFill/>
                 </a:ln>
@@ -3114,9 +3354,9 @@
                 <a:ea typeface="Calibri" panose="020F0502020204030204" pitchFamily="34" charset="0"/>
                 <a:cs typeface="Times New Roman" panose="02020603050405020304" pitchFamily="18" charset="0"/>
               </a:rPr>
-              <a:t>Work Breakdown Structure</a:t>
-            </a:r>
-            <a:endParaRPr kumimoji="0" lang="en-US" altLang="en-US" sz="1800" b="0" i="0" u="none" strike="noStrike" cap="none" normalizeH="0" baseline="0">
+              <a:t>Parse command line input</a:t>
+            </a:r>
+            <a:endParaRPr kumimoji="0" lang="en-US" altLang="en-US" sz="1800" b="0" i="0" u="none" strike="noStrike" cap="none" normalizeH="0" baseline="0" dirty="0">
               <a:ln>
                 <a:noFill/>
               </a:ln>
@@ -3131,7 +3371,7 @@
       </p:sp>
       <p:sp>
         <p:nvSpPr>
-          <p:cNvPr id="6" name="Text Box 4"/>
+          <p:cNvPr id="11" name="Text Box 9"/>
           <p:cNvSpPr txBox="1">
             <a:spLocks noChangeArrowheads="1"/>
           </p:cNvSpPr>
@@ -3139,8 +3379,381 @@
         </p:nvSpPr>
         <p:spPr bwMode="auto">
           <a:xfrm>
-            <a:off x="3974123" y="252412"/>
+            <a:off x="749118" y="4684769"/>
+            <a:ext cx="1285875" cy="601663"/>
+          </a:xfrm>
+          <a:prstGeom prst="rect">
+            <a:avLst/>
+          </a:prstGeom>
+          <a:solidFill>
+            <a:srgbClr val="00B0F0"/>
+          </a:solidFill>
+          <a:ln w="6350">
+            <a:solidFill>
+              <a:srgbClr val="000000"/>
+            </a:solidFill>
+            <a:miter lim="800000"/>
+            <a:headEnd/>
+            <a:tailEnd/>
+          </a:ln>
+        </p:spPr>
+        <p:txBody>
+          <a:bodyPr vert="horz" wrap="square" lIns="91440" tIns="45720" rIns="91440" bIns="45720" numCol="1" anchor="ctr" anchorCtr="0" compatLnSpc="1">
+            <a:prstTxWarp prst="textNoShape">
+              <a:avLst/>
+            </a:prstTxWarp>
+          </a:bodyPr>
+          <a:lstStyle/>
+          <a:p>
+            <a:pPr marL="0" marR="0" lvl="0" indent="0" algn="ctr" defTabSz="914400" rtl="0" eaLnBrk="0" fontAlgn="base" latinLnBrk="0" hangingPunct="0">
+              <a:lnSpc>
+                <a:spcPct val="100000"/>
+              </a:lnSpc>
+              <a:spcBef>
+                <a:spcPct val="0"/>
+              </a:spcBef>
+              <a:spcAft>
+                <a:spcPct val="0"/>
+              </a:spcAft>
+              <a:buClrTx/>
+              <a:buSzTx/>
+              <a:buFontTx/>
+              <a:buNone/>
+              <a:tabLst/>
+            </a:pPr>
+            <a:r>
+              <a:rPr kumimoji="0" lang="en-US" altLang="en-US" sz="1100" b="0" i="0" u="none" strike="noStrike" cap="none" normalizeH="0" baseline="0" dirty="0">
+                <a:ln>
+                  <a:noFill/>
+                </a:ln>
+                <a:solidFill>
+                  <a:schemeClr val="tx1"/>
+                </a:solidFill>
+                <a:effectLst/>
+                <a:latin typeface="Calibri" panose="020F0502020204030204" pitchFamily="34" charset="0"/>
+                <a:ea typeface="Calibri" panose="020F0502020204030204" pitchFamily="34" charset="0"/>
+                <a:cs typeface="Times New Roman" panose="02020603050405020304" pitchFamily="18" charset="0"/>
+              </a:rPr>
+              <a:t>Format valid output file</a:t>
+            </a:r>
+            <a:endParaRPr kumimoji="0" lang="en-US" altLang="en-US" sz="1800" b="0" i="0" u="none" strike="noStrike" cap="none" normalizeH="0" baseline="0" dirty="0">
+              <a:ln>
+                <a:noFill/>
+              </a:ln>
+              <a:solidFill>
+                <a:schemeClr val="tx1"/>
+              </a:solidFill>
+              <a:effectLst/>
+              <a:latin typeface="Arial" panose="020B0604020202020204" pitchFamily="34" charset="0"/>
+            </a:endParaRPr>
+          </a:p>
+        </p:txBody>
+      </p:sp>
+      <p:sp>
+        <p:nvSpPr>
+          <p:cNvPr id="13" name="Text Box 11"/>
+          <p:cNvSpPr txBox="1">
+            <a:spLocks noChangeArrowheads="1"/>
+          </p:cNvSpPr>
+          <p:nvPr/>
+        </p:nvSpPr>
+        <p:spPr bwMode="auto">
+          <a:xfrm>
+            <a:off x="2238985" y="2940261"/>
             <a:ext cx="1257300" cy="601663"/>
+          </a:xfrm>
+          <a:prstGeom prst="rect">
+            <a:avLst/>
+          </a:prstGeom>
+          <a:solidFill>
+            <a:srgbClr val="00B0F0"/>
+          </a:solidFill>
+          <a:ln w="6350">
+            <a:solidFill>
+              <a:srgbClr val="000000"/>
+            </a:solidFill>
+            <a:miter lim="800000"/>
+            <a:headEnd/>
+            <a:tailEnd/>
+          </a:ln>
+        </p:spPr>
+        <p:txBody>
+          <a:bodyPr vert="horz" wrap="square" lIns="91440" tIns="45720" rIns="91440" bIns="45720" numCol="1" anchor="ctr" anchorCtr="0" compatLnSpc="1">
+            <a:prstTxWarp prst="textNoShape">
+              <a:avLst/>
+            </a:prstTxWarp>
+          </a:bodyPr>
+          <a:lstStyle/>
+          <a:p>
+            <a:pPr marL="0" marR="0" lvl="0" indent="0" algn="ctr" defTabSz="914400" rtl="0" eaLnBrk="0" fontAlgn="base" latinLnBrk="0" hangingPunct="0">
+              <a:lnSpc>
+                <a:spcPct val="100000"/>
+              </a:lnSpc>
+              <a:spcBef>
+                <a:spcPct val="0"/>
+              </a:spcBef>
+              <a:spcAft>
+                <a:spcPct val="0"/>
+              </a:spcAft>
+              <a:buClrTx/>
+              <a:buSzTx/>
+              <a:buFontTx/>
+              <a:buNone/>
+              <a:tabLst/>
+            </a:pPr>
+            <a:r>
+              <a:rPr kumimoji="0" lang="en-US" altLang="en-US" sz="1100" b="0" i="0" u="none" strike="noStrike" cap="none" normalizeH="0" baseline="0" dirty="0">
+                <a:ln>
+                  <a:noFill/>
+                </a:ln>
+                <a:solidFill>
+                  <a:schemeClr val="tx1"/>
+                </a:solidFill>
+                <a:effectLst/>
+                <a:latin typeface="Calibri" panose="020F0502020204030204" pitchFamily="34" charset="0"/>
+                <a:ea typeface="Calibri" panose="020F0502020204030204" pitchFamily="34" charset="0"/>
+                <a:cs typeface="Times New Roman" panose="02020603050405020304" pitchFamily="18" charset="0"/>
+              </a:rPr>
+              <a:t>Creation</a:t>
+            </a:r>
+            <a:r>
+              <a:rPr kumimoji="0" lang="en-US" altLang="en-US" sz="1100" b="0" i="0" u="none" strike="noStrike" cap="none" normalizeH="0" dirty="0">
+                <a:ln>
+                  <a:noFill/>
+                </a:ln>
+                <a:solidFill>
+                  <a:schemeClr val="tx1"/>
+                </a:solidFill>
+                <a:effectLst/>
+                <a:latin typeface="Calibri" panose="020F0502020204030204" pitchFamily="34" charset="0"/>
+                <a:ea typeface="Calibri" panose="020F0502020204030204" pitchFamily="34" charset="0"/>
+                <a:cs typeface="Times New Roman" panose="02020603050405020304" pitchFamily="18" charset="0"/>
+              </a:rPr>
+              <a:t> of</a:t>
+            </a:r>
+            <a:r>
+              <a:rPr kumimoji="0" lang="en-US" altLang="en-US" sz="1100" b="0" i="0" u="none" strike="noStrike" cap="none" normalizeH="0" baseline="0" dirty="0">
+                <a:ln>
+                  <a:noFill/>
+                </a:ln>
+                <a:solidFill>
+                  <a:schemeClr val="tx1"/>
+                </a:solidFill>
+                <a:effectLst/>
+                <a:latin typeface="Calibri" panose="020F0502020204030204" pitchFamily="34" charset="0"/>
+                <a:ea typeface="Calibri" panose="020F0502020204030204" pitchFamily="34" charset="0"/>
+                <a:cs typeface="Times New Roman" panose="02020603050405020304" pitchFamily="18" charset="0"/>
+              </a:rPr>
+              <a:t> data structure</a:t>
+            </a:r>
+            <a:endParaRPr kumimoji="0" lang="en-US" altLang="en-US" sz="1800" b="0" i="0" u="none" strike="noStrike" cap="none" normalizeH="0" baseline="0" dirty="0">
+              <a:ln>
+                <a:noFill/>
+              </a:ln>
+              <a:solidFill>
+                <a:schemeClr val="tx1"/>
+              </a:solidFill>
+              <a:effectLst/>
+              <a:latin typeface="Arial" panose="020B0604020202020204" pitchFamily="34" charset="0"/>
+            </a:endParaRPr>
+          </a:p>
+        </p:txBody>
+      </p:sp>
+      <p:sp>
+        <p:nvSpPr>
+          <p:cNvPr id="15" name="Text Box 13"/>
+          <p:cNvSpPr txBox="1">
+            <a:spLocks noChangeArrowheads="1"/>
+          </p:cNvSpPr>
+          <p:nvPr/>
+        </p:nvSpPr>
+        <p:spPr bwMode="auto">
+          <a:xfrm>
+            <a:off x="4262070" y="2570312"/>
+            <a:ext cx="1257300" cy="601662"/>
+          </a:xfrm>
+          <a:prstGeom prst="rect">
+            <a:avLst/>
+          </a:prstGeom>
+          <a:solidFill>
+            <a:srgbClr val="00B0F0"/>
+          </a:solidFill>
+          <a:ln w="6350">
+            <a:solidFill>
+              <a:srgbClr val="000000"/>
+            </a:solidFill>
+            <a:miter lim="800000"/>
+            <a:headEnd/>
+            <a:tailEnd/>
+          </a:ln>
+        </p:spPr>
+        <p:txBody>
+          <a:bodyPr vert="horz" wrap="square" lIns="91440" tIns="45720" rIns="91440" bIns="45720" numCol="1" anchor="ctr" anchorCtr="0" compatLnSpc="1">
+            <a:prstTxWarp prst="textNoShape">
+              <a:avLst/>
+            </a:prstTxWarp>
+          </a:bodyPr>
+          <a:lstStyle/>
+          <a:p>
+            <a:pPr marL="0" marR="0" lvl="0" indent="0" algn="ctr" defTabSz="914400" rtl="0" eaLnBrk="0" fontAlgn="base" latinLnBrk="0" hangingPunct="0">
+              <a:lnSpc>
+                <a:spcPct val="100000"/>
+              </a:lnSpc>
+              <a:spcBef>
+                <a:spcPct val="0"/>
+              </a:spcBef>
+              <a:spcAft>
+                <a:spcPct val="0"/>
+              </a:spcAft>
+              <a:buClrTx/>
+              <a:buSzTx/>
+              <a:buFontTx/>
+              <a:buNone/>
+              <a:tabLst/>
+            </a:pPr>
+            <a:r>
+              <a:rPr kumimoji="0" lang="en-US" altLang="en-US" sz="1100" b="0" i="0" u="none" strike="noStrike" cap="none" normalizeH="0" baseline="0" dirty="0">
+                <a:ln>
+                  <a:noFill/>
+                </a:ln>
+                <a:solidFill>
+                  <a:schemeClr val="tx1"/>
+                </a:solidFill>
+                <a:effectLst/>
+                <a:latin typeface="Calibri" panose="020F0502020204030204" pitchFamily="34" charset="0"/>
+                <a:ea typeface="Calibri" panose="020F0502020204030204" pitchFamily="34" charset="0"/>
+                <a:cs typeface="Times New Roman" panose="02020603050405020304" pitchFamily="18" charset="0"/>
+              </a:rPr>
+              <a:t>Initalise data structure</a:t>
+            </a:r>
+            <a:r>
+              <a:rPr kumimoji="0" lang="en-US" altLang="en-US" sz="1100" b="0" i="0" u="none" strike="noStrike" cap="none" normalizeH="0" dirty="0">
+                <a:ln>
+                  <a:noFill/>
+                </a:ln>
+                <a:solidFill>
+                  <a:schemeClr val="tx1"/>
+                </a:solidFill>
+                <a:effectLst/>
+                <a:latin typeface="Calibri" panose="020F0502020204030204" pitchFamily="34" charset="0"/>
+                <a:ea typeface="Calibri" panose="020F0502020204030204" pitchFamily="34" charset="0"/>
+                <a:cs typeface="Times New Roman" panose="02020603050405020304" pitchFamily="18" charset="0"/>
+              </a:rPr>
+              <a:t> with input</a:t>
+            </a:r>
+            <a:endParaRPr kumimoji="0" lang="en-US" altLang="en-US" sz="1800" b="0" i="0" u="none" strike="noStrike" cap="none" normalizeH="0" baseline="0" dirty="0">
+              <a:ln>
+                <a:noFill/>
+              </a:ln>
+              <a:solidFill>
+                <a:schemeClr val="tx1"/>
+              </a:solidFill>
+              <a:effectLst/>
+              <a:latin typeface="Arial" panose="020B0604020202020204" pitchFamily="34" charset="0"/>
+            </a:endParaRPr>
+          </a:p>
+        </p:txBody>
+      </p:sp>
+      <p:sp>
+        <p:nvSpPr>
+          <p:cNvPr id="16" name="Text Box 14"/>
+          <p:cNvSpPr txBox="1">
+            <a:spLocks noChangeArrowheads="1"/>
+          </p:cNvSpPr>
+          <p:nvPr/>
+        </p:nvSpPr>
+        <p:spPr bwMode="auto">
+          <a:xfrm>
+            <a:off x="6006732" y="2570312"/>
+            <a:ext cx="1257300" cy="601663"/>
+          </a:xfrm>
+          <a:prstGeom prst="rect">
+            <a:avLst/>
+          </a:prstGeom>
+          <a:solidFill>
+            <a:srgbClr val="00B0F0"/>
+          </a:solidFill>
+          <a:ln w="6350">
+            <a:solidFill>
+              <a:srgbClr val="000000"/>
+            </a:solidFill>
+            <a:miter lim="800000"/>
+            <a:headEnd/>
+            <a:tailEnd/>
+          </a:ln>
+        </p:spPr>
+        <p:txBody>
+          <a:bodyPr vert="horz" wrap="square" lIns="91440" tIns="45720" rIns="91440" bIns="45720" numCol="1" anchor="ctr" anchorCtr="0" compatLnSpc="1">
+            <a:prstTxWarp prst="textNoShape">
+              <a:avLst/>
+            </a:prstTxWarp>
+          </a:bodyPr>
+          <a:lstStyle/>
+          <a:p>
+            <a:pPr marL="0" marR="0" lvl="0" indent="0" algn="ctr" defTabSz="914400" rtl="0" eaLnBrk="0" fontAlgn="base" latinLnBrk="0" hangingPunct="0">
+              <a:lnSpc>
+                <a:spcPct val="100000"/>
+              </a:lnSpc>
+              <a:spcBef>
+                <a:spcPct val="0"/>
+              </a:spcBef>
+              <a:spcAft>
+                <a:spcPct val="0"/>
+              </a:spcAft>
+              <a:buClrTx/>
+              <a:buSzTx/>
+              <a:buFontTx/>
+              <a:buNone/>
+              <a:tabLst/>
+            </a:pPr>
+            <a:r>
+              <a:rPr lang="en-US" altLang="en-US" sz="1100" dirty="0">
+                <a:latin typeface="Calibri" panose="020F0502020204030204" pitchFamily="34" charset="0"/>
+                <a:ea typeface="Calibri" panose="020F0502020204030204" pitchFamily="34" charset="0"/>
+                <a:cs typeface="Times New Roman" panose="02020603050405020304" pitchFamily="18" charset="0"/>
+              </a:rPr>
+              <a:t>Produce </a:t>
+            </a:r>
+            <a:r>
+              <a:rPr kumimoji="0" lang="en-US" altLang="en-US" sz="1100" b="0" i="0" u="none" strike="noStrike" cap="none" normalizeH="0" baseline="0" dirty="0">
+                <a:ln>
+                  <a:noFill/>
+                </a:ln>
+                <a:solidFill>
+                  <a:schemeClr val="tx1"/>
+                </a:solidFill>
+                <a:effectLst/>
+                <a:latin typeface="Calibri" panose="020F0502020204030204" pitchFamily="34" charset="0"/>
+                <a:ea typeface="Calibri" panose="020F0502020204030204" pitchFamily="34" charset="0"/>
+                <a:cs typeface="Times New Roman" panose="02020603050405020304" pitchFamily="18" charset="0"/>
+              </a:rPr>
+              <a:t>any valid schedule</a:t>
+            </a:r>
+            <a:endParaRPr kumimoji="0" lang="en-US" altLang="en-US" sz="1800" b="0" i="0" u="none" strike="noStrike" cap="none" normalizeH="0" baseline="0" dirty="0">
+              <a:ln>
+                <a:noFill/>
+              </a:ln>
+              <a:solidFill>
+                <a:schemeClr val="tx1"/>
+              </a:solidFill>
+              <a:effectLst/>
+              <a:latin typeface="Arial" panose="020B0604020202020204" pitchFamily="34" charset="0"/>
+            </a:endParaRPr>
+          </a:p>
+        </p:txBody>
+      </p:sp>
+      <p:sp>
+        <p:nvSpPr>
+          <p:cNvPr id="17" name="Text Box 15"/>
+          <p:cNvSpPr txBox="1">
+            <a:spLocks noChangeArrowheads="1"/>
+          </p:cNvSpPr>
+          <p:nvPr/>
+        </p:nvSpPr>
+        <p:spPr bwMode="auto">
+          <a:xfrm>
+            <a:off x="7751395" y="1673499"/>
+            <a:ext cx="1257300" cy="601662"/>
           </a:xfrm>
           <a:prstGeom prst="rect">
             <a:avLst/>
@@ -3182,7 +3795,7 @@
               <a:tabLst/>
             </a:pPr>
             <a:r>
-              <a:rPr kumimoji="0" lang="en-US" altLang="en-US" sz="1100" b="0" i="0" u="none" strike="noStrike" cap="none" normalizeH="0" baseline="0">
+              <a:rPr kumimoji="0" lang="en-US" altLang="en-US" sz="1100" b="0" i="0" u="none" strike="noStrike" cap="none" normalizeH="0" baseline="0" dirty="0">
                 <a:ln>
                   <a:noFill/>
                 </a:ln>
@@ -3194,9 +3807,39 @@
                 <a:ea typeface="Calibri" panose="020F0502020204030204" pitchFamily="34" charset="0"/>
                 <a:cs typeface="Times New Roman" panose="02020603050405020304" pitchFamily="18" charset="0"/>
               </a:rPr>
-              <a:t>Network Diagram</a:t>
-            </a:r>
-            <a:endParaRPr kumimoji="0" lang="en-US" altLang="en-US" sz="1800" b="0" i="0" u="none" strike="noStrike" cap="none" normalizeH="0" baseline="0">
+              <a:t>Decision of</a:t>
+            </a:r>
+            <a:r>
+              <a:rPr kumimoji="0" lang="en-US" altLang="en-US" sz="1100" b="0" i="0" u="none" strike="noStrike" cap="none" normalizeH="0" dirty="0">
+                <a:ln>
+                  <a:noFill/>
+                </a:ln>
+                <a:solidFill>
+                  <a:schemeClr val="tx1"/>
+                </a:solidFill>
+                <a:effectLst/>
+                <a:latin typeface="Calibri" panose="020F0502020204030204" pitchFamily="34" charset="0"/>
+                <a:ea typeface="Calibri" panose="020F0502020204030204" pitchFamily="34" charset="0"/>
+                <a:cs typeface="Times New Roman" panose="02020603050405020304" pitchFamily="18" charset="0"/>
+              </a:rPr>
+              <a:t> </a:t>
+            </a:r>
+            <a:r>
+              <a:rPr kumimoji="0" lang="en-US" altLang="en-US" sz="1100" b="0" i="0" u="none" strike="noStrike" cap="none" normalizeH="0" baseline="0" dirty="0">
+                <a:ln>
+                  <a:noFill/>
+                </a:ln>
+                <a:solidFill>
+                  <a:schemeClr val="tx1"/>
+                </a:solidFill>
+                <a:effectLst/>
+                <a:latin typeface="Calibri" panose="020F0502020204030204" pitchFamily="34" charset="0"/>
+                <a:ea typeface="Calibri" panose="020F0502020204030204" pitchFamily="34" charset="0"/>
+                <a:cs typeface="Times New Roman" panose="02020603050405020304" pitchFamily="18" charset="0"/>
+              </a:rPr>
+              <a:t>visualization method</a:t>
+            </a:r>
+            <a:endParaRPr kumimoji="0" lang="en-US" altLang="en-US" sz="1800" b="0" i="0" u="none" strike="noStrike" cap="none" normalizeH="0" baseline="0" dirty="0">
               <a:ln>
                 <a:noFill/>
               </a:ln>
@@ -3211,7 +3854,7 @@
       </p:sp>
       <p:sp>
         <p:nvSpPr>
-          <p:cNvPr id="7" name="Text Box 5"/>
+          <p:cNvPr id="18" name="Text Box 16"/>
           <p:cNvSpPr txBox="1">
             <a:spLocks noChangeArrowheads="1"/>
           </p:cNvSpPr>
@@ -3219,7 +3862,7 @@
         </p:nvSpPr>
         <p:spPr bwMode="auto">
           <a:xfrm>
-            <a:off x="5696561" y="252412"/>
+            <a:off x="7751395" y="2570311"/>
             <a:ext cx="1257300" cy="601663"/>
           </a:xfrm>
           <a:prstGeom prst="rect">
@@ -3274,7 +3917,7 @@
                 <a:ea typeface="Calibri" panose="020F0502020204030204" pitchFamily="34" charset="0"/>
                 <a:cs typeface="Times New Roman" panose="02020603050405020304" pitchFamily="18" charset="0"/>
               </a:rPr>
-              <a:t>Gantt Chart</a:t>
+              <a:t>Implement Visualisation</a:t>
             </a:r>
             <a:endParaRPr kumimoji="0" lang="en-US" altLang="en-US" sz="1800" b="0" i="0" u="none" strike="noStrike" cap="none" normalizeH="0" baseline="0">
               <a:ln>
@@ -3291,7 +3934,7 @@
       </p:sp>
       <p:sp>
         <p:nvSpPr>
-          <p:cNvPr id="9" name="Text Box 7"/>
+          <p:cNvPr id="19" name="Text Box 17"/>
           <p:cNvSpPr txBox="1">
             <a:spLocks noChangeArrowheads="1"/>
           </p:cNvSpPr>
@@ -3299,7 +3942,315 @@
         </p:nvSpPr>
         <p:spPr bwMode="auto">
           <a:xfrm>
-            <a:off x="2229461" y="2217737"/>
+            <a:off x="2543879" y="4690942"/>
+            <a:ext cx="1257300" cy="595489"/>
+          </a:xfrm>
+          <a:prstGeom prst="rect">
+            <a:avLst/>
+          </a:prstGeom>
+          <a:solidFill>
+            <a:srgbClr val="00B0F0"/>
+          </a:solidFill>
+          <a:ln w="6350">
+            <a:solidFill>
+              <a:srgbClr val="000000"/>
+            </a:solidFill>
+            <a:miter lim="800000"/>
+            <a:headEnd/>
+            <a:tailEnd/>
+          </a:ln>
+        </p:spPr>
+        <p:txBody>
+          <a:bodyPr vert="horz" wrap="square" lIns="91440" tIns="45720" rIns="91440" bIns="45720" numCol="1" anchor="ctr" anchorCtr="0" compatLnSpc="1">
+            <a:prstTxWarp prst="textNoShape">
+              <a:avLst/>
+            </a:prstTxWarp>
+          </a:bodyPr>
+          <a:lstStyle/>
+          <a:p>
+            <a:pPr marL="0" marR="0" lvl="0" indent="0" algn="ctr" defTabSz="914400" rtl="0" eaLnBrk="0" fontAlgn="base" latinLnBrk="0" hangingPunct="0">
+              <a:lnSpc>
+                <a:spcPct val="100000"/>
+              </a:lnSpc>
+              <a:spcBef>
+                <a:spcPct val="0"/>
+              </a:spcBef>
+              <a:spcAft>
+                <a:spcPct val="0"/>
+              </a:spcAft>
+              <a:buClrTx/>
+              <a:buSzTx/>
+              <a:buFontTx/>
+              <a:buNone/>
+              <a:tabLst/>
+            </a:pPr>
+            <a:r>
+              <a:rPr kumimoji="0" lang="en-US" altLang="en-US" sz="1100" b="0" i="0" u="none" strike="noStrike" cap="none" normalizeH="0" baseline="0" dirty="0">
+                <a:ln>
+                  <a:noFill/>
+                </a:ln>
+                <a:solidFill>
+                  <a:schemeClr val="tx1"/>
+                </a:solidFill>
+                <a:effectLst/>
+                <a:latin typeface="Calibri" panose="020F0502020204030204" pitchFamily="34" charset="0"/>
+                <a:ea typeface="Calibri" panose="020F0502020204030204" pitchFamily="34" charset="0"/>
+                <a:cs typeface="Times New Roman" panose="02020603050405020304" pitchFamily="18" charset="0"/>
+              </a:rPr>
+              <a:t>Consider all possible solutions</a:t>
+            </a:r>
+            <a:endParaRPr kumimoji="0" lang="en-US" altLang="en-US" sz="1800" b="0" i="0" u="none" strike="noStrike" cap="none" normalizeH="0" baseline="0" dirty="0">
+              <a:ln>
+                <a:noFill/>
+              </a:ln>
+              <a:solidFill>
+                <a:schemeClr val="tx1"/>
+              </a:solidFill>
+              <a:effectLst/>
+              <a:latin typeface="Arial" panose="020B0604020202020204" pitchFamily="34" charset="0"/>
+            </a:endParaRPr>
+          </a:p>
+        </p:txBody>
+      </p:sp>
+      <p:sp>
+        <p:nvSpPr>
+          <p:cNvPr id="20" name="Text Box 18"/>
+          <p:cNvSpPr txBox="1">
+            <a:spLocks noChangeArrowheads="1"/>
+          </p:cNvSpPr>
+          <p:nvPr/>
+        </p:nvSpPr>
+        <p:spPr bwMode="auto">
+          <a:xfrm>
+            <a:off x="4310065" y="4685297"/>
+            <a:ext cx="1257300" cy="601134"/>
+          </a:xfrm>
+          <a:prstGeom prst="rect">
+            <a:avLst/>
+          </a:prstGeom>
+          <a:solidFill>
+            <a:srgbClr val="00B0F0"/>
+          </a:solidFill>
+          <a:ln w="6350">
+            <a:solidFill>
+              <a:srgbClr val="000000"/>
+            </a:solidFill>
+            <a:miter lim="800000"/>
+            <a:headEnd/>
+            <a:tailEnd/>
+          </a:ln>
+        </p:spPr>
+        <p:txBody>
+          <a:bodyPr vert="horz" wrap="square" lIns="91440" tIns="45720" rIns="91440" bIns="45720" numCol="1" anchor="ctr" anchorCtr="0" compatLnSpc="1">
+            <a:prstTxWarp prst="textNoShape">
+              <a:avLst/>
+            </a:prstTxWarp>
+          </a:bodyPr>
+          <a:lstStyle/>
+          <a:p>
+            <a:pPr marL="0" marR="0" lvl="0" indent="0" algn="ctr" defTabSz="914400" rtl="0" eaLnBrk="0" fontAlgn="base" latinLnBrk="0" hangingPunct="0">
+              <a:lnSpc>
+                <a:spcPct val="100000"/>
+              </a:lnSpc>
+              <a:spcBef>
+                <a:spcPct val="0"/>
+              </a:spcBef>
+              <a:spcAft>
+                <a:spcPct val="0"/>
+              </a:spcAft>
+              <a:buClrTx/>
+              <a:buSzTx/>
+              <a:buFontTx/>
+              <a:buNone/>
+              <a:tabLst/>
+            </a:pPr>
+            <a:r>
+              <a:rPr kumimoji="0" lang="en-US" altLang="en-US" sz="1100" b="0" i="0" u="none" strike="noStrike" cap="none" normalizeH="0" baseline="0">
+                <a:ln>
+                  <a:noFill/>
+                </a:ln>
+                <a:solidFill>
+                  <a:schemeClr val="tx1"/>
+                </a:solidFill>
+                <a:effectLst/>
+                <a:latin typeface="Calibri" panose="020F0502020204030204" pitchFamily="34" charset="0"/>
+                <a:ea typeface="Calibri" panose="020F0502020204030204" pitchFamily="34" charset="0"/>
+                <a:cs typeface="Times New Roman" panose="02020603050405020304" pitchFamily="18" charset="0"/>
+              </a:rPr>
+              <a:t>Use depth first branch and bound algorithm</a:t>
+            </a:r>
+            <a:endParaRPr kumimoji="0" lang="en-US" altLang="en-US" sz="1800" b="0" i="0" u="none" strike="noStrike" cap="none" normalizeH="0" baseline="0">
+              <a:ln>
+                <a:noFill/>
+              </a:ln>
+              <a:solidFill>
+                <a:schemeClr val="tx1"/>
+              </a:solidFill>
+              <a:effectLst/>
+              <a:latin typeface="Arial" panose="020B0604020202020204" pitchFamily="34" charset="0"/>
+            </a:endParaRPr>
+          </a:p>
+        </p:txBody>
+      </p:sp>
+      <p:sp>
+        <p:nvSpPr>
+          <p:cNvPr id="21" name="Text Box 19"/>
+          <p:cNvSpPr txBox="1">
+            <a:spLocks noChangeArrowheads="1"/>
+          </p:cNvSpPr>
+          <p:nvPr/>
+        </p:nvSpPr>
+        <p:spPr bwMode="auto">
+          <a:xfrm>
+            <a:off x="8465703" y="4498202"/>
+            <a:ext cx="1257300" cy="815975"/>
+          </a:xfrm>
+          <a:prstGeom prst="rect">
+            <a:avLst/>
+          </a:prstGeom>
+          <a:solidFill>
+            <a:srgbClr val="00B0F0"/>
+          </a:solidFill>
+          <a:ln w="6350">
+            <a:solidFill>
+              <a:srgbClr val="000000"/>
+            </a:solidFill>
+            <a:miter lim="800000"/>
+            <a:headEnd/>
+            <a:tailEnd/>
+          </a:ln>
+        </p:spPr>
+        <p:txBody>
+          <a:bodyPr vert="horz" wrap="square" lIns="91440" tIns="45720" rIns="91440" bIns="45720" numCol="1" anchor="ctr" anchorCtr="0" compatLnSpc="1">
+            <a:prstTxWarp prst="textNoShape">
+              <a:avLst/>
+            </a:prstTxWarp>
+          </a:bodyPr>
+          <a:lstStyle/>
+          <a:p>
+            <a:pPr marL="0" marR="0" lvl="0" indent="0" algn="ctr" defTabSz="914400" rtl="0" eaLnBrk="0" fontAlgn="base" latinLnBrk="0" hangingPunct="0">
+              <a:lnSpc>
+                <a:spcPct val="100000"/>
+              </a:lnSpc>
+              <a:spcBef>
+                <a:spcPct val="0"/>
+              </a:spcBef>
+              <a:spcAft>
+                <a:spcPct val="0"/>
+              </a:spcAft>
+              <a:buClrTx/>
+              <a:buSzTx/>
+              <a:buFontTx/>
+              <a:buNone/>
+              <a:tabLst/>
+            </a:pPr>
+            <a:r>
+              <a:rPr kumimoji="0" lang="en-US" altLang="en-US" sz="1100" b="0" i="0" u="none" strike="noStrike" cap="none" normalizeH="0" baseline="0" dirty="0">
+                <a:ln>
+                  <a:noFill/>
+                </a:ln>
+                <a:solidFill>
+                  <a:schemeClr val="tx1"/>
+                </a:solidFill>
+                <a:effectLst/>
+                <a:latin typeface="Calibri" panose="020F0502020204030204" pitchFamily="34" charset="0"/>
+                <a:ea typeface="Calibri" panose="020F0502020204030204" pitchFamily="34" charset="0"/>
+                <a:cs typeface="Times New Roman" panose="02020603050405020304" pitchFamily="18" charset="0"/>
+              </a:rPr>
+              <a:t>Implement </a:t>
+            </a:r>
+            <a:r>
+              <a:rPr lang="en-US" altLang="en-US" sz="1100" dirty="0">
+                <a:latin typeface="Calibri" panose="020F0502020204030204" pitchFamily="34" charset="0"/>
+                <a:ea typeface="Calibri" panose="020F0502020204030204" pitchFamily="34" charset="0"/>
+                <a:cs typeface="Times New Roman" panose="02020603050405020304" pitchFamily="18" charset="0"/>
+              </a:rPr>
+              <a:t>using</a:t>
+            </a:r>
+            <a:r>
+              <a:rPr kumimoji="0" lang="en-US" altLang="en-US" sz="1100" b="0" i="0" u="none" strike="noStrike" cap="none" normalizeH="0" baseline="0" dirty="0">
+                <a:ln>
+                  <a:noFill/>
+                </a:ln>
+                <a:solidFill>
+                  <a:schemeClr val="tx1"/>
+                </a:solidFill>
+                <a:effectLst/>
+                <a:latin typeface="Calibri" panose="020F0502020204030204" pitchFamily="34" charset="0"/>
+                <a:ea typeface="Calibri" panose="020F0502020204030204" pitchFamily="34" charset="0"/>
+                <a:cs typeface="Times New Roman" panose="02020603050405020304" pitchFamily="18" charset="0"/>
+              </a:rPr>
+              <a:t> </a:t>
+            </a:r>
+            <a:r>
+              <a:rPr kumimoji="0" lang="en-US" altLang="en-US" sz="1100" b="0" i="0" u="none" strike="noStrike" cap="none" normalizeH="0" baseline="0" dirty="0" err="1">
+                <a:ln>
+                  <a:noFill/>
+                </a:ln>
+                <a:solidFill>
+                  <a:schemeClr val="tx1"/>
+                </a:solidFill>
+                <a:effectLst/>
+                <a:latin typeface="Calibri" panose="020F0502020204030204" pitchFamily="34" charset="0"/>
+                <a:ea typeface="Calibri" panose="020F0502020204030204" pitchFamily="34" charset="0"/>
+                <a:cs typeface="Times New Roman" panose="02020603050405020304" pitchFamily="18" charset="0"/>
+              </a:rPr>
+              <a:t>Pyjama</a:t>
+            </a:r>
+            <a:r>
+              <a:rPr kumimoji="0" lang="en-US" altLang="en-US" sz="1100" b="0" i="0" u="none" strike="noStrike" cap="none" normalizeH="0" baseline="0" dirty="0">
+                <a:ln>
+                  <a:noFill/>
+                </a:ln>
+                <a:solidFill>
+                  <a:schemeClr val="tx1"/>
+                </a:solidFill>
+                <a:effectLst/>
+                <a:latin typeface="Calibri" panose="020F0502020204030204" pitchFamily="34" charset="0"/>
+                <a:ea typeface="Calibri" panose="020F0502020204030204" pitchFamily="34" charset="0"/>
+                <a:cs typeface="Times New Roman" panose="02020603050405020304" pitchFamily="18" charset="0"/>
+              </a:rPr>
+              <a:t> or </a:t>
+            </a:r>
+            <a:r>
+              <a:rPr kumimoji="0" lang="en-US" altLang="en-US" sz="1100" b="0" i="0" u="none" strike="noStrike" cap="none" normalizeH="0" baseline="0" dirty="0" err="1">
+                <a:ln>
+                  <a:noFill/>
+                </a:ln>
+                <a:solidFill>
+                  <a:schemeClr val="tx1"/>
+                </a:solidFill>
+                <a:effectLst/>
+                <a:latin typeface="Calibri" panose="020F0502020204030204" pitchFamily="34" charset="0"/>
+                <a:ea typeface="Calibri" panose="020F0502020204030204" pitchFamily="34" charset="0"/>
+                <a:cs typeface="Times New Roman" panose="02020603050405020304" pitchFamily="18" charset="0"/>
+              </a:rPr>
+              <a:t>Paratask</a:t>
+            </a:r>
+            <a:endParaRPr kumimoji="0" lang="en-US" altLang="en-US" sz="1800" b="0" i="0" u="none" strike="noStrike" cap="none" normalizeH="0" baseline="0" dirty="0">
+              <a:ln>
+                <a:noFill/>
+              </a:ln>
+              <a:solidFill>
+                <a:schemeClr val="tx1"/>
+              </a:solidFill>
+              <a:effectLst/>
+              <a:latin typeface="Arial" panose="020B0604020202020204" pitchFamily="34" charset="0"/>
+            </a:endParaRPr>
+          </a:p>
+        </p:txBody>
+      </p:sp>
+      <p:sp>
+        <p:nvSpPr>
+          <p:cNvPr id="22" name="Text Box 20"/>
+          <p:cNvSpPr txBox="1">
+            <a:spLocks noChangeArrowheads="1"/>
+          </p:cNvSpPr>
+          <p:nvPr/>
+        </p:nvSpPr>
+        <p:spPr bwMode="auto">
+          <a:xfrm>
+            <a:off x="6325211" y="4068786"/>
             <a:ext cx="1257300" cy="601663"/>
           </a:xfrm>
           <a:prstGeom prst="rect">
@@ -3342,957 +4293,6 @@
               <a:tabLst/>
             </a:pPr>
             <a:r>
-              <a:rPr kumimoji="0" lang="en-US" altLang="en-US" sz="1100" b="0" i="0" u="none" strike="noStrike" cap="none" normalizeH="0" baseline="0" dirty="0">
-                <a:ln>
-                  <a:noFill/>
-                </a:ln>
-                <a:solidFill>
-                  <a:schemeClr val="tx1"/>
-                </a:solidFill>
-                <a:effectLst/>
-                <a:latin typeface="Calibri" panose="020F0502020204030204" pitchFamily="34" charset="0"/>
-                <a:ea typeface="Calibri" panose="020F0502020204030204" pitchFamily="34" charset="0"/>
-                <a:cs typeface="Times New Roman" panose="02020603050405020304" pitchFamily="18" charset="0"/>
-              </a:rPr>
-              <a:t>Parse command line input</a:t>
-            </a:r>
-            <a:endParaRPr kumimoji="0" lang="en-US" altLang="en-US" sz="1800" b="0" i="0" u="none" strike="noStrike" cap="none" normalizeH="0" baseline="0" dirty="0">
-              <a:ln>
-                <a:noFill/>
-              </a:ln>
-              <a:solidFill>
-                <a:schemeClr val="tx1"/>
-              </a:solidFill>
-              <a:effectLst/>
-              <a:latin typeface="Arial" panose="020B0604020202020204" pitchFamily="34" charset="0"/>
-            </a:endParaRPr>
-          </a:p>
-        </p:txBody>
-      </p:sp>
-      <p:sp>
-        <p:nvSpPr>
-          <p:cNvPr id="11" name="Text Box 9"/>
-          <p:cNvSpPr txBox="1">
-            <a:spLocks noChangeArrowheads="1"/>
-          </p:cNvSpPr>
-          <p:nvPr/>
-        </p:nvSpPr>
-        <p:spPr bwMode="auto">
-          <a:xfrm>
-            <a:off x="749118" y="4684769"/>
-            <a:ext cx="1285875" cy="601663"/>
-          </a:xfrm>
-          <a:prstGeom prst="rect">
-            <a:avLst/>
-          </a:prstGeom>
-          <a:solidFill>
-            <a:srgbClr val="FFFFFF"/>
-          </a:solidFill>
-          <a:ln w="6350">
-            <a:solidFill>
-              <a:srgbClr val="000000"/>
-            </a:solidFill>
-            <a:miter lim="800000"/>
-            <a:headEnd/>
-            <a:tailEnd/>
-          </a:ln>
-        </p:spPr>
-        <p:txBody>
-          <a:bodyPr vert="horz" wrap="square" lIns="91440" tIns="45720" rIns="91440" bIns="45720" numCol="1" anchor="ctr" anchorCtr="0" compatLnSpc="1">
-            <a:prstTxWarp prst="textNoShape">
-              <a:avLst/>
-            </a:prstTxWarp>
-          </a:bodyPr>
-          <a:lstStyle/>
-          <a:p>
-            <a:pPr marL="0" marR="0" lvl="0" indent="0" algn="ctr" defTabSz="914400" rtl="0" eaLnBrk="0" fontAlgn="base" latinLnBrk="0" hangingPunct="0">
-              <a:lnSpc>
-                <a:spcPct val="100000"/>
-              </a:lnSpc>
-              <a:spcBef>
-                <a:spcPct val="0"/>
-              </a:spcBef>
-              <a:spcAft>
-                <a:spcPct val="0"/>
-              </a:spcAft>
-              <a:buClrTx/>
-              <a:buSzTx/>
-              <a:buFontTx/>
-              <a:buNone/>
-              <a:tabLst/>
-            </a:pPr>
-            <a:r>
-              <a:rPr kumimoji="0" lang="en-US" altLang="en-US" sz="1100" b="0" i="0" u="none" strike="noStrike" cap="none" normalizeH="0" baseline="0" dirty="0">
-                <a:ln>
-                  <a:noFill/>
-                </a:ln>
-                <a:solidFill>
-                  <a:schemeClr val="tx1"/>
-                </a:solidFill>
-                <a:effectLst/>
-                <a:latin typeface="Calibri" panose="020F0502020204030204" pitchFamily="34" charset="0"/>
-                <a:ea typeface="Calibri" panose="020F0502020204030204" pitchFamily="34" charset="0"/>
-                <a:cs typeface="Times New Roman" panose="02020603050405020304" pitchFamily="18" charset="0"/>
-              </a:rPr>
-              <a:t>Format valid output file</a:t>
-            </a:r>
-            <a:endParaRPr kumimoji="0" lang="en-US" altLang="en-US" sz="1800" b="0" i="0" u="none" strike="noStrike" cap="none" normalizeH="0" baseline="0" dirty="0">
-              <a:ln>
-                <a:noFill/>
-              </a:ln>
-              <a:solidFill>
-                <a:schemeClr val="tx1"/>
-              </a:solidFill>
-              <a:effectLst/>
-              <a:latin typeface="Arial" panose="020B0604020202020204" pitchFamily="34" charset="0"/>
-            </a:endParaRPr>
-          </a:p>
-        </p:txBody>
-      </p:sp>
-      <p:sp>
-        <p:nvSpPr>
-          <p:cNvPr id="13" name="Text Box 11"/>
-          <p:cNvSpPr txBox="1">
-            <a:spLocks noChangeArrowheads="1"/>
-          </p:cNvSpPr>
-          <p:nvPr/>
-        </p:nvSpPr>
-        <p:spPr bwMode="auto">
-          <a:xfrm>
-            <a:off x="2238985" y="2940261"/>
-            <a:ext cx="1257300" cy="601663"/>
-          </a:xfrm>
-          <a:prstGeom prst="rect">
-            <a:avLst/>
-          </a:prstGeom>
-          <a:solidFill>
-            <a:srgbClr val="FFFFFF"/>
-          </a:solidFill>
-          <a:ln w="6350">
-            <a:solidFill>
-              <a:srgbClr val="000000"/>
-            </a:solidFill>
-            <a:miter lim="800000"/>
-            <a:headEnd/>
-            <a:tailEnd/>
-          </a:ln>
-        </p:spPr>
-        <p:txBody>
-          <a:bodyPr vert="horz" wrap="square" lIns="91440" tIns="45720" rIns="91440" bIns="45720" numCol="1" anchor="ctr" anchorCtr="0" compatLnSpc="1">
-            <a:prstTxWarp prst="textNoShape">
-              <a:avLst/>
-            </a:prstTxWarp>
-          </a:bodyPr>
-          <a:lstStyle/>
-          <a:p>
-            <a:pPr marL="0" marR="0" lvl="0" indent="0" algn="ctr" defTabSz="914400" rtl="0" eaLnBrk="0" fontAlgn="base" latinLnBrk="0" hangingPunct="0">
-              <a:lnSpc>
-                <a:spcPct val="100000"/>
-              </a:lnSpc>
-              <a:spcBef>
-                <a:spcPct val="0"/>
-              </a:spcBef>
-              <a:spcAft>
-                <a:spcPct val="0"/>
-              </a:spcAft>
-              <a:buClrTx/>
-              <a:buSzTx/>
-              <a:buFontTx/>
-              <a:buNone/>
-              <a:tabLst/>
-            </a:pPr>
-            <a:r>
-              <a:rPr kumimoji="0" lang="en-US" altLang="en-US" sz="1100" b="0" i="0" u="none" strike="noStrike" cap="none" normalizeH="0" baseline="0" dirty="0">
-                <a:ln>
-                  <a:noFill/>
-                </a:ln>
-                <a:solidFill>
-                  <a:schemeClr val="tx1"/>
-                </a:solidFill>
-                <a:effectLst/>
-                <a:latin typeface="Calibri" panose="020F0502020204030204" pitchFamily="34" charset="0"/>
-                <a:ea typeface="Calibri" panose="020F0502020204030204" pitchFamily="34" charset="0"/>
-                <a:cs typeface="Times New Roman" panose="02020603050405020304" pitchFamily="18" charset="0"/>
-              </a:rPr>
-              <a:t>Creation</a:t>
-            </a:r>
-            <a:r>
-              <a:rPr kumimoji="0" lang="en-US" altLang="en-US" sz="1100" b="0" i="0" u="none" strike="noStrike" cap="none" normalizeH="0" dirty="0">
-                <a:ln>
-                  <a:noFill/>
-                </a:ln>
-                <a:solidFill>
-                  <a:schemeClr val="tx1"/>
-                </a:solidFill>
-                <a:effectLst/>
-                <a:latin typeface="Calibri" panose="020F0502020204030204" pitchFamily="34" charset="0"/>
-                <a:ea typeface="Calibri" panose="020F0502020204030204" pitchFamily="34" charset="0"/>
-                <a:cs typeface="Times New Roman" panose="02020603050405020304" pitchFamily="18" charset="0"/>
-              </a:rPr>
-              <a:t> of</a:t>
-            </a:r>
-            <a:r>
-              <a:rPr kumimoji="0" lang="en-US" altLang="en-US" sz="1100" b="0" i="0" u="none" strike="noStrike" cap="none" normalizeH="0" baseline="0" dirty="0">
-                <a:ln>
-                  <a:noFill/>
-                </a:ln>
-                <a:solidFill>
-                  <a:schemeClr val="tx1"/>
-                </a:solidFill>
-                <a:effectLst/>
-                <a:latin typeface="Calibri" panose="020F0502020204030204" pitchFamily="34" charset="0"/>
-                <a:ea typeface="Calibri" panose="020F0502020204030204" pitchFamily="34" charset="0"/>
-                <a:cs typeface="Times New Roman" panose="02020603050405020304" pitchFamily="18" charset="0"/>
-              </a:rPr>
-              <a:t> data structure</a:t>
-            </a:r>
-            <a:endParaRPr kumimoji="0" lang="en-US" altLang="en-US" sz="1800" b="0" i="0" u="none" strike="noStrike" cap="none" normalizeH="0" baseline="0" dirty="0">
-              <a:ln>
-                <a:noFill/>
-              </a:ln>
-              <a:solidFill>
-                <a:schemeClr val="tx1"/>
-              </a:solidFill>
-              <a:effectLst/>
-              <a:latin typeface="Arial" panose="020B0604020202020204" pitchFamily="34" charset="0"/>
-            </a:endParaRPr>
-          </a:p>
-        </p:txBody>
-      </p:sp>
-      <p:sp>
-        <p:nvSpPr>
-          <p:cNvPr id="15" name="Text Box 13"/>
-          <p:cNvSpPr txBox="1">
-            <a:spLocks noChangeArrowheads="1"/>
-          </p:cNvSpPr>
-          <p:nvPr/>
-        </p:nvSpPr>
-        <p:spPr bwMode="auto">
-          <a:xfrm>
-            <a:off x="4262070" y="2570312"/>
-            <a:ext cx="1257300" cy="601662"/>
-          </a:xfrm>
-          <a:prstGeom prst="rect">
-            <a:avLst/>
-          </a:prstGeom>
-          <a:solidFill>
-            <a:srgbClr val="FFFFFF"/>
-          </a:solidFill>
-          <a:ln w="6350">
-            <a:solidFill>
-              <a:srgbClr val="000000"/>
-            </a:solidFill>
-            <a:miter lim="800000"/>
-            <a:headEnd/>
-            <a:tailEnd/>
-          </a:ln>
-        </p:spPr>
-        <p:txBody>
-          <a:bodyPr vert="horz" wrap="square" lIns="91440" tIns="45720" rIns="91440" bIns="45720" numCol="1" anchor="ctr" anchorCtr="0" compatLnSpc="1">
-            <a:prstTxWarp prst="textNoShape">
-              <a:avLst/>
-            </a:prstTxWarp>
-          </a:bodyPr>
-          <a:lstStyle/>
-          <a:p>
-            <a:pPr marL="0" marR="0" lvl="0" indent="0" algn="ctr" defTabSz="914400" rtl="0" eaLnBrk="0" fontAlgn="base" latinLnBrk="0" hangingPunct="0">
-              <a:lnSpc>
-                <a:spcPct val="100000"/>
-              </a:lnSpc>
-              <a:spcBef>
-                <a:spcPct val="0"/>
-              </a:spcBef>
-              <a:spcAft>
-                <a:spcPct val="0"/>
-              </a:spcAft>
-              <a:buClrTx/>
-              <a:buSzTx/>
-              <a:buFontTx/>
-              <a:buNone/>
-              <a:tabLst/>
-            </a:pPr>
-            <a:r>
-              <a:rPr kumimoji="0" lang="en-US" altLang="en-US" sz="1100" b="0" i="0" u="none" strike="noStrike" cap="none" normalizeH="0" baseline="0" dirty="0">
-                <a:ln>
-                  <a:noFill/>
-                </a:ln>
-                <a:solidFill>
-                  <a:schemeClr val="tx1"/>
-                </a:solidFill>
-                <a:effectLst/>
-                <a:latin typeface="Calibri" panose="020F0502020204030204" pitchFamily="34" charset="0"/>
-                <a:ea typeface="Calibri" panose="020F0502020204030204" pitchFamily="34" charset="0"/>
-                <a:cs typeface="Times New Roman" panose="02020603050405020304" pitchFamily="18" charset="0"/>
-              </a:rPr>
-              <a:t>Initalise data structure</a:t>
-            </a:r>
-            <a:r>
-              <a:rPr kumimoji="0" lang="en-US" altLang="en-US" sz="1100" b="0" i="0" u="none" strike="noStrike" cap="none" normalizeH="0" dirty="0">
-                <a:ln>
-                  <a:noFill/>
-                </a:ln>
-                <a:solidFill>
-                  <a:schemeClr val="tx1"/>
-                </a:solidFill>
-                <a:effectLst/>
-                <a:latin typeface="Calibri" panose="020F0502020204030204" pitchFamily="34" charset="0"/>
-                <a:ea typeface="Calibri" panose="020F0502020204030204" pitchFamily="34" charset="0"/>
-                <a:cs typeface="Times New Roman" panose="02020603050405020304" pitchFamily="18" charset="0"/>
-              </a:rPr>
-              <a:t> with input</a:t>
-            </a:r>
-            <a:endParaRPr kumimoji="0" lang="en-US" altLang="en-US" sz="1800" b="0" i="0" u="none" strike="noStrike" cap="none" normalizeH="0" baseline="0" dirty="0">
-              <a:ln>
-                <a:noFill/>
-              </a:ln>
-              <a:solidFill>
-                <a:schemeClr val="tx1"/>
-              </a:solidFill>
-              <a:effectLst/>
-              <a:latin typeface="Arial" panose="020B0604020202020204" pitchFamily="34" charset="0"/>
-            </a:endParaRPr>
-          </a:p>
-        </p:txBody>
-      </p:sp>
-      <p:sp>
-        <p:nvSpPr>
-          <p:cNvPr id="16" name="Text Box 14"/>
-          <p:cNvSpPr txBox="1">
-            <a:spLocks noChangeArrowheads="1"/>
-          </p:cNvSpPr>
-          <p:nvPr/>
-        </p:nvSpPr>
-        <p:spPr bwMode="auto">
-          <a:xfrm>
-            <a:off x="6006732" y="2570312"/>
-            <a:ext cx="1257300" cy="601663"/>
-          </a:xfrm>
-          <a:prstGeom prst="rect">
-            <a:avLst/>
-          </a:prstGeom>
-          <a:solidFill>
-            <a:srgbClr val="FFFFFF"/>
-          </a:solidFill>
-          <a:ln w="6350">
-            <a:solidFill>
-              <a:srgbClr val="000000"/>
-            </a:solidFill>
-            <a:miter lim="800000"/>
-            <a:headEnd/>
-            <a:tailEnd/>
-          </a:ln>
-        </p:spPr>
-        <p:txBody>
-          <a:bodyPr vert="horz" wrap="square" lIns="91440" tIns="45720" rIns="91440" bIns="45720" numCol="1" anchor="ctr" anchorCtr="0" compatLnSpc="1">
-            <a:prstTxWarp prst="textNoShape">
-              <a:avLst/>
-            </a:prstTxWarp>
-          </a:bodyPr>
-          <a:lstStyle/>
-          <a:p>
-            <a:pPr marL="0" marR="0" lvl="0" indent="0" algn="ctr" defTabSz="914400" rtl="0" eaLnBrk="0" fontAlgn="base" latinLnBrk="0" hangingPunct="0">
-              <a:lnSpc>
-                <a:spcPct val="100000"/>
-              </a:lnSpc>
-              <a:spcBef>
-                <a:spcPct val="0"/>
-              </a:spcBef>
-              <a:spcAft>
-                <a:spcPct val="0"/>
-              </a:spcAft>
-              <a:buClrTx/>
-              <a:buSzTx/>
-              <a:buFontTx/>
-              <a:buNone/>
-              <a:tabLst/>
-            </a:pPr>
-            <a:r>
-              <a:rPr lang="en-US" altLang="en-US" sz="1100" dirty="0">
-                <a:latin typeface="Calibri" panose="020F0502020204030204" pitchFamily="34" charset="0"/>
-                <a:ea typeface="Calibri" panose="020F0502020204030204" pitchFamily="34" charset="0"/>
-                <a:cs typeface="Times New Roman" panose="02020603050405020304" pitchFamily="18" charset="0"/>
-              </a:rPr>
-              <a:t>Produce </a:t>
-            </a:r>
-            <a:r>
-              <a:rPr kumimoji="0" lang="en-US" altLang="en-US" sz="1100" b="0" i="0" u="none" strike="noStrike" cap="none" normalizeH="0" baseline="0" dirty="0">
-                <a:ln>
-                  <a:noFill/>
-                </a:ln>
-                <a:solidFill>
-                  <a:schemeClr val="tx1"/>
-                </a:solidFill>
-                <a:effectLst/>
-                <a:latin typeface="Calibri" panose="020F0502020204030204" pitchFamily="34" charset="0"/>
-                <a:ea typeface="Calibri" panose="020F0502020204030204" pitchFamily="34" charset="0"/>
-                <a:cs typeface="Times New Roman" panose="02020603050405020304" pitchFamily="18" charset="0"/>
-              </a:rPr>
-              <a:t>any valid schedule</a:t>
-            </a:r>
-            <a:endParaRPr kumimoji="0" lang="en-US" altLang="en-US" sz="1800" b="0" i="0" u="none" strike="noStrike" cap="none" normalizeH="0" baseline="0" dirty="0">
-              <a:ln>
-                <a:noFill/>
-              </a:ln>
-              <a:solidFill>
-                <a:schemeClr val="tx1"/>
-              </a:solidFill>
-              <a:effectLst/>
-              <a:latin typeface="Arial" panose="020B0604020202020204" pitchFamily="34" charset="0"/>
-            </a:endParaRPr>
-          </a:p>
-        </p:txBody>
-      </p:sp>
-      <p:sp>
-        <p:nvSpPr>
-          <p:cNvPr id="17" name="Text Box 15"/>
-          <p:cNvSpPr txBox="1">
-            <a:spLocks noChangeArrowheads="1"/>
-          </p:cNvSpPr>
-          <p:nvPr/>
-        </p:nvSpPr>
-        <p:spPr bwMode="auto">
-          <a:xfrm>
-            <a:off x="7751395" y="1673499"/>
-            <a:ext cx="1257300" cy="601662"/>
-          </a:xfrm>
-          <a:prstGeom prst="rect">
-            <a:avLst/>
-          </a:prstGeom>
-          <a:solidFill>
-            <a:srgbClr val="FFFFFF"/>
-          </a:solidFill>
-          <a:ln w="6350">
-            <a:solidFill>
-              <a:srgbClr val="000000"/>
-            </a:solidFill>
-            <a:miter lim="800000"/>
-            <a:headEnd/>
-            <a:tailEnd/>
-          </a:ln>
-        </p:spPr>
-        <p:txBody>
-          <a:bodyPr vert="horz" wrap="square" lIns="91440" tIns="45720" rIns="91440" bIns="45720" numCol="1" anchor="ctr" anchorCtr="0" compatLnSpc="1">
-            <a:prstTxWarp prst="textNoShape">
-              <a:avLst/>
-            </a:prstTxWarp>
-          </a:bodyPr>
-          <a:lstStyle/>
-          <a:p>
-            <a:pPr marL="0" marR="0" lvl="0" indent="0" algn="ctr" defTabSz="914400" rtl="0" eaLnBrk="0" fontAlgn="base" latinLnBrk="0" hangingPunct="0">
-              <a:lnSpc>
-                <a:spcPct val="100000"/>
-              </a:lnSpc>
-              <a:spcBef>
-                <a:spcPct val="0"/>
-              </a:spcBef>
-              <a:spcAft>
-                <a:spcPct val="0"/>
-              </a:spcAft>
-              <a:buClrTx/>
-              <a:buSzTx/>
-              <a:buFontTx/>
-              <a:buNone/>
-              <a:tabLst/>
-            </a:pPr>
-            <a:r>
-              <a:rPr kumimoji="0" lang="en-US" altLang="en-US" sz="1100" b="0" i="0" u="none" strike="noStrike" cap="none" normalizeH="0" baseline="0" dirty="0">
-                <a:ln>
-                  <a:noFill/>
-                </a:ln>
-                <a:solidFill>
-                  <a:schemeClr val="tx1"/>
-                </a:solidFill>
-                <a:effectLst/>
-                <a:latin typeface="Calibri" panose="020F0502020204030204" pitchFamily="34" charset="0"/>
-                <a:ea typeface="Calibri" panose="020F0502020204030204" pitchFamily="34" charset="0"/>
-                <a:cs typeface="Times New Roman" panose="02020603050405020304" pitchFamily="18" charset="0"/>
-              </a:rPr>
-              <a:t>Decision of</a:t>
-            </a:r>
-            <a:r>
-              <a:rPr kumimoji="0" lang="en-US" altLang="en-US" sz="1100" b="0" i="0" u="none" strike="noStrike" cap="none" normalizeH="0" dirty="0">
-                <a:ln>
-                  <a:noFill/>
-                </a:ln>
-                <a:solidFill>
-                  <a:schemeClr val="tx1"/>
-                </a:solidFill>
-                <a:effectLst/>
-                <a:latin typeface="Calibri" panose="020F0502020204030204" pitchFamily="34" charset="0"/>
-                <a:ea typeface="Calibri" panose="020F0502020204030204" pitchFamily="34" charset="0"/>
-                <a:cs typeface="Times New Roman" panose="02020603050405020304" pitchFamily="18" charset="0"/>
-              </a:rPr>
-              <a:t> </a:t>
-            </a:r>
-            <a:r>
-              <a:rPr kumimoji="0" lang="en-US" altLang="en-US" sz="1100" b="0" i="0" u="none" strike="noStrike" cap="none" normalizeH="0" baseline="0" dirty="0">
-                <a:ln>
-                  <a:noFill/>
-                </a:ln>
-                <a:solidFill>
-                  <a:schemeClr val="tx1"/>
-                </a:solidFill>
-                <a:effectLst/>
-                <a:latin typeface="Calibri" panose="020F0502020204030204" pitchFamily="34" charset="0"/>
-                <a:ea typeface="Calibri" panose="020F0502020204030204" pitchFamily="34" charset="0"/>
-                <a:cs typeface="Times New Roman" panose="02020603050405020304" pitchFamily="18" charset="0"/>
-              </a:rPr>
-              <a:t>visualization method</a:t>
-            </a:r>
-            <a:endParaRPr kumimoji="0" lang="en-US" altLang="en-US" sz="1800" b="0" i="0" u="none" strike="noStrike" cap="none" normalizeH="0" baseline="0" dirty="0">
-              <a:ln>
-                <a:noFill/>
-              </a:ln>
-              <a:solidFill>
-                <a:schemeClr val="tx1"/>
-              </a:solidFill>
-              <a:effectLst/>
-              <a:latin typeface="Arial" panose="020B0604020202020204" pitchFamily="34" charset="0"/>
-            </a:endParaRPr>
-          </a:p>
-        </p:txBody>
-      </p:sp>
-      <p:sp>
-        <p:nvSpPr>
-          <p:cNvPr id="18" name="Text Box 16"/>
-          <p:cNvSpPr txBox="1">
-            <a:spLocks noChangeArrowheads="1"/>
-          </p:cNvSpPr>
-          <p:nvPr/>
-        </p:nvSpPr>
-        <p:spPr bwMode="auto">
-          <a:xfrm>
-            <a:off x="7751395" y="2570311"/>
-            <a:ext cx="1257300" cy="601663"/>
-          </a:xfrm>
-          <a:prstGeom prst="rect">
-            <a:avLst/>
-          </a:prstGeom>
-          <a:solidFill>
-            <a:srgbClr val="FFFFFF"/>
-          </a:solidFill>
-          <a:ln w="6350">
-            <a:solidFill>
-              <a:srgbClr val="000000"/>
-            </a:solidFill>
-            <a:miter lim="800000"/>
-            <a:headEnd/>
-            <a:tailEnd/>
-          </a:ln>
-        </p:spPr>
-        <p:txBody>
-          <a:bodyPr vert="horz" wrap="square" lIns="91440" tIns="45720" rIns="91440" bIns="45720" numCol="1" anchor="ctr" anchorCtr="0" compatLnSpc="1">
-            <a:prstTxWarp prst="textNoShape">
-              <a:avLst/>
-            </a:prstTxWarp>
-          </a:bodyPr>
-          <a:lstStyle/>
-          <a:p>
-            <a:pPr marL="0" marR="0" lvl="0" indent="0" algn="ctr" defTabSz="914400" rtl="0" eaLnBrk="0" fontAlgn="base" latinLnBrk="0" hangingPunct="0">
-              <a:lnSpc>
-                <a:spcPct val="100000"/>
-              </a:lnSpc>
-              <a:spcBef>
-                <a:spcPct val="0"/>
-              </a:spcBef>
-              <a:spcAft>
-                <a:spcPct val="0"/>
-              </a:spcAft>
-              <a:buClrTx/>
-              <a:buSzTx/>
-              <a:buFontTx/>
-              <a:buNone/>
-              <a:tabLst/>
-            </a:pPr>
-            <a:r>
-              <a:rPr kumimoji="0" lang="en-US" altLang="en-US" sz="1100" b="0" i="0" u="none" strike="noStrike" cap="none" normalizeH="0" baseline="0">
-                <a:ln>
-                  <a:noFill/>
-                </a:ln>
-                <a:solidFill>
-                  <a:schemeClr val="tx1"/>
-                </a:solidFill>
-                <a:effectLst/>
-                <a:latin typeface="Calibri" panose="020F0502020204030204" pitchFamily="34" charset="0"/>
-                <a:ea typeface="Calibri" panose="020F0502020204030204" pitchFamily="34" charset="0"/>
-                <a:cs typeface="Times New Roman" panose="02020603050405020304" pitchFamily="18" charset="0"/>
-              </a:rPr>
-              <a:t>Implement Visualisation</a:t>
-            </a:r>
-            <a:endParaRPr kumimoji="0" lang="en-US" altLang="en-US" sz="1800" b="0" i="0" u="none" strike="noStrike" cap="none" normalizeH="0" baseline="0">
-              <a:ln>
-                <a:noFill/>
-              </a:ln>
-              <a:solidFill>
-                <a:schemeClr val="tx1"/>
-              </a:solidFill>
-              <a:effectLst/>
-              <a:latin typeface="Arial" panose="020B0604020202020204" pitchFamily="34" charset="0"/>
-            </a:endParaRPr>
-          </a:p>
-        </p:txBody>
-      </p:sp>
-      <p:sp>
-        <p:nvSpPr>
-          <p:cNvPr id="19" name="Text Box 17"/>
-          <p:cNvSpPr txBox="1">
-            <a:spLocks noChangeArrowheads="1"/>
-          </p:cNvSpPr>
-          <p:nvPr/>
-        </p:nvSpPr>
-        <p:spPr bwMode="auto">
-          <a:xfrm>
-            <a:off x="2543879" y="4690942"/>
-            <a:ext cx="1257300" cy="595489"/>
-          </a:xfrm>
-          <a:prstGeom prst="rect">
-            <a:avLst/>
-          </a:prstGeom>
-          <a:solidFill>
-            <a:srgbClr val="FFFFFF"/>
-          </a:solidFill>
-          <a:ln w="6350">
-            <a:solidFill>
-              <a:srgbClr val="000000"/>
-            </a:solidFill>
-            <a:miter lim="800000"/>
-            <a:headEnd/>
-            <a:tailEnd/>
-          </a:ln>
-        </p:spPr>
-        <p:txBody>
-          <a:bodyPr vert="horz" wrap="square" lIns="91440" tIns="45720" rIns="91440" bIns="45720" numCol="1" anchor="ctr" anchorCtr="0" compatLnSpc="1">
-            <a:prstTxWarp prst="textNoShape">
-              <a:avLst/>
-            </a:prstTxWarp>
-          </a:bodyPr>
-          <a:lstStyle/>
-          <a:p>
-            <a:pPr marL="0" marR="0" lvl="0" indent="0" algn="ctr" defTabSz="914400" rtl="0" eaLnBrk="0" fontAlgn="base" latinLnBrk="0" hangingPunct="0">
-              <a:lnSpc>
-                <a:spcPct val="100000"/>
-              </a:lnSpc>
-              <a:spcBef>
-                <a:spcPct val="0"/>
-              </a:spcBef>
-              <a:spcAft>
-                <a:spcPct val="0"/>
-              </a:spcAft>
-              <a:buClrTx/>
-              <a:buSzTx/>
-              <a:buFontTx/>
-              <a:buNone/>
-              <a:tabLst/>
-            </a:pPr>
-            <a:r>
-              <a:rPr kumimoji="0" lang="en-US" altLang="en-US" sz="1100" b="0" i="0" u="none" strike="noStrike" cap="none" normalizeH="0" baseline="0" dirty="0">
-                <a:ln>
-                  <a:noFill/>
-                </a:ln>
-                <a:solidFill>
-                  <a:schemeClr val="tx1"/>
-                </a:solidFill>
-                <a:effectLst/>
-                <a:latin typeface="Calibri" panose="020F0502020204030204" pitchFamily="34" charset="0"/>
-                <a:ea typeface="Calibri" panose="020F0502020204030204" pitchFamily="34" charset="0"/>
-                <a:cs typeface="Times New Roman" panose="02020603050405020304" pitchFamily="18" charset="0"/>
-              </a:rPr>
-              <a:t>Consider all possible solutions</a:t>
-            </a:r>
-            <a:endParaRPr kumimoji="0" lang="en-US" altLang="en-US" sz="1800" b="0" i="0" u="none" strike="noStrike" cap="none" normalizeH="0" baseline="0" dirty="0">
-              <a:ln>
-                <a:noFill/>
-              </a:ln>
-              <a:solidFill>
-                <a:schemeClr val="tx1"/>
-              </a:solidFill>
-              <a:effectLst/>
-              <a:latin typeface="Arial" panose="020B0604020202020204" pitchFamily="34" charset="0"/>
-            </a:endParaRPr>
-          </a:p>
-        </p:txBody>
-      </p:sp>
-      <p:sp>
-        <p:nvSpPr>
-          <p:cNvPr id="20" name="Text Box 18"/>
-          <p:cNvSpPr txBox="1">
-            <a:spLocks noChangeArrowheads="1"/>
-          </p:cNvSpPr>
-          <p:nvPr/>
-        </p:nvSpPr>
-        <p:spPr bwMode="auto">
-          <a:xfrm>
-            <a:off x="4310065" y="4685297"/>
-            <a:ext cx="1257300" cy="601134"/>
-          </a:xfrm>
-          <a:prstGeom prst="rect">
-            <a:avLst/>
-          </a:prstGeom>
-          <a:solidFill>
-            <a:srgbClr val="FFFFFF"/>
-          </a:solidFill>
-          <a:ln w="6350">
-            <a:solidFill>
-              <a:srgbClr val="000000"/>
-            </a:solidFill>
-            <a:miter lim="800000"/>
-            <a:headEnd/>
-            <a:tailEnd/>
-          </a:ln>
-        </p:spPr>
-        <p:txBody>
-          <a:bodyPr vert="horz" wrap="square" lIns="91440" tIns="45720" rIns="91440" bIns="45720" numCol="1" anchor="ctr" anchorCtr="0" compatLnSpc="1">
-            <a:prstTxWarp prst="textNoShape">
-              <a:avLst/>
-            </a:prstTxWarp>
-          </a:bodyPr>
-          <a:lstStyle/>
-          <a:p>
-            <a:pPr marL="0" marR="0" lvl="0" indent="0" algn="ctr" defTabSz="914400" rtl="0" eaLnBrk="0" fontAlgn="base" latinLnBrk="0" hangingPunct="0">
-              <a:lnSpc>
-                <a:spcPct val="100000"/>
-              </a:lnSpc>
-              <a:spcBef>
-                <a:spcPct val="0"/>
-              </a:spcBef>
-              <a:spcAft>
-                <a:spcPct val="0"/>
-              </a:spcAft>
-              <a:buClrTx/>
-              <a:buSzTx/>
-              <a:buFontTx/>
-              <a:buNone/>
-              <a:tabLst/>
-            </a:pPr>
-            <a:r>
-              <a:rPr kumimoji="0" lang="en-US" altLang="en-US" sz="1100" b="0" i="0" u="none" strike="noStrike" cap="none" normalizeH="0" baseline="0">
-                <a:ln>
-                  <a:noFill/>
-                </a:ln>
-                <a:solidFill>
-                  <a:schemeClr val="tx1"/>
-                </a:solidFill>
-                <a:effectLst/>
-                <a:latin typeface="Calibri" panose="020F0502020204030204" pitchFamily="34" charset="0"/>
-                <a:ea typeface="Calibri" panose="020F0502020204030204" pitchFamily="34" charset="0"/>
-                <a:cs typeface="Times New Roman" panose="02020603050405020304" pitchFamily="18" charset="0"/>
-              </a:rPr>
-              <a:t>Use depth first branch and bound algorithm</a:t>
-            </a:r>
-            <a:endParaRPr kumimoji="0" lang="en-US" altLang="en-US" sz="1800" b="0" i="0" u="none" strike="noStrike" cap="none" normalizeH="0" baseline="0">
-              <a:ln>
-                <a:noFill/>
-              </a:ln>
-              <a:solidFill>
-                <a:schemeClr val="tx1"/>
-              </a:solidFill>
-              <a:effectLst/>
-              <a:latin typeface="Arial" panose="020B0604020202020204" pitchFamily="34" charset="0"/>
-            </a:endParaRPr>
-          </a:p>
-        </p:txBody>
-      </p:sp>
-      <p:sp>
-        <p:nvSpPr>
-          <p:cNvPr id="21" name="Text Box 19"/>
-          <p:cNvSpPr txBox="1">
-            <a:spLocks noChangeArrowheads="1"/>
-          </p:cNvSpPr>
-          <p:nvPr/>
-        </p:nvSpPr>
-        <p:spPr bwMode="auto">
-          <a:xfrm>
-            <a:off x="8465703" y="4498202"/>
-            <a:ext cx="1257300" cy="815975"/>
-          </a:xfrm>
-          <a:prstGeom prst="rect">
-            <a:avLst/>
-          </a:prstGeom>
-          <a:solidFill>
-            <a:srgbClr val="FFFFFF"/>
-          </a:solidFill>
-          <a:ln w="6350">
-            <a:solidFill>
-              <a:srgbClr val="000000"/>
-            </a:solidFill>
-            <a:miter lim="800000"/>
-            <a:headEnd/>
-            <a:tailEnd/>
-          </a:ln>
-        </p:spPr>
-        <p:txBody>
-          <a:bodyPr vert="horz" wrap="square" lIns="91440" tIns="45720" rIns="91440" bIns="45720" numCol="1" anchor="ctr" anchorCtr="0" compatLnSpc="1">
-            <a:prstTxWarp prst="textNoShape">
-              <a:avLst/>
-            </a:prstTxWarp>
-          </a:bodyPr>
-          <a:lstStyle/>
-          <a:p>
-            <a:pPr marL="0" marR="0" lvl="0" indent="0" algn="ctr" defTabSz="914400" rtl="0" eaLnBrk="0" fontAlgn="base" latinLnBrk="0" hangingPunct="0">
-              <a:lnSpc>
-                <a:spcPct val="100000"/>
-              </a:lnSpc>
-              <a:spcBef>
-                <a:spcPct val="0"/>
-              </a:spcBef>
-              <a:spcAft>
-                <a:spcPct val="0"/>
-              </a:spcAft>
-              <a:buClrTx/>
-              <a:buSzTx/>
-              <a:buFontTx/>
-              <a:buNone/>
-              <a:tabLst/>
-            </a:pPr>
-            <a:r>
-              <a:rPr kumimoji="0" lang="en-US" altLang="en-US" sz="1100" b="0" i="0" u="none" strike="noStrike" cap="none" normalizeH="0" baseline="0" dirty="0">
-                <a:ln>
-                  <a:noFill/>
-                </a:ln>
-                <a:solidFill>
-                  <a:schemeClr val="tx1"/>
-                </a:solidFill>
-                <a:effectLst/>
-                <a:latin typeface="Calibri" panose="020F0502020204030204" pitchFamily="34" charset="0"/>
-                <a:ea typeface="Calibri" panose="020F0502020204030204" pitchFamily="34" charset="0"/>
-                <a:cs typeface="Times New Roman" panose="02020603050405020304" pitchFamily="18" charset="0"/>
-              </a:rPr>
-              <a:t>Implement </a:t>
-            </a:r>
-            <a:r>
-              <a:rPr lang="en-US" altLang="en-US" sz="1100" dirty="0">
-                <a:latin typeface="Calibri" panose="020F0502020204030204" pitchFamily="34" charset="0"/>
-                <a:ea typeface="Calibri" panose="020F0502020204030204" pitchFamily="34" charset="0"/>
-                <a:cs typeface="Times New Roman" panose="02020603050405020304" pitchFamily="18" charset="0"/>
-              </a:rPr>
-              <a:t>using</a:t>
-            </a:r>
-            <a:r>
-              <a:rPr kumimoji="0" lang="en-US" altLang="en-US" sz="1100" b="0" i="0" u="none" strike="noStrike" cap="none" normalizeH="0" baseline="0" dirty="0">
-                <a:ln>
-                  <a:noFill/>
-                </a:ln>
-                <a:solidFill>
-                  <a:schemeClr val="tx1"/>
-                </a:solidFill>
-                <a:effectLst/>
-                <a:latin typeface="Calibri" panose="020F0502020204030204" pitchFamily="34" charset="0"/>
-                <a:ea typeface="Calibri" panose="020F0502020204030204" pitchFamily="34" charset="0"/>
-                <a:cs typeface="Times New Roman" panose="02020603050405020304" pitchFamily="18" charset="0"/>
-              </a:rPr>
-              <a:t> </a:t>
-            </a:r>
-            <a:r>
-              <a:rPr kumimoji="0" lang="en-US" altLang="en-US" sz="1100" b="0" i="0" u="none" strike="noStrike" cap="none" normalizeH="0" baseline="0" dirty="0" err="1">
-                <a:ln>
-                  <a:noFill/>
-                </a:ln>
-                <a:solidFill>
-                  <a:schemeClr val="tx1"/>
-                </a:solidFill>
-                <a:effectLst/>
-                <a:latin typeface="Calibri" panose="020F0502020204030204" pitchFamily="34" charset="0"/>
-                <a:ea typeface="Calibri" panose="020F0502020204030204" pitchFamily="34" charset="0"/>
-                <a:cs typeface="Times New Roman" panose="02020603050405020304" pitchFamily="18" charset="0"/>
-              </a:rPr>
-              <a:t>Pyjama</a:t>
-            </a:r>
-            <a:r>
-              <a:rPr kumimoji="0" lang="en-US" altLang="en-US" sz="1100" b="0" i="0" u="none" strike="noStrike" cap="none" normalizeH="0" baseline="0" dirty="0">
-                <a:ln>
-                  <a:noFill/>
-                </a:ln>
-                <a:solidFill>
-                  <a:schemeClr val="tx1"/>
-                </a:solidFill>
-                <a:effectLst/>
-                <a:latin typeface="Calibri" panose="020F0502020204030204" pitchFamily="34" charset="0"/>
-                <a:ea typeface="Calibri" panose="020F0502020204030204" pitchFamily="34" charset="0"/>
-                <a:cs typeface="Times New Roman" panose="02020603050405020304" pitchFamily="18" charset="0"/>
-              </a:rPr>
-              <a:t> or </a:t>
-            </a:r>
-            <a:r>
-              <a:rPr kumimoji="0" lang="en-US" altLang="en-US" sz="1100" b="0" i="0" u="none" strike="noStrike" cap="none" normalizeH="0" baseline="0" dirty="0" err="1">
-                <a:ln>
-                  <a:noFill/>
-                </a:ln>
-                <a:solidFill>
-                  <a:schemeClr val="tx1"/>
-                </a:solidFill>
-                <a:effectLst/>
-                <a:latin typeface="Calibri" panose="020F0502020204030204" pitchFamily="34" charset="0"/>
-                <a:ea typeface="Calibri" panose="020F0502020204030204" pitchFamily="34" charset="0"/>
-                <a:cs typeface="Times New Roman" panose="02020603050405020304" pitchFamily="18" charset="0"/>
-              </a:rPr>
-              <a:t>Paratask</a:t>
-            </a:r>
-            <a:endParaRPr kumimoji="0" lang="en-US" altLang="en-US" sz="1800" b="0" i="0" u="none" strike="noStrike" cap="none" normalizeH="0" baseline="0" dirty="0">
-              <a:ln>
-                <a:noFill/>
-              </a:ln>
-              <a:solidFill>
-                <a:schemeClr val="tx1"/>
-              </a:solidFill>
-              <a:effectLst/>
-              <a:latin typeface="Arial" panose="020B0604020202020204" pitchFamily="34" charset="0"/>
-            </a:endParaRPr>
-          </a:p>
-        </p:txBody>
-      </p:sp>
-      <p:sp>
-        <p:nvSpPr>
-          <p:cNvPr id="22" name="Text Box 20"/>
-          <p:cNvSpPr txBox="1">
-            <a:spLocks noChangeArrowheads="1"/>
-          </p:cNvSpPr>
-          <p:nvPr/>
-        </p:nvSpPr>
-        <p:spPr bwMode="auto">
-          <a:xfrm>
-            <a:off x="6325211" y="4068786"/>
-            <a:ext cx="1257300" cy="601663"/>
-          </a:xfrm>
-          <a:prstGeom prst="rect">
-            <a:avLst/>
-          </a:prstGeom>
-          <a:solidFill>
-            <a:srgbClr val="FFFFFF"/>
-          </a:solidFill>
-          <a:ln w="6350">
-            <a:solidFill>
-              <a:srgbClr val="000000"/>
-            </a:solidFill>
-            <a:miter lim="800000"/>
-            <a:headEnd/>
-            <a:tailEnd/>
-          </a:ln>
-        </p:spPr>
-        <p:txBody>
-          <a:bodyPr vert="horz" wrap="square" lIns="91440" tIns="45720" rIns="91440" bIns="45720" numCol="1" anchor="ctr" anchorCtr="0" compatLnSpc="1">
-            <a:prstTxWarp prst="textNoShape">
-              <a:avLst/>
-            </a:prstTxWarp>
-          </a:bodyPr>
-          <a:lstStyle/>
-          <a:p>
-            <a:pPr marL="0" marR="0" lvl="0" indent="0" algn="ctr" defTabSz="914400" rtl="0" eaLnBrk="0" fontAlgn="base" latinLnBrk="0" hangingPunct="0">
-              <a:lnSpc>
-                <a:spcPct val="100000"/>
-              </a:lnSpc>
-              <a:spcBef>
-                <a:spcPct val="0"/>
-              </a:spcBef>
-              <a:spcAft>
-                <a:spcPct val="0"/>
-              </a:spcAft>
-              <a:buClrTx/>
-              <a:buSzTx/>
-              <a:buFontTx/>
-              <a:buNone/>
-              <a:tabLst/>
-            </a:pPr>
-            <a:r>
               <a:rPr kumimoji="0" lang="en-US" altLang="en-US" sz="1100" b="0" i="0" u="none" strike="noStrike" cap="none" normalizeH="0" baseline="0">
                 <a:ln>
                   <a:noFill/>
@@ -4337,7 +4337,7 @@
             <a:avLst/>
           </a:prstGeom>
           <a:solidFill>
-            <a:srgbClr val="FFFFFF"/>
+            <a:srgbClr val="00B0F0"/>
           </a:solidFill>
           <a:ln w="6350">
             <a:solidFill>
@@ -4486,13 +4486,13 @@
         </p:spPr>
         <p:style>
           <a:lnRef idx="1">
-            <a:schemeClr val="dk1"/>
+            <a:schemeClr val="accent5"/>
           </a:lnRef>
           <a:fillRef idx="0">
-            <a:schemeClr val="dk1"/>
+            <a:schemeClr val="accent5"/>
           </a:fillRef>
           <a:effectRef idx="0">
-            <a:schemeClr val="dk1"/>
+            <a:schemeClr val="accent5"/>
           </a:effectRef>
           <a:fontRef idx="minor">
             <a:schemeClr val="tx1"/>
@@ -4522,13 +4522,13 @@
         </p:spPr>
         <p:style>
           <a:lnRef idx="1">
-            <a:schemeClr val="dk1"/>
+            <a:schemeClr val="accent5"/>
           </a:lnRef>
           <a:fillRef idx="0">
-            <a:schemeClr val="dk1"/>
+            <a:schemeClr val="accent5"/>
           </a:fillRef>
           <a:effectRef idx="0">
-            <a:schemeClr val="dk1"/>
+            <a:schemeClr val="accent5"/>
           </a:effectRef>
           <a:fontRef idx="minor">
             <a:schemeClr val="tx1"/>
@@ -4558,174 +4558,19 @@
         </p:spPr>
         <p:style>
           <a:lnRef idx="1">
-            <a:schemeClr val="dk1"/>
+            <a:schemeClr val="accent5"/>
           </a:lnRef>
           <a:fillRef idx="0">
-            <a:schemeClr val="dk1"/>
+            <a:schemeClr val="accent5"/>
           </a:fillRef>
           <a:effectRef idx="0">
-            <a:schemeClr val="dk1"/>
+            <a:schemeClr val="accent5"/>
           </a:effectRef>
           <a:fontRef idx="minor">
             <a:schemeClr val="tx1"/>
           </a:fontRef>
         </p:style>
       </p:cxnSp>
-      <p:cxnSp>
-        <p:nvCxnSpPr>
-          <p:cNvPr id="55" name="Straight Connector 54"/>
-          <p:cNvCxnSpPr>
-            <a:endCxn id="9" idx="1"/>
-          </p:cNvCxnSpPr>
-          <p:nvPr/>
-        </p:nvCxnSpPr>
-        <p:spPr>
-          <a:xfrm>
-            <a:off x="1401581" y="2518568"/>
-            <a:ext cx="827880" cy="1"/>
-          </a:xfrm>
-          <a:prstGeom prst="line">
-            <a:avLst/>
-          </a:prstGeom>
-          <a:ln w="28575">
-            <a:headEnd type="none" w="med" len="med"/>
-            <a:tailEnd type="triangle" w="med" len="med"/>
-          </a:ln>
-        </p:spPr>
-        <p:style>
-          <a:lnRef idx="1">
-            <a:schemeClr val="dk1"/>
-          </a:lnRef>
-          <a:fillRef idx="0">
-            <a:schemeClr val="dk1"/>
-          </a:fillRef>
-          <a:effectRef idx="0">
-            <a:schemeClr val="dk1"/>
-          </a:effectRef>
-          <a:fontRef idx="minor">
-            <a:schemeClr val="tx1"/>
-          </a:fontRef>
-        </p:style>
-      </p:cxnSp>
-      <p:cxnSp>
-        <p:nvCxnSpPr>
-          <p:cNvPr id="58" name="Straight Connector 57"/>
-          <p:cNvCxnSpPr>
-            <a:stCxn id="13" idx="1"/>
-          </p:cNvCxnSpPr>
-          <p:nvPr/>
-        </p:nvCxnSpPr>
-        <p:spPr>
-          <a:xfrm flipH="1">
-            <a:off x="1401581" y="3241093"/>
-            <a:ext cx="837404" cy="12149"/>
-          </a:xfrm>
-          <a:prstGeom prst="line">
-            <a:avLst/>
-          </a:prstGeom>
-          <a:ln w="28575">
-            <a:headEnd type="triangle" w="med" len="med"/>
-            <a:tailEnd type="none" w="med" len="med"/>
-          </a:ln>
-        </p:spPr>
-        <p:style>
-          <a:lnRef idx="1">
-            <a:schemeClr val="dk1"/>
-          </a:lnRef>
-          <a:fillRef idx="0">
-            <a:schemeClr val="dk1"/>
-          </a:fillRef>
-          <a:effectRef idx="0">
-            <a:schemeClr val="dk1"/>
-          </a:effectRef>
-          <a:fontRef idx="minor">
-            <a:schemeClr val="tx1"/>
-          </a:fontRef>
-        </p:style>
-      </p:cxnSp>
-      <p:grpSp>
-        <p:nvGrpSpPr>
-          <p:cNvPr id="67" name="Group 66"/>
-          <p:cNvGrpSpPr/>
-          <p:nvPr/>
-        </p:nvGrpSpPr>
-        <p:grpSpPr>
-          <a:xfrm>
-            <a:off x="554648" y="553244"/>
-            <a:ext cx="6399213" cy="2420142"/>
-            <a:chOff x="554648" y="553244"/>
-            <a:chExt cx="6399213" cy="2420142"/>
-          </a:xfrm>
-        </p:grpSpPr>
-        <p:cxnSp>
-          <p:nvCxnSpPr>
-            <p:cNvPr id="63" name="Elbow Connector 62"/>
-            <p:cNvCxnSpPr>
-              <a:stCxn id="7" idx="3"/>
-            </p:cNvCxnSpPr>
-            <p:nvPr/>
-          </p:nvCxnSpPr>
-          <p:spPr>
-            <a:xfrm flipH="1">
-              <a:off x="554648" y="553244"/>
-              <a:ext cx="6399213" cy="642510"/>
-            </a:xfrm>
-            <a:prstGeom prst="bentConnector3">
-              <a:avLst>
-                <a:gd name="adj1" fmla="val -3572"/>
-              </a:avLst>
-            </a:prstGeom>
-            <a:ln w="28575"/>
-          </p:spPr>
-          <p:style>
-            <a:lnRef idx="1">
-              <a:schemeClr val="dk1"/>
-            </a:lnRef>
-            <a:fillRef idx="0">
-              <a:schemeClr val="dk1"/>
-            </a:fillRef>
-            <a:effectRef idx="0">
-              <a:schemeClr val="dk1"/>
-            </a:effectRef>
-            <a:fontRef idx="minor">
-              <a:schemeClr val="tx1"/>
-            </a:fontRef>
-          </p:style>
-        </p:cxnSp>
-        <p:cxnSp>
-          <p:nvCxnSpPr>
-            <p:cNvPr id="65" name="Elbow Connector 64"/>
-            <p:cNvCxnSpPr/>
-            <p:nvPr/>
-          </p:nvCxnSpPr>
-          <p:spPr>
-            <a:xfrm rot="16200000" flipH="1">
-              <a:off x="84535" y="1665866"/>
-              <a:ext cx="1777633" cy="837407"/>
-            </a:xfrm>
-            <a:prstGeom prst="bentConnector3">
-              <a:avLst>
-                <a:gd name="adj1" fmla="val 94515"/>
-              </a:avLst>
-            </a:prstGeom>
-            <a:ln w="28575"/>
-          </p:spPr>
-          <p:style>
-            <a:lnRef idx="1">
-              <a:schemeClr val="dk1"/>
-            </a:lnRef>
-            <a:fillRef idx="0">
-              <a:schemeClr val="dk1"/>
-            </a:fillRef>
-            <a:effectRef idx="0">
-              <a:schemeClr val="dk1"/>
-            </a:effectRef>
-            <a:fontRef idx="minor">
-              <a:schemeClr val="tx1"/>
-            </a:fontRef>
-          </p:style>
-        </p:cxnSp>
-      </p:grpSp>
       <p:cxnSp>
         <p:nvCxnSpPr>
           <p:cNvPr id="77" name="Straight Arrow Connector 76"/>
@@ -4749,13 +4594,13 @@
         </p:spPr>
         <p:style>
           <a:lnRef idx="1">
-            <a:schemeClr val="dk1"/>
+            <a:schemeClr val="accent5"/>
           </a:lnRef>
           <a:fillRef idx="0">
-            <a:schemeClr val="dk1"/>
+            <a:schemeClr val="accent5"/>
           </a:fillRef>
           <a:effectRef idx="0">
-            <a:schemeClr val="dk1"/>
+            <a:schemeClr val="accent5"/>
           </a:effectRef>
           <a:fontRef idx="minor">
             <a:schemeClr val="tx1"/>
@@ -4787,13 +4632,13 @@
         </p:spPr>
         <p:style>
           <a:lnRef idx="1">
-            <a:schemeClr val="dk1"/>
+            <a:schemeClr val="accent5"/>
           </a:lnRef>
           <a:fillRef idx="0">
-            <a:schemeClr val="dk1"/>
+            <a:schemeClr val="accent5"/>
           </a:fillRef>
           <a:effectRef idx="0">
-            <a:schemeClr val="dk1"/>
+            <a:schemeClr val="accent5"/>
           </a:effectRef>
           <a:fontRef idx="minor">
             <a:schemeClr val="tx1"/>
@@ -4893,159 +4738,13 @@
         </p:spPr>
         <p:style>
           <a:lnRef idx="1">
-            <a:schemeClr val="dk1"/>
+            <a:schemeClr val="accent5"/>
           </a:lnRef>
           <a:fillRef idx="0">
-            <a:schemeClr val="dk1"/>
+            <a:schemeClr val="accent5"/>
           </a:fillRef>
           <a:effectRef idx="0">
-            <a:schemeClr val="dk1"/>
-          </a:effectRef>
-          <a:fontRef idx="minor">
-            <a:schemeClr val="tx1"/>
-          </a:fontRef>
-        </p:style>
-      </p:cxnSp>
-      <p:grpSp>
-        <p:nvGrpSpPr>
-          <p:cNvPr id="115" name="Group 114"/>
-          <p:cNvGrpSpPr/>
-          <p:nvPr/>
-        </p:nvGrpSpPr>
-        <p:grpSpPr>
-          <a:xfrm>
-            <a:off x="7582511" y="4369618"/>
-            <a:ext cx="874223" cy="1086952"/>
-            <a:chOff x="5231423" y="2518569"/>
-            <a:chExt cx="773723" cy="746125"/>
-          </a:xfrm>
-        </p:grpSpPr>
-        <p:cxnSp>
-          <p:nvCxnSpPr>
-            <p:cNvPr id="116" name="Elbow Connector 115"/>
-            <p:cNvCxnSpPr/>
-            <p:nvPr/>
-          </p:nvCxnSpPr>
-          <p:spPr>
-            <a:xfrm>
-              <a:off x="5231423" y="2518569"/>
-              <a:ext cx="773723" cy="376175"/>
-            </a:xfrm>
-            <a:prstGeom prst="bentConnector3">
-              <a:avLst/>
-            </a:prstGeom>
-            <a:ln w="28575">
-              <a:tailEnd type="triangle"/>
-            </a:ln>
-          </p:spPr>
-          <p:style>
-            <a:lnRef idx="1">
-              <a:schemeClr val="dk1"/>
-            </a:lnRef>
-            <a:fillRef idx="0">
-              <a:schemeClr val="dk1"/>
-            </a:fillRef>
-            <a:effectRef idx="0">
-              <a:schemeClr val="dk1"/>
-            </a:effectRef>
-            <a:fontRef idx="minor">
-              <a:schemeClr val="tx1"/>
-            </a:fontRef>
-          </p:style>
-        </p:cxnSp>
-        <p:cxnSp>
-          <p:nvCxnSpPr>
-            <p:cNvPr id="117" name="Elbow Connector 116"/>
-            <p:cNvCxnSpPr/>
-            <p:nvPr/>
-          </p:nvCxnSpPr>
-          <p:spPr>
-            <a:xfrm flipV="1">
-              <a:off x="5239361" y="2894744"/>
-              <a:ext cx="765785" cy="369950"/>
-            </a:xfrm>
-            <a:prstGeom prst="bentConnector3">
-              <a:avLst/>
-            </a:prstGeom>
-            <a:ln w="28575"/>
-          </p:spPr>
-          <p:style>
-            <a:lnRef idx="1">
-              <a:schemeClr val="dk1"/>
-            </a:lnRef>
-            <a:fillRef idx="0">
-              <a:schemeClr val="dk1"/>
-            </a:fillRef>
-            <a:effectRef idx="0">
-              <a:schemeClr val="dk1"/>
-            </a:effectRef>
-            <a:fontRef idx="minor">
-              <a:schemeClr val="tx1"/>
-            </a:fontRef>
-          </p:style>
-        </p:cxnSp>
-      </p:grpSp>
-      <p:cxnSp>
-        <p:nvCxnSpPr>
-          <p:cNvPr id="39" name="Straight Connector 38"/>
-          <p:cNvCxnSpPr/>
-          <p:nvPr/>
-        </p:nvCxnSpPr>
-        <p:spPr>
-          <a:xfrm>
-            <a:off x="1392055" y="2518568"/>
-            <a:ext cx="9526" cy="734674"/>
-          </a:xfrm>
-          <a:prstGeom prst="line">
-            <a:avLst/>
-          </a:prstGeom>
-          <a:ln w="28575"/>
-        </p:spPr>
-        <p:style>
-          <a:lnRef idx="1">
-            <a:schemeClr val="dk1"/>
-          </a:lnRef>
-          <a:fillRef idx="0">
-            <a:schemeClr val="dk1"/>
-          </a:fillRef>
-          <a:effectRef idx="0">
-            <a:schemeClr val="dk1"/>
-          </a:effectRef>
-          <a:fontRef idx="minor">
-            <a:schemeClr val="tx1"/>
-          </a:fontRef>
-        </p:style>
-      </p:cxnSp>
-      <p:cxnSp>
-        <p:nvCxnSpPr>
-          <p:cNvPr id="43" name="Elbow Connector 42"/>
-          <p:cNvCxnSpPr>
-            <a:stCxn id="13" idx="3"/>
-            <a:endCxn id="15" idx="1"/>
-          </p:cNvCxnSpPr>
-          <p:nvPr/>
-        </p:nvCxnSpPr>
-        <p:spPr>
-          <a:xfrm flipV="1">
-            <a:off x="3496285" y="2871143"/>
-            <a:ext cx="765785" cy="369950"/>
-          </a:xfrm>
-          <a:prstGeom prst="bentConnector3">
-            <a:avLst>
-              <a:gd name="adj1" fmla="val 49205"/>
-            </a:avLst>
-          </a:prstGeom>
-          <a:ln w="28575"/>
-        </p:spPr>
-        <p:style>
-          <a:lnRef idx="1">
-            <a:schemeClr val="dk1"/>
-          </a:lnRef>
-          <a:fillRef idx="0">
-            <a:schemeClr val="dk1"/>
-          </a:fillRef>
-          <a:effectRef idx="0">
-            <a:schemeClr val="dk1"/>
+            <a:schemeClr val="accent5"/>
           </a:effectRef>
           <a:fontRef idx="minor">
             <a:schemeClr val="tx1"/>
@@ -5183,13 +4882,13 @@
         </p:spPr>
         <p:style>
           <a:lnRef idx="1">
-            <a:schemeClr val="dk1"/>
+            <a:schemeClr val="accent5"/>
           </a:lnRef>
           <a:fillRef idx="0">
-            <a:schemeClr val="dk1"/>
+            <a:schemeClr val="accent5"/>
           </a:fillRef>
           <a:effectRef idx="0">
-            <a:schemeClr val="dk1"/>
+            <a:schemeClr val="accent5"/>
           </a:effectRef>
           <a:fontRef idx="minor">
             <a:schemeClr val="tx1"/>
@@ -5219,13 +4918,13 @@
         </p:spPr>
         <p:style>
           <a:lnRef idx="1">
-            <a:schemeClr val="dk1"/>
+            <a:schemeClr val="accent5"/>
           </a:lnRef>
           <a:fillRef idx="0">
-            <a:schemeClr val="dk1"/>
+            <a:schemeClr val="accent5"/>
           </a:fillRef>
           <a:effectRef idx="0">
-            <a:schemeClr val="dk1"/>
+            <a:schemeClr val="accent5"/>
           </a:effectRef>
           <a:fontRef idx="minor">
             <a:schemeClr val="tx1"/>
@@ -5249,7 +4948,7 @@
             <a:avLst/>
           </a:prstGeom>
           <a:solidFill>
-            <a:srgbClr val="FFFFFF"/>
+            <a:srgbClr val="00B0F0"/>
           </a:solidFill>
           <a:ln w="6350">
             <a:solidFill>
@@ -5322,19 +5021,18 @@
       </p:sp>
       <p:cxnSp>
         <p:nvCxnSpPr>
-          <p:cNvPr id="99" name="Elbow Connector 98"/>
+          <p:cNvPr id="3" name="Connector: Elbow 2"/>
           <p:cNvCxnSpPr>
-            <a:stCxn id="21" idx="0"/>
-            <a:endCxn id="104" idx="1"/>
+            <a:endCxn id="9" idx="1"/>
           </p:cNvCxnSpPr>
           <p:nvPr/>
         </p:nvCxnSpPr>
         <p:spPr>
-          <a:xfrm rot="5400000" flipH="1" flipV="1">
-            <a:off x="9241256" y="3480637"/>
-            <a:ext cx="870662" cy="1164468"/>
-          </a:xfrm>
-          <a:prstGeom prst="bentConnector2">
+          <a:xfrm flipV="1">
+            <a:off x="1415865" y="2518569"/>
+            <a:ext cx="813596" cy="360029"/>
+          </a:xfrm>
+          <a:prstGeom prst="bentConnector3">
             <a:avLst/>
           </a:prstGeom>
           <a:ln w="28575">
@@ -5358,19 +5056,54 @@
       </p:cxnSp>
       <p:cxnSp>
         <p:nvCxnSpPr>
-          <p:cNvPr id="107" name="Elbow Connector 106"/>
+          <p:cNvPr id="28" name="Connector: Elbow 27"/>
           <p:cNvCxnSpPr>
-            <a:stCxn id="18" idx="2"/>
-            <a:endCxn id="104" idx="1"/>
+            <a:endCxn id="13" idx="1"/>
           </p:cNvCxnSpPr>
           <p:nvPr/>
         </p:nvCxnSpPr>
         <p:spPr>
-          <a:xfrm rot="16200000" flipH="1">
-            <a:off x="9091650" y="2460369"/>
-            <a:ext cx="455566" cy="1878776"/>
-          </a:xfrm>
-          <a:prstGeom prst="bentConnector2">
+          <a:xfrm>
+            <a:off x="1384912" y="2870879"/>
+            <a:ext cx="854073" cy="370214"/>
+          </a:xfrm>
+          <a:prstGeom prst="bentConnector3">
+            <a:avLst/>
+          </a:prstGeom>
+          <a:ln w="28575">
+            <a:tailEnd type="triangle"/>
+          </a:ln>
+        </p:spPr>
+        <p:style>
+          <a:lnRef idx="1">
+            <a:schemeClr val="accent5"/>
+          </a:lnRef>
+          <a:fillRef idx="0">
+            <a:schemeClr val="accent5"/>
+          </a:fillRef>
+          <a:effectRef idx="0">
+            <a:schemeClr val="accent5"/>
+          </a:effectRef>
+          <a:fontRef idx="minor">
+            <a:schemeClr val="tx1"/>
+          </a:fontRef>
+        </p:style>
+      </p:cxnSp>
+      <p:cxnSp>
+        <p:nvCxnSpPr>
+          <p:cNvPr id="32" name="Connector: Elbow 31"/>
+          <p:cNvCxnSpPr>
+            <a:stCxn id="22" idx="3"/>
+            <a:endCxn id="21" idx="1"/>
+          </p:cNvCxnSpPr>
+          <p:nvPr/>
+        </p:nvCxnSpPr>
+        <p:spPr>
+          <a:xfrm>
+            <a:off x="7582511" y="4369618"/>
+            <a:ext cx="883192" cy="536572"/>
+          </a:xfrm>
+          <a:prstGeom prst="bentConnector3">
             <a:avLst/>
           </a:prstGeom>
           <a:ln w="28575">
@@ -5392,6 +5125,233 @@
           </a:fontRef>
         </p:style>
       </p:cxnSp>
+      <p:cxnSp>
+        <p:nvCxnSpPr>
+          <p:cNvPr id="34" name="Connector: Elbow 33"/>
+          <p:cNvCxnSpPr>
+            <a:stCxn id="23" idx="3"/>
+            <a:endCxn id="21" idx="1"/>
+          </p:cNvCxnSpPr>
+          <p:nvPr/>
+        </p:nvCxnSpPr>
+        <p:spPr>
+          <a:xfrm flipV="1">
+            <a:off x="7582511" y="4906190"/>
+            <a:ext cx="883192" cy="550380"/>
+          </a:xfrm>
+          <a:prstGeom prst="bentConnector3">
+            <a:avLst/>
+          </a:prstGeom>
+          <a:ln w="28575">
+            <a:tailEnd type="triangle"/>
+          </a:ln>
+        </p:spPr>
+        <p:style>
+          <a:lnRef idx="1">
+            <a:schemeClr val="accent5"/>
+          </a:lnRef>
+          <a:fillRef idx="0">
+            <a:schemeClr val="accent5"/>
+          </a:fillRef>
+          <a:effectRef idx="0">
+            <a:schemeClr val="accent5"/>
+          </a:effectRef>
+          <a:fontRef idx="minor">
+            <a:schemeClr val="tx1"/>
+          </a:fontRef>
+        </p:style>
+      </p:cxnSp>
+      <p:cxnSp>
+        <p:nvCxnSpPr>
+          <p:cNvPr id="36" name="Connector: Elbow 35"/>
+          <p:cNvCxnSpPr>
+            <a:stCxn id="13" idx="3"/>
+            <a:endCxn id="15" idx="1"/>
+          </p:cNvCxnSpPr>
+          <p:nvPr/>
+        </p:nvCxnSpPr>
+        <p:spPr>
+          <a:xfrm flipV="1">
+            <a:off x="3496285" y="2871143"/>
+            <a:ext cx="765785" cy="369950"/>
+          </a:xfrm>
+          <a:prstGeom prst="bentConnector3">
+            <a:avLst/>
+          </a:prstGeom>
+          <a:ln w="28575">
+            <a:tailEnd type="triangle"/>
+          </a:ln>
+        </p:spPr>
+        <p:style>
+          <a:lnRef idx="1">
+            <a:schemeClr val="accent5"/>
+          </a:lnRef>
+          <a:fillRef idx="0">
+            <a:schemeClr val="accent5"/>
+          </a:fillRef>
+          <a:effectRef idx="0">
+            <a:schemeClr val="accent5"/>
+          </a:effectRef>
+          <a:fontRef idx="minor">
+            <a:schemeClr val="tx1"/>
+          </a:fontRef>
+        </p:style>
+      </p:cxnSp>
+      <p:cxnSp>
+        <p:nvCxnSpPr>
+          <p:cNvPr id="40" name="Connector: Elbow 39"/>
+          <p:cNvCxnSpPr>
+            <a:stCxn id="18" idx="2"/>
+            <a:endCxn id="104" idx="1"/>
+          </p:cNvCxnSpPr>
+          <p:nvPr/>
+        </p:nvCxnSpPr>
+        <p:spPr>
+          <a:xfrm rot="16200000" flipH="1">
+            <a:off x="9091650" y="2460369"/>
+            <a:ext cx="455566" cy="1878776"/>
+          </a:xfrm>
+          <a:prstGeom prst="bentConnector2">
+            <a:avLst/>
+          </a:prstGeom>
+          <a:ln w="28575">
+            <a:tailEnd type="triangle"/>
+          </a:ln>
+        </p:spPr>
+        <p:style>
+          <a:lnRef idx="1">
+            <a:schemeClr val="dk1"/>
+          </a:lnRef>
+          <a:fillRef idx="0">
+            <a:schemeClr val="dk1"/>
+          </a:fillRef>
+          <a:effectRef idx="0">
+            <a:schemeClr val="dk1"/>
+          </a:effectRef>
+          <a:fontRef idx="minor">
+            <a:schemeClr val="tx1"/>
+          </a:fontRef>
+        </p:style>
+      </p:cxnSp>
+      <p:cxnSp>
+        <p:nvCxnSpPr>
+          <p:cNvPr id="99" name="Elbow Connector 98"/>
+          <p:cNvCxnSpPr>
+            <a:stCxn id="21" idx="0"/>
+            <a:endCxn id="104" idx="1"/>
+          </p:cNvCxnSpPr>
+          <p:nvPr/>
+        </p:nvCxnSpPr>
+        <p:spPr>
+          <a:xfrm rot="5400000" flipH="1" flipV="1">
+            <a:off x="9241256" y="3480637"/>
+            <a:ext cx="870662" cy="1164468"/>
+          </a:xfrm>
+          <a:prstGeom prst="bentConnector2">
+            <a:avLst/>
+          </a:prstGeom>
+          <a:ln w="28575">
+            <a:tailEnd type="triangle"/>
+          </a:ln>
+        </p:spPr>
+        <p:style>
+          <a:lnRef idx="1">
+            <a:schemeClr val="accent5"/>
+          </a:lnRef>
+          <a:fillRef idx="0">
+            <a:schemeClr val="accent5"/>
+          </a:fillRef>
+          <a:effectRef idx="0">
+            <a:schemeClr val="accent5"/>
+          </a:effectRef>
+          <a:fontRef idx="minor">
+            <a:schemeClr val="tx1"/>
+          </a:fontRef>
+        </p:style>
+      </p:cxnSp>
+      <p:grpSp>
+        <p:nvGrpSpPr>
+          <p:cNvPr id="67" name="Group 66"/>
+          <p:cNvGrpSpPr/>
+          <p:nvPr/>
+        </p:nvGrpSpPr>
+        <p:grpSpPr>
+          <a:xfrm>
+            <a:off x="554648" y="553244"/>
+            <a:ext cx="6399213" cy="2317635"/>
+            <a:chOff x="554648" y="553244"/>
+            <a:chExt cx="6399213" cy="2317635"/>
+          </a:xfrm>
+        </p:grpSpPr>
+        <p:cxnSp>
+          <p:nvCxnSpPr>
+            <p:cNvPr id="63" name="Elbow Connector 62"/>
+            <p:cNvCxnSpPr>
+              <a:stCxn id="7" idx="3"/>
+            </p:cNvCxnSpPr>
+            <p:nvPr/>
+          </p:nvCxnSpPr>
+          <p:spPr>
+            <a:xfrm flipH="1">
+              <a:off x="554648" y="553244"/>
+              <a:ext cx="6399213" cy="642510"/>
+            </a:xfrm>
+            <a:prstGeom prst="bentConnector3">
+              <a:avLst>
+                <a:gd name="adj1" fmla="val -3572"/>
+              </a:avLst>
+            </a:prstGeom>
+            <a:ln w="28575"/>
+          </p:spPr>
+          <p:style>
+            <a:lnRef idx="1">
+              <a:schemeClr val="accent5"/>
+            </a:lnRef>
+            <a:fillRef idx="0">
+              <a:schemeClr val="accent5"/>
+            </a:fillRef>
+            <a:effectRef idx="0">
+              <a:schemeClr val="accent5"/>
+            </a:effectRef>
+            <a:fontRef idx="minor">
+              <a:schemeClr val="tx1"/>
+            </a:fontRef>
+          </p:style>
+        </p:cxnSp>
+        <p:cxnSp>
+          <p:nvCxnSpPr>
+            <p:cNvPr id="65" name="Elbow Connector 64"/>
+            <p:cNvCxnSpPr/>
+            <p:nvPr/>
+          </p:nvCxnSpPr>
+          <p:spPr>
+            <a:xfrm rot="16200000" flipH="1">
+              <a:off x="142931" y="1607470"/>
+              <a:ext cx="1675126" cy="851692"/>
+            </a:xfrm>
+            <a:prstGeom prst="bentConnector3">
+              <a:avLst>
+                <a:gd name="adj1" fmla="val 99863"/>
+              </a:avLst>
+            </a:prstGeom>
+            <a:ln w="28575"/>
+          </p:spPr>
+          <p:style>
+            <a:lnRef idx="1">
+              <a:schemeClr val="accent5"/>
+            </a:lnRef>
+            <a:fillRef idx="0">
+              <a:schemeClr val="accent5"/>
+            </a:fillRef>
+            <a:effectRef idx="0">
+              <a:schemeClr val="accent5"/>
+            </a:effectRef>
+            <a:fontRef idx="minor">
+              <a:schemeClr val="tx1"/>
+            </a:fontRef>
+          </p:style>
+        </p:cxnSp>
+      </p:grpSp>
     </p:spTree>
     <p:extLst>
       <p:ext uri="{BB962C8B-B14F-4D97-AF65-F5344CB8AC3E}">

</xml_diff>